<commit_message>
update diagrams in Dev Guide
</commit_message>
<xml_diff>
--- a/docs/diagrams/HighLevelSequenceDiagrams.pptx
+++ b/docs/diagrams/HighLevelSequenceDiagrams.pptx
@@ -107,7 +107,27 @@
       </a:defRPr>
     </a:lvl9pPr>
   </p:defaultTextStyle>
+  <p:extLst>
+    <p:ext uri="{EFAFB233-063F-42B5-8137-9DF3F51BA10A}">
+      <p15:sldGuideLst xmlns:p15="http://schemas.microsoft.com/office/powerpoint/2012/main">
+        <p15:guide id="1" orient="horz" pos="1488">
+          <p15:clr>
+            <a:srgbClr val="A4A3A4"/>
+          </p15:clr>
+        </p15:guide>
+        <p15:guide id="2" pos="2880">
+          <p15:clr>
+            <a:srgbClr val="A4A3A4"/>
+          </p15:clr>
+        </p15:guide>
+      </p15:sldGuideLst>
+    </p:ext>
+  </p:extLst>
 </p:presentation>
+</file>
+
+<file path=ppt/revisionInfo.xml><?xml version="1.0" encoding="utf-8"?>
+<p1510:revInfo xmlns:a="http://schemas.openxmlformats.org/drawingml/2006/main" xmlns:r="http://schemas.openxmlformats.org/officeDocument/2006/relationships" xmlns:p1510="http://schemas.microsoft.com/office/powerpoint/2015/10/main"/>
 </file>
 
 <file path=ppt/notesMasters/notesMaster1.xml><?xml version="1.0" encoding="utf-8"?>
@@ -192,7 +212,7 @@
           <a:p>
             <a:fld id="{F5CC4B3F-88C1-4FFA-B1B6-F41C21DC6924}" type="datetimeFigureOut">
               <a:rPr lang="en-US" smtClean="0"/>
-              <a:t>10/16/2016</a:t>
+              <a:t>10/13/2017</a:t>
             </a:fld>
             <a:endParaRPr lang="en-US"/>
           </a:p>
@@ -256,38 +276,37 @@
           <a:p>
             <a:pPr lvl="0"/>
             <a:r>
-              <a:rPr lang="en-US" smtClean="0"/>
+              <a:rPr lang="en-US"/>
               <a:t>Click to edit Master text styles</a:t>
             </a:r>
           </a:p>
           <a:p>
             <a:pPr lvl="1"/>
             <a:r>
-              <a:rPr lang="en-US" smtClean="0"/>
+              <a:rPr lang="en-US"/>
               <a:t>Second level</a:t>
             </a:r>
           </a:p>
           <a:p>
             <a:pPr lvl="2"/>
             <a:r>
-              <a:rPr lang="en-US" smtClean="0"/>
+              <a:rPr lang="en-US"/>
               <a:t>Third level</a:t>
             </a:r>
           </a:p>
           <a:p>
             <a:pPr lvl="3"/>
             <a:r>
-              <a:rPr lang="en-US" smtClean="0"/>
+              <a:rPr lang="en-US"/>
               <a:t>Fourth level</a:t>
             </a:r>
           </a:p>
           <a:p>
             <a:pPr lvl="4"/>
             <a:r>
-              <a:rPr lang="en-US" smtClean="0"/>
+              <a:rPr lang="en-US"/>
               <a:t>Fifth level</a:t>
             </a:r>
-            <a:endParaRPr lang="en-US"/>
           </a:p>
         </p:txBody>
       </p:sp>
@@ -498,10 +517,9 @@
           <a:lstStyle/>
           <a:p>
             <a:r>
-              <a:rPr lang="en-US" smtClean="0"/>
+              <a:rPr lang="en-US"/>
               <a:t>Click to edit Master title style</a:t>
             </a:r>
-            <a:endParaRPr lang="en-US"/>
           </a:p>
         </p:txBody>
       </p:sp>
@@ -617,10 +635,9 @@
           </a:lstStyle>
           <a:p>
             <a:r>
-              <a:rPr lang="en-US" smtClean="0"/>
+              <a:rPr lang="en-US"/>
               <a:t>Click to edit Master subtitle style</a:t>
             </a:r>
-            <a:endParaRPr lang="en-US"/>
           </a:p>
         </p:txBody>
       </p:sp>
@@ -641,7 +658,7 @@
           <a:p>
             <a:fld id="{78C97017-6FC3-485B-9764-EAC9E56C1D49}" type="datetimeFigureOut">
               <a:rPr lang="en-US" smtClean="0"/>
-              <a:t>10/16/2016</a:t>
+              <a:t>10/13/2017</a:t>
             </a:fld>
             <a:endParaRPr lang="en-US"/>
           </a:p>
@@ -735,10 +752,9 @@
           <a:lstStyle/>
           <a:p>
             <a:r>
-              <a:rPr lang="en-US" smtClean="0"/>
+              <a:rPr lang="en-US"/>
               <a:t>Click to edit Master title style</a:t>
             </a:r>
-            <a:endParaRPr lang="en-US"/>
           </a:p>
         </p:txBody>
       </p:sp>
@@ -759,38 +775,37 @@
           <a:p>
             <a:pPr lvl="0"/>
             <a:r>
-              <a:rPr lang="en-US" smtClean="0"/>
+              <a:rPr lang="en-US"/>
               <a:t>Click to edit Master text styles</a:t>
             </a:r>
           </a:p>
           <a:p>
             <a:pPr lvl="1"/>
             <a:r>
-              <a:rPr lang="en-US" smtClean="0"/>
+              <a:rPr lang="en-US"/>
               <a:t>Second level</a:t>
             </a:r>
           </a:p>
           <a:p>
             <a:pPr lvl="2"/>
             <a:r>
-              <a:rPr lang="en-US" smtClean="0"/>
+              <a:rPr lang="en-US"/>
               <a:t>Third level</a:t>
             </a:r>
           </a:p>
           <a:p>
             <a:pPr lvl="3"/>
             <a:r>
-              <a:rPr lang="en-US" smtClean="0"/>
+              <a:rPr lang="en-US"/>
               <a:t>Fourth level</a:t>
             </a:r>
           </a:p>
           <a:p>
             <a:pPr lvl="4"/>
             <a:r>
-              <a:rPr lang="en-US" smtClean="0"/>
+              <a:rPr lang="en-US"/>
               <a:t>Fifth level</a:t>
             </a:r>
-            <a:endParaRPr lang="en-US"/>
           </a:p>
         </p:txBody>
       </p:sp>
@@ -811,7 +826,7 @@
           <a:p>
             <a:fld id="{78C97017-6FC3-485B-9764-EAC9E56C1D49}" type="datetimeFigureOut">
               <a:rPr lang="en-US" smtClean="0"/>
-              <a:t>10/16/2016</a:t>
+              <a:t>10/13/2017</a:t>
             </a:fld>
             <a:endParaRPr lang="en-US"/>
           </a:p>
@@ -910,10 +925,9 @@
           <a:lstStyle/>
           <a:p>
             <a:r>
-              <a:rPr lang="en-US" smtClean="0"/>
+              <a:rPr lang="en-US"/>
               <a:t>Click to edit Master title style</a:t>
             </a:r>
-            <a:endParaRPr lang="en-US"/>
           </a:p>
         </p:txBody>
       </p:sp>
@@ -939,38 +953,37 @@
           <a:p>
             <a:pPr lvl="0"/>
             <a:r>
-              <a:rPr lang="en-US" smtClean="0"/>
+              <a:rPr lang="en-US"/>
               <a:t>Click to edit Master text styles</a:t>
             </a:r>
           </a:p>
           <a:p>
             <a:pPr lvl="1"/>
             <a:r>
-              <a:rPr lang="en-US" smtClean="0"/>
+              <a:rPr lang="en-US"/>
               <a:t>Second level</a:t>
             </a:r>
           </a:p>
           <a:p>
             <a:pPr lvl="2"/>
             <a:r>
-              <a:rPr lang="en-US" smtClean="0"/>
+              <a:rPr lang="en-US"/>
               <a:t>Third level</a:t>
             </a:r>
           </a:p>
           <a:p>
             <a:pPr lvl="3"/>
             <a:r>
-              <a:rPr lang="en-US" smtClean="0"/>
+              <a:rPr lang="en-US"/>
               <a:t>Fourth level</a:t>
             </a:r>
           </a:p>
           <a:p>
             <a:pPr lvl="4"/>
             <a:r>
-              <a:rPr lang="en-US" smtClean="0"/>
+              <a:rPr lang="en-US"/>
               <a:t>Fifth level</a:t>
             </a:r>
-            <a:endParaRPr lang="en-US"/>
           </a:p>
         </p:txBody>
       </p:sp>
@@ -991,7 +1004,7 @@
           <a:p>
             <a:fld id="{78C97017-6FC3-485B-9764-EAC9E56C1D49}" type="datetimeFigureOut">
               <a:rPr lang="en-US" smtClean="0"/>
-              <a:t>10/16/2016</a:t>
+              <a:t>10/13/2017</a:t>
             </a:fld>
             <a:endParaRPr lang="en-US"/>
           </a:p>
@@ -1085,10 +1098,9 @@
           <a:lstStyle/>
           <a:p>
             <a:r>
-              <a:rPr lang="en-US" smtClean="0"/>
+              <a:rPr lang="en-US"/>
               <a:t>Click to edit Master title style</a:t>
             </a:r>
-            <a:endParaRPr lang="en-US"/>
           </a:p>
         </p:txBody>
       </p:sp>
@@ -1109,38 +1121,37 @@
           <a:p>
             <a:pPr lvl="0"/>
             <a:r>
-              <a:rPr lang="en-US" smtClean="0"/>
+              <a:rPr lang="en-US"/>
               <a:t>Click to edit Master text styles</a:t>
             </a:r>
           </a:p>
           <a:p>
             <a:pPr lvl="1"/>
             <a:r>
-              <a:rPr lang="en-US" smtClean="0"/>
+              <a:rPr lang="en-US"/>
               <a:t>Second level</a:t>
             </a:r>
           </a:p>
           <a:p>
             <a:pPr lvl="2"/>
             <a:r>
-              <a:rPr lang="en-US" smtClean="0"/>
+              <a:rPr lang="en-US"/>
               <a:t>Third level</a:t>
             </a:r>
           </a:p>
           <a:p>
             <a:pPr lvl="3"/>
             <a:r>
-              <a:rPr lang="en-US" smtClean="0"/>
+              <a:rPr lang="en-US"/>
               <a:t>Fourth level</a:t>
             </a:r>
           </a:p>
           <a:p>
             <a:pPr lvl="4"/>
             <a:r>
-              <a:rPr lang="en-US" smtClean="0"/>
+              <a:rPr lang="en-US"/>
               <a:t>Fifth level</a:t>
             </a:r>
-            <a:endParaRPr lang="en-US"/>
           </a:p>
         </p:txBody>
       </p:sp>
@@ -1161,7 +1172,7 @@
           <a:p>
             <a:fld id="{78C97017-6FC3-485B-9764-EAC9E56C1D49}" type="datetimeFigureOut">
               <a:rPr lang="en-US" smtClean="0"/>
-              <a:t>10/16/2016</a:t>
+              <a:t>10/13/2017</a:t>
             </a:fld>
             <a:endParaRPr lang="en-US"/>
           </a:p>
@@ -1264,10 +1275,9 @@
           </a:lstStyle>
           <a:p>
             <a:r>
-              <a:rPr lang="en-US" smtClean="0"/>
+              <a:rPr lang="en-US"/>
               <a:t>Click to edit Master title style</a:t>
             </a:r>
-            <a:endParaRPr lang="en-US"/>
           </a:p>
         </p:txBody>
       </p:sp>
@@ -1384,7 +1394,7 @@
           <a:p>
             <a:pPr lvl="0"/>
             <a:r>
-              <a:rPr lang="en-US" smtClean="0"/>
+              <a:rPr lang="en-US"/>
               <a:t>Click to edit Master text styles</a:t>
             </a:r>
           </a:p>
@@ -1407,7 +1417,7 @@
           <a:p>
             <a:fld id="{78C97017-6FC3-485B-9764-EAC9E56C1D49}" type="datetimeFigureOut">
               <a:rPr lang="en-US" smtClean="0"/>
-              <a:t>10/16/2016</a:t>
+              <a:t>10/13/2017</a:t>
             </a:fld>
             <a:endParaRPr lang="en-US"/>
           </a:p>
@@ -1501,10 +1511,9 @@
           <a:lstStyle/>
           <a:p>
             <a:r>
-              <a:rPr lang="en-US" smtClean="0"/>
+              <a:rPr lang="en-US"/>
               <a:t>Click to edit Master title style</a:t>
             </a:r>
-            <a:endParaRPr lang="en-US"/>
           </a:p>
         </p:txBody>
       </p:sp>
@@ -1558,38 +1567,37 @@
           <a:p>
             <a:pPr lvl="0"/>
             <a:r>
-              <a:rPr lang="en-US" smtClean="0"/>
+              <a:rPr lang="en-US"/>
               <a:t>Click to edit Master text styles</a:t>
             </a:r>
           </a:p>
           <a:p>
             <a:pPr lvl="1"/>
             <a:r>
-              <a:rPr lang="en-US" smtClean="0"/>
+              <a:rPr lang="en-US"/>
               <a:t>Second level</a:t>
             </a:r>
           </a:p>
           <a:p>
             <a:pPr lvl="2"/>
             <a:r>
-              <a:rPr lang="en-US" smtClean="0"/>
+              <a:rPr lang="en-US"/>
               <a:t>Third level</a:t>
             </a:r>
           </a:p>
           <a:p>
             <a:pPr lvl="3"/>
             <a:r>
-              <a:rPr lang="en-US" smtClean="0"/>
+              <a:rPr lang="en-US"/>
               <a:t>Fourth level</a:t>
             </a:r>
           </a:p>
           <a:p>
             <a:pPr lvl="4"/>
             <a:r>
-              <a:rPr lang="en-US" smtClean="0"/>
+              <a:rPr lang="en-US"/>
               <a:t>Fifth level</a:t>
             </a:r>
-            <a:endParaRPr lang="en-US"/>
           </a:p>
         </p:txBody>
       </p:sp>
@@ -1643,38 +1651,37 @@
           <a:p>
             <a:pPr lvl="0"/>
             <a:r>
-              <a:rPr lang="en-US" smtClean="0"/>
+              <a:rPr lang="en-US"/>
               <a:t>Click to edit Master text styles</a:t>
             </a:r>
           </a:p>
           <a:p>
             <a:pPr lvl="1"/>
             <a:r>
-              <a:rPr lang="en-US" smtClean="0"/>
+              <a:rPr lang="en-US"/>
               <a:t>Second level</a:t>
             </a:r>
           </a:p>
           <a:p>
             <a:pPr lvl="2"/>
             <a:r>
-              <a:rPr lang="en-US" smtClean="0"/>
+              <a:rPr lang="en-US"/>
               <a:t>Third level</a:t>
             </a:r>
           </a:p>
           <a:p>
             <a:pPr lvl="3"/>
             <a:r>
-              <a:rPr lang="en-US" smtClean="0"/>
+              <a:rPr lang="en-US"/>
               <a:t>Fourth level</a:t>
             </a:r>
           </a:p>
           <a:p>
             <a:pPr lvl="4"/>
             <a:r>
-              <a:rPr lang="en-US" smtClean="0"/>
+              <a:rPr lang="en-US"/>
               <a:t>Fifth level</a:t>
             </a:r>
-            <a:endParaRPr lang="en-US"/>
           </a:p>
         </p:txBody>
       </p:sp>
@@ -1695,7 +1702,7 @@
           <a:p>
             <a:fld id="{78C97017-6FC3-485B-9764-EAC9E56C1D49}" type="datetimeFigureOut">
               <a:rPr lang="en-US" smtClean="0"/>
-              <a:t>10/16/2016</a:t>
+              <a:t>10/13/2017</a:t>
             </a:fld>
             <a:endParaRPr lang="en-US"/>
           </a:p>
@@ -1793,10 +1800,9 @@
           </a:lstStyle>
           <a:p>
             <a:r>
-              <a:rPr lang="en-US" smtClean="0"/>
+              <a:rPr lang="en-US"/>
               <a:t>Click to edit Master title style</a:t>
             </a:r>
-            <a:endParaRPr lang="en-US"/>
           </a:p>
         </p:txBody>
       </p:sp>
@@ -1859,7 +1865,7 @@
           <a:p>
             <a:pPr lvl="0"/>
             <a:r>
-              <a:rPr lang="en-US" smtClean="0"/>
+              <a:rPr lang="en-US"/>
               <a:t>Click to edit Master text styles</a:t>
             </a:r>
           </a:p>
@@ -1915,38 +1921,37 @@
           <a:p>
             <a:pPr lvl="0"/>
             <a:r>
-              <a:rPr lang="en-US" smtClean="0"/>
+              <a:rPr lang="en-US"/>
               <a:t>Click to edit Master text styles</a:t>
             </a:r>
           </a:p>
           <a:p>
             <a:pPr lvl="1"/>
             <a:r>
-              <a:rPr lang="en-US" smtClean="0"/>
+              <a:rPr lang="en-US"/>
               <a:t>Second level</a:t>
             </a:r>
           </a:p>
           <a:p>
             <a:pPr lvl="2"/>
             <a:r>
-              <a:rPr lang="en-US" smtClean="0"/>
+              <a:rPr lang="en-US"/>
               <a:t>Third level</a:t>
             </a:r>
           </a:p>
           <a:p>
             <a:pPr lvl="3"/>
             <a:r>
-              <a:rPr lang="en-US" smtClean="0"/>
+              <a:rPr lang="en-US"/>
               <a:t>Fourth level</a:t>
             </a:r>
           </a:p>
           <a:p>
             <a:pPr lvl="4"/>
             <a:r>
-              <a:rPr lang="en-US" smtClean="0"/>
+              <a:rPr lang="en-US"/>
               <a:t>Fifth level</a:t>
             </a:r>
-            <a:endParaRPr lang="en-US"/>
           </a:p>
         </p:txBody>
       </p:sp>
@@ -2009,7 +2014,7 @@
           <a:p>
             <a:pPr lvl="0"/>
             <a:r>
-              <a:rPr lang="en-US" smtClean="0"/>
+              <a:rPr lang="en-US"/>
               <a:t>Click to edit Master text styles</a:t>
             </a:r>
           </a:p>
@@ -2065,38 +2070,37 @@
           <a:p>
             <a:pPr lvl="0"/>
             <a:r>
-              <a:rPr lang="en-US" smtClean="0"/>
+              <a:rPr lang="en-US"/>
               <a:t>Click to edit Master text styles</a:t>
             </a:r>
           </a:p>
           <a:p>
             <a:pPr lvl="1"/>
             <a:r>
-              <a:rPr lang="en-US" smtClean="0"/>
+              <a:rPr lang="en-US"/>
               <a:t>Second level</a:t>
             </a:r>
           </a:p>
           <a:p>
             <a:pPr lvl="2"/>
             <a:r>
-              <a:rPr lang="en-US" smtClean="0"/>
+              <a:rPr lang="en-US"/>
               <a:t>Third level</a:t>
             </a:r>
           </a:p>
           <a:p>
             <a:pPr lvl="3"/>
             <a:r>
-              <a:rPr lang="en-US" smtClean="0"/>
+              <a:rPr lang="en-US"/>
               <a:t>Fourth level</a:t>
             </a:r>
           </a:p>
           <a:p>
             <a:pPr lvl="4"/>
             <a:r>
-              <a:rPr lang="en-US" smtClean="0"/>
+              <a:rPr lang="en-US"/>
               <a:t>Fifth level</a:t>
             </a:r>
-            <a:endParaRPr lang="en-US"/>
           </a:p>
         </p:txBody>
       </p:sp>
@@ -2117,7 +2121,7 @@
           <a:p>
             <a:fld id="{78C97017-6FC3-485B-9764-EAC9E56C1D49}" type="datetimeFigureOut">
               <a:rPr lang="en-US" smtClean="0"/>
-              <a:t>10/16/2016</a:t>
+              <a:t>10/13/2017</a:t>
             </a:fld>
             <a:endParaRPr lang="en-US"/>
           </a:p>
@@ -2211,10 +2215,9 @@
           <a:lstStyle/>
           <a:p>
             <a:r>
-              <a:rPr lang="en-US" smtClean="0"/>
+              <a:rPr lang="en-US"/>
               <a:t>Click to edit Master title style</a:t>
             </a:r>
-            <a:endParaRPr lang="en-US"/>
           </a:p>
         </p:txBody>
       </p:sp>
@@ -2235,7 +2238,7 @@
           <a:p>
             <a:fld id="{78C97017-6FC3-485B-9764-EAC9E56C1D49}" type="datetimeFigureOut">
               <a:rPr lang="en-US" smtClean="0"/>
-              <a:t>10/16/2016</a:t>
+              <a:t>10/13/2017</a:t>
             </a:fld>
             <a:endParaRPr lang="en-US"/>
           </a:p>
@@ -2330,7 +2333,7 @@
           <a:p>
             <a:fld id="{78C97017-6FC3-485B-9764-EAC9E56C1D49}" type="datetimeFigureOut">
               <a:rPr lang="en-US" smtClean="0"/>
-              <a:t>10/16/2016</a:t>
+              <a:t>10/13/2017</a:t>
             </a:fld>
             <a:endParaRPr lang="en-US"/>
           </a:p>
@@ -2433,10 +2436,9 @@
           </a:lstStyle>
           <a:p>
             <a:r>
-              <a:rPr lang="en-US" smtClean="0"/>
+              <a:rPr lang="en-US"/>
               <a:t>Click to edit Master title style</a:t>
             </a:r>
-            <a:endParaRPr lang="en-US"/>
           </a:p>
         </p:txBody>
       </p:sp>
@@ -2490,38 +2492,37 @@
           <a:p>
             <a:pPr lvl="0"/>
             <a:r>
-              <a:rPr lang="en-US" smtClean="0"/>
+              <a:rPr lang="en-US"/>
               <a:t>Click to edit Master text styles</a:t>
             </a:r>
           </a:p>
           <a:p>
             <a:pPr lvl="1"/>
             <a:r>
-              <a:rPr lang="en-US" smtClean="0"/>
+              <a:rPr lang="en-US"/>
               <a:t>Second level</a:t>
             </a:r>
           </a:p>
           <a:p>
             <a:pPr lvl="2"/>
             <a:r>
-              <a:rPr lang="en-US" smtClean="0"/>
+              <a:rPr lang="en-US"/>
               <a:t>Third level</a:t>
             </a:r>
           </a:p>
           <a:p>
             <a:pPr lvl="3"/>
             <a:r>
-              <a:rPr lang="en-US" smtClean="0"/>
+              <a:rPr lang="en-US"/>
               <a:t>Fourth level</a:t>
             </a:r>
           </a:p>
           <a:p>
             <a:pPr lvl="4"/>
             <a:r>
-              <a:rPr lang="en-US" smtClean="0"/>
+              <a:rPr lang="en-US"/>
               <a:t>Fifth level</a:t>
             </a:r>
-            <a:endParaRPr lang="en-US"/>
           </a:p>
         </p:txBody>
       </p:sp>
@@ -2584,7 +2585,7 @@
           <a:p>
             <a:pPr lvl="0"/>
             <a:r>
-              <a:rPr lang="en-US" smtClean="0"/>
+              <a:rPr lang="en-US"/>
               <a:t>Click to edit Master text styles</a:t>
             </a:r>
           </a:p>
@@ -2607,7 +2608,7 @@
           <a:p>
             <a:fld id="{78C97017-6FC3-485B-9764-EAC9E56C1D49}" type="datetimeFigureOut">
               <a:rPr lang="en-US" smtClean="0"/>
-              <a:t>10/16/2016</a:t>
+              <a:t>10/13/2017</a:t>
             </a:fld>
             <a:endParaRPr lang="en-US"/>
           </a:p>
@@ -2710,10 +2711,9 @@
           </a:lstStyle>
           <a:p>
             <a:r>
-              <a:rPr lang="en-US" smtClean="0"/>
+              <a:rPr lang="en-US"/>
               <a:t>Click to edit Master title style</a:t>
             </a:r>
-            <a:endParaRPr lang="en-US"/>
           </a:p>
         </p:txBody>
       </p:sp>
@@ -2837,7 +2837,7 @@
           <a:p>
             <a:pPr lvl="0"/>
             <a:r>
-              <a:rPr lang="en-US" smtClean="0"/>
+              <a:rPr lang="en-US"/>
               <a:t>Click to edit Master text styles</a:t>
             </a:r>
           </a:p>
@@ -2860,7 +2860,7 @@
           <a:p>
             <a:fld id="{78C97017-6FC3-485B-9764-EAC9E56C1D49}" type="datetimeFigureOut">
               <a:rPr lang="en-US" smtClean="0"/>
-              <a:t>10/16/2016</a:t>
+              <a:t>10/13/2017</a:t>
             </a:fld>
             <a:endParaRPr lang="en-US"/>
           </a:p>
@@ -2969,10 +2969,9 @@
           <a:lstStyle/>
           <a:p>
             <a:r>
-              <a:rPr lang="en-US" smtClean="0"/>
+              <a:rPr lang="en-US"/>
               <a:t>Click to edit Master title style</a:t>
             </a:r>
-            <a:endParaRPr lang="en-US"/>
           </a:p>
         </p:txBody>
       </p:sp>
@@ -3003,38 +3002,37 @@
           <a:p>
             <a:pPr lvl="0"/>
             <a:r>
-              <a:rPr lang="en-US" smtClean="0"/>
+              <a:rPr lang="en-US"/>
               <a:t>Click to edit Master text styles</a:t>
             </a:r>
           </a:p>
           <a:p>
             <a:pPr lvl="1"/>
             <a:r>
-              <a:rPr lang="en-US" smtClean="0"/>
+              <a:rPr lang="en-US"/>
               <a:t>Second level</a:t>
             </a:r>
           </a:p>
           <a:p>
             <a:pPr lvl="2"/>
             <a:r>
-              <a:rPr lang="en-US" smtClean="0"/>
+              <a:rPr lang="en-US"/>
               <a:t>Third level</a:t>
             </a:r>
           </a:p>
           <a:p>
             <a:pPr lvl="3"/>
             <a:r>
-              <a:rPr lang="en-US" smtClean="0"/>
+              <a:rPr lang="en-US"/>
               <a:t>Fourth level</a:t>
             </a:r>
           </a:p>
           <a:p>
             <a:pPr lvl="4"/>
             <a:r>
-              <a:rPr lang="en-US" smtClean="0"/>
+              <a:rPr lang="en-US"/>
               <a:t>Fifth level</a:t>
             </a:r>
-            <a:endParaRPr lang="en-US"/>
           </a:p>
         </p:txBody>
       </p:sp>
@@ -3073,7 +3071,7 @@
           <a:p>
             <a:fld id="{78C97017-6FC3-485B-9764-EAC9E56C1D49}" type="datetimeFigureOut">
               <a:rPr lang="en-US" smtClean="0"/>
-              <a:t>10/16/2016</a:t>
+              <a:t>10/13/2017</a:t>
             </a:fld>
             <a:endParaRPr lang="en-US"/>
           </a:p>
@@ -3492,7 +3490,7 @@
           <a:p>
             <a:pPr algn="ctr"/>
             <a:r>
-              <a:rPr lang="en-US" sz="1600" dirty="0" smtClean="0">
+              <a:rPr lang="en-US" sz="1600" dirty="0">
                 <a:solidFill>
                   <a:schemeClr val="bg1"/>
                 </a:solidFill>
@@ -3856,7 +3854,7 @@
           <a:p>
             <a:pPr algn="ctr"/>
             <a:r>
-              <a:rPr lang="en-US" sz="1600" dirty="0" smtClean="0">
+              <a:rPr lang="en-US" sz="1600" dirty="0">
                 <a:solidFill>
                   <a:schemeClr val="bg1"/>
                 </a:solidFill>
@@ -4003,7 +4001,7 @@
           <a:p>
             <a:pPr algn="ctr"/>
             <a:r>
-              <a:rPr lang="en-US" sz="1600" dirty="0" smtClean="0">
+              <a:rPr lang="en-US" sz="1600" dirty="0">
                 <a:solidFill>
                   <a:schemeClr val="bg1"/>
                 </a:solidFill>
@@ -4165,10 +4163,9 @@
           <a:lstStyle/>
           <a:p>
             <a:r>
-              <a:rPr lang="en-US" sz="1400" dirty="0" smtClean="0"/>
+              <a:rPr lang="en-US" sz="1400" dirty="0"/>
               <a:t>delete 1</a:t>
             </a:r>
-            <a:endParaRPr lang="en-US" sz="1400" dirty="0"/>
           </a:p>
         </p:txBody>
       </p:sp>
@@ -4231,18 +4228,13 @@
           <a:lstStyle/>
           <a:p>
             <a:r>
-              <a:rPr lang="en-US" sz="1400" dirty="0" smtClean="0">
+              <a:rPr lang="en-US" sz="1400" dirty="0">
                 <a:solidFill>
                   <a:srgbClr val="0070C0"/>
                 </a:solidFill>
               </a:rPr>
               <a:t>execute(“delete 1”)</a:t>
             </a:r>
-            <a:endParaRPr lang="en-US" sz="1400" dirty="0">
-              <a:solidFill>
-                <a:srgbClr val="0070C0"/>
-              </a:solidFill>
-            </a:endParaRPr>
           </a:p>
         </p:txBody>
       </p:sp>
@@ -4305,26 +4297,21 @@
           <a:lstStyle/>
           <a:p>
             <a:r>
-              <a:rPr lang="en-US" sz="1400" dirty="0" err="1" smtClean="0">
+              <a:rPr lang="en-US" sz="1400" dirty="0" err="1">
                 <a:solidFill>
                   <a:srgbClr val="7030A0"/>
                 </a:solidFill>
               </a:rPr>
-              <a:t>deletePerson</a:t>
-            </a:r>
-            <a:r>
-              <a:rPr lang="en-US" sz="1400" dirty="0" smtClean="0">
+              <a:t>deleteParcel</a:t>
+            </a:r>
+            <a:r>
+              <a:rPr lang="en-US" sz="1400" dirty="0">
                 <a:solidFill>
                   <a:srgbClr val="7030A0"/>
                 </a:solidFill>
               </a:rPr>
               <a:t>(p)</a:t>
             </a:r>
-            <a:endParaRPr lang="en-US" sz="1400" dirty="0">
-              <a:solidFill>
-                <a:srgbClr val="7030A0"/>
-              </a:solidFill>
-            </a:endParaRPr>
           </a:p>
         </p:txBody>
       </p:sp>
@@ -4351,7 +4338,7 @@
           <a:lstStyle/>
           <a:p>
             <a:r>
-              <a:rPr lang="en-US" sz="1400" dirty="0" smtClean="0">
+              <a:rPr lang="en-US" sz="1400" dirty="0">
                 <a:solidFill>
                   <a:schemeClr val="accent5">
                     <a:lumMod val="75000"/>
@@ -4361,7 +4348,7 @@
               <a:t>post(</a:t>
             </a:r>
             <a:r>
-              <a:rPr lang="en-US" sz="1400" dirty="0" err="1" smtClean="0">
+              <a:rPr lang="en-US" sz="1400" dirty="0" err="1">
                 <a:solidFill>
                   <a:schemeClr val="accent5">
                     <a:lumMod val="75000"/>
@@ -4371,7 +4358,7 @@
               <a:t>AddressBookChangedEvent</a:t>
             </a:r>
             <a:r>
-              <a:rPr lang="en-US" sz="1400" dirty="0" smtClean="0">
+              <a:rPr lang="en-US" sz="1400" dirty="0">
                 <a:solidFill>
                   <a:schemeClr val="accent5">
                     <a:lumMod val="75000"/>
@@ -4380,13 +4367,6 @@
               </a:rPr>
               <a:t>)</a:t>
             </a:r>
-            <a:endParaRPr lang="en-US" sz="1400" dirty="0">
-              <a:solidFill>
-                <a:schemeClr val="accent5">
-                  <a:lumMod val="75000"/>
-                </a:schemeClr>
-              </a:solidFill>
-            </a:endParaRPr>
           </a:p>
         </p:txBody>
       </p:sp>
@@ -4552,7 +4532,7 @@
           <a:p>
             <a:pPr algn="ctr"/>
             <a:r>
-              <a:rPr lang="en-US" sz="1600" dirty="0" smtClean="0">
+              <a:rPr lang="en-US" sz="1600" dirty="0">
                 <a:solidFill>
                   <a:schemeClr val="bg1"/>
                 </a:solidFill>
@@ -4560,7 +4540,7 @@
               <a:t>:</a:t>
             </a:r>
             <a:r>
-              <a:rPr lang="en-US" sz="1600" dirty="0" err="1" smtClean="0">
+              <a:rPr lang="en-US" sz="1600" dirty="0" err="1">
                 <a:solidFill>
                   <a:schemeClr val="bg1"/>
                 </a:solidFill>
@@ -4793,7 +4773,7 @@
           <a:p>
             <a:pPr algn="ctr"/>
             <a:r>
-              <a:rPr lang="en-US" sz="1600" dirty="0" smtClean="0">
+              <a:rPr lang="en-US" sz="1600" dirty="0">
                 <a:solidFill>
                   <a:schemeClr val="bg1"/>
                 </a:solidFill>
@@ -4925,7 +4905,7 @@
           <a:lstStyle/>
           <a:p>
             <a:r>
-              <a:rPr lang="en-US" sz="1400" dirty="0" smtClean="0">
+              <a:rPr lang="en-US" sz="1400" dirty="0">
                 <a:solidFill>
                   <a:schemeClr val="accent5">
                     <a:lumMod val="75000"/>
@@ -4935,7 +4915,7 @@
               <a:t>post(</a:t>
             </a:r>
             <a:r>
-              <a:rPr lang="en-US" sz="1400" dirty="0" err="1" smtClean="0">
+              <a:rPr lang="en-US" sz="1400" dirty="0" err="1">
                 <a:solidFill>
                   <a:schemeClr val="accent5">
                     <a:lumMod val="75000"/>
@@ -4945,7 +4925,7 @@
               <a:t>AddressBookChangedEvent</a:t>
             </a:r>
             <a:r>
-              <a:rPr lang="en-US" sz="1400" dirty="0" smtClean="0">
+              <a:rPr lang="en-US" sz="1400" dirty="0">
                 <a:solidFill>
                   <a:schemeClr val="accent5">
                     <a:lumMod val="75000"/>
@@ -4954,13 +4934,6 @@
               </a:rPr>
               <a:t>)</a:t>
             </a:r>
-            <a:endParaRPr lang="en-US" sz="1400" dirty="0">
-              <a:solidFill>
-                <a:schemeClr val="accent5">
-                  <a:lumMod val="75000"/>
-                </a:schemeClr>
-              </a:solidFill>
-            </a:endParaRPr>
           </a:p>
         </p:txBody>
       </p:sp>
@@ -5052,7 +5025,7 @@
           <a:p>
             <a:pPr algn="ctr"/>
             <a:r>
-              <a:rPr lang="en-US" sz="1600" dirty="0" smtClean="0">
+              <a:rPr lang="en-US" sz="1600" dirty="0">
                 <a:solidFill>
                   <a:schemeClr val="bg1"/>
                 </a:solidFill>
@@ -5060,7 +5033,7 @@
               <a:t>:</a:t>
             </a:r>
             <a:r>
-              <a:rPr lang="en-US" sz="1600" dirty="0" err="1" smtClean="0">
+              <a:rPr lang="en-US" sz="1600" dirty="0" err="1">
                 <a:solidFill>
                   <a:schemeClr val="bg1"/>
                 </a:solidFill>
@@ -5307,7 +5280,7 @@
           <a:lstStyle/>
           <a:p>
             <a:r>
-              <a:rPr lang="en-US" sz="1400" dirty="0" err="1" smtClean="0">
+              <a:rPr lang="en-US" sz="1400" dirty="0" err="1">
                 <a:solidFill>
                   <a:schemeClr val="accent6">
                     <a:lumMod val="75000"/>
@@ -5317,7 +5290,7 @@
               <a:t>handleAddresssBookChangedEvent</a:t>
             </a:r>
             <a:r>
-              <a:rPr lang="en-US" sz="1400" dirty="0" smtClean="0">
+              <a:rPr lang="en-US" sz="1400" dirty="0">
                 <a:solidFill>
                   <a:schemeClr val="accent6">
                     <a:lumMod val="75000"/>
@@ -5326,13 +5299,6 @@
               </a:rPr>
               <a:t>()</a:t>
             </a:r>
-            <a:endParaRPr lang="en-US" sz="1400" dirty="0">
-              <a:solidFill>
-                <a:schemeClr val="accent6">
-                  <a:lumMod val="75000"/>
-                </a:schemeClr>
-              </a:solidFill>
-            </a:endParaRPr>
           </a:p>
         </p:txBody>
       </p:sp>
@@ -5417,7 +5383,7 @@
           <a:p>
             <a:pPr algn="ctr"/>
             <a:r>
-              <a:rPr lang="en-US" sz="1600" dirty="0" smtClean="0">
+              <a:rPr lang="en-US" sz="1600" dirty="0">
                 <a:solidFill>
                   <a:schemeClr val="bg1"/>
                 </a:solidFill>
@@ -5620,7 +5586,7 @@
           <a:lstStyle/>
           <a:p>
             <a:r>
-              <a:rPr lang="en-US" sz="1400" dirty="0" err="1" smtClean="0">
+              <a:rPr lang="en-US" sz="1400" dirty="0" err="1">
                 <a:solidFill>
                   <a:srgbClr val="00B050"/>
                 </a:solidFill>
@@ -5628,18 +5594,13 @@
               <a:t>handleAddresssBookChangedEvent</a:t>
             </a:r>
             <a:r>
-              <a:rPr lang="en-US" sz="1400" dirty="0" smtClean="0">
+              <a:rPr lang="en-US" sz="1400" dirty="0">
                 <a:solidFill>
                   <a:srgbClr val="00B050"/>
                 </a:solidFill>
               </a:rPr>
               <a:t>()</a:t>
             </a:r>
-            <a:endParaRPr lang="en-US" sz="1400" dirty="0">
-              <a:solidFill>
-                <a:srgbClr val="00B050"/>
-              </a:solidFill>
-            </a:endParaRPr>
           </a:p>
         </p:txBody>
       </p:sp>
@@ -5826,18 +5787,13 @@
           <a:p>
             <a:pPr algn="r"/>
             <a:r>
-              <a:rPr lang="en-US" sz="1400" dirty="0" smtClean="0">
+              <a:rPr lang="en-US" sz="1400" dirty="0">
                 <a:solidFill>
                   <a:srgbClr val="00B050"/>
                 </a:solidFill>
               </a:rPr>
               <a:t>Update status bar</a:t>
             </a:r>
-            <a:endParaRPr lang="en-US" sz="1400" dirty="0">
-              <a:solidFill>
-                <a:srgbClr val="00B050"/>
-              </a:solidFill>
-            </a:endParaRPr>
           </a:p>
         </p:txBody>
       </p:sp>
@@ -6027,7 +5983,7 @@
           <a:lstStyle/>
           <a:p>
             <a:r>
-              <a:rPr lang="en-US" sz="1400" dirty="0" smtClean="0">
+              <a:rPr lang="en-US" sz="1400" dirty="0">
                 <a:solidFill>
                   <a:schemeClr val="accent6">
                     <a:lumMod val="75000"/>
@@ -6037,7 +5993,7 @@
               <a:t>Save </a:t>
             </a:r>
             <a:br>
-              <a:rPr lang="en-US" sz="1400" dirty="0" smtClean="0">
+              <a:rPr lang="en-US" sz="1400" dirty="0">
                 <a:solidFill>
                   <a:schemeClr val="accent6">
                     <a:lumMod val="75000"/>
@@ -6046,7 +6002,7 @@
               </a:rPr>
             </a:br>
             <a:r>
-              <a:rPr lang="en-US" sz="1400" dirty="0" smtClean="0">
+              <a:rPr lang="en-US" sz="1400" dirty="0">
                 <a:solidFill>
                   <a:schemeClr val="accent6">
                     <a:lumMod val="75000"/>
@@ -6055,13 +6011,6 @@
               </a:rPr>
               <a:t>to file</a:t>
             </a:r>
-            <a:endParaRPr lang="en-US" sz="1400" dirty="0">
-              <a:solidFill>
-                <a:schemeClr val="accent6">
-                  <a:lumMod val="75000"/>
-                </a:schemeClr>
-              </a:solidFill>
-            </a:endParaRPr>
           </a:p>
         </p:txBody>
       </p:sp>

</xml_diff>

<commit_message>
Update Developer Guide for new component: Security Update class diagram
</commit_message>
<xml_diff>
--- a/docs/diagrams/HighLevelSequenceDiagrams.pptx
+++ b/docs/diagrams/HighLevelSequenceDiagrams.pptx
@@ -107,7 +107,27 @@
       </a:defRPr>
     </a:lvl9pPr>
   </p:defaultTextStyle>
+  <p:extLst>
+    <p:ext uri="{EFAFB233-063F-42B5-8137-9DF3F51BA10A}">
+      <p15:sldGuideLst xmlns:p15="http://schemas.microsoft.com/office/powerpoint/2012/main">
+        <p15:guide id="1" orient="horz" pos="1488">
+          <p15:clr>
+            <a:srgbClr val="A4A3A4"/>
+          </p15:clr>
+        </p15:guide>
+        <p15:guide id="2" pos="2880">
+          <p15:clr>
+            <a:srgbClr val="A4A3A4"/>
+          </p15:clr>
+        </p15:guide>
+      </p15:sldGuideLst>
+    </p:ext>
+  </p:extLst>
 </p:presentation>
+</file>
+
+<file path=ppt/revisionInfo.xml><?xml version="1.0" encoding="utf-8"?>
+<p1510:revInfo xmlns:a="http://schemas.openxmlformats.org/drawingml/2006/main" xmlns:r="http://schemas.openxmlformats.org/officeDocument/2006/relationships" xmlns:p1510="http://schemas.microsoft.com/office/powerpoint/2015/10/main"/>
 </file>
 
 <file path=ppt/notesMasters/notesMaster1.xml><?xml version="1.0" encoding="utf-8"?>
@@ -192,7 +212,7 @@
           <a:p>
             <a:fld id="{F5CC4B3F-88C1-4FFA-B1B6-F41C21DC6924}" type="datetimeFigureOut">
               <a:rPr lang="en-US" smtClean="0"/>
-              <a:t>10/16/2016</a:t>
+              <a:t>10/20/2017</a:t>
             </a:fld>
             <a:endParaRPr lang="en-US"/>
           </a:p>
@@ -256,38 +276,37 @@
           <a:p>
             <a:pPr lvl="0"/>
             <a:r>
-              <a:rPr lang="en-US" smtClean="0"/>
+              <a:rPr lang="en-US"/>
               <a:t>Click to edit Master text styles</a:t>
             </a:r>
           </a:p>
           <a:p>
             <a:pPr lvl="1"/>
             <a:r>
-              <a:rPr lang="en-US" smtClean="0"/>
+              <a:rPr lang="en-US"/>
               <a:t>Second level</a:t>
             </a:r>
           </a:p>
           <a:p>
             <a:pPr lvl="2"/>
             <a:r>
-              <a:rPr lang="en-US" smtClean="0"/>
+              <a:rPr lang="en-US"/>
               <a:t>Third level</a:t>
             </a:r>
           </a:p>
           <a:p>
             <a:pPr lvl="3"/>
             <a:r>
-              <a:rPr lang="en-US" smtClean="0"/>
+              <a:rPr lang="en-US"/>
               <a:t>Fourth level</a:t>
             </a:r>
           </a:p>
           <a:p>
             <a:pPr lvl="4"/>
             <a:r>
-              <a:rPr lang="en-US" smtClean="0"/>
+              <a:rPr lang="en-US"/>
               <a:t>Fifth level</a:t>
             </a:r>
-            <a:endParaRPr lang="en-US"/>
           </a:p>
         </p:txBody>
       </p:sp>
@@ -460,6 +479,90 @@
 </p:notesMaster>
 </file>
 
+<file path=ppt/notesSlides/notesSlide1.xml><?xml version="1.0" encoding="utf-8"?>
+<p:notes xmlns:a="http://schemas.openxmlformats.org/drawingml/2006/main" xmlns:r="http://schemas.openxmlformats.org/officeDocument/2006/relationships" xmlns:p="http://schemas.openxmlformats.org/presentationml/2006/main">
+  <p:cSld>
+    <p:spTree>
+      <p:nvGrpSpPr>
+        <p:cNvPr id="1" name=""/>
+        <p:cNvGrpSpPr/>
+        <p:nvPr/>
+      </p:nvGrpSpPr>
+      <p:grpSpPr>
+        <a:xfrm>
+          <a:off x="0" y="0"/>
+          <a:ext cx="0" cy="0"/>
+          <a:chOff x="0" y="0"/>
+          <a:chExt cx="0" cy="0"/>
+        </a:xfrm>
+      </p:grpSpPr>
+      <p:sp>
+        <p:nvSpPr>
+          <p:cNvPr id="2" name="Slide Image Placeholder 1"/>
+          <p:cNvSpPr>
+            <a:spLocks noGrp="1" noRot="1" noChangeAspect="1"/>
+          </p:cNvSpPr>
+          <p:nvPr>
+            <p:ph type="sldImg"/>
+          </p:nvPr>
+        </p:nvSpPr>
+        <p:spPr/>
+      </p:sp>
+      <p:sp>
+        <p:nvSpPr>
+          <p:cNvPr id="3" name="Notes Placeholder 2"/>
+          <p:cNvSpPr>
+            <a:spLocks noGrp="1"/>
+          </p:cNvSpPr>
+          <p:nvPr>
+            <p:ph type="body" idx="1"/>
+          </p:nvPr>
+        </p:nvSpPr>
+        <p:spPr/>
+        <p:txBody>
+          <a:bodyPr/>
+          <a:lstStyle/>
+          <a:p>
+            <a:endParaRPr lang="en-SG" dirty="0"/>
+          </a:p>
+        </p:txBody>
+      </p:sp>
+      <p:sp>
+        <p:nvSpPr>
+          <p:cNvPr id="4" name="Slide Number Placeholder 3"/>
+          <p:cNvSpPr>
+            <a:spLocks noGrp="1"/>
+          </p:cNvSpPr>
+          <p:nvPr>
+            <p:ph type="sldNum" sz="quarter" idx="10"/>
+          </p:nvPr>
+        </p:nvSpPr>
+        <p:spPr/>
+        <p:txBody>
+          <a:bodyPr/>
+          <a:lstStyle/>
+          <a:p>
+            <a:fld id="{5A7AB025-77E3-4BD1-A2FD-B3183DBA47A3}" type="slidenum">
+              <a:rPr lang="en-US" smtClean="0"/>
+              <a:t>1</a:t>
+            </a:fld>
+            <a:endParaRPr lang="en-US"/>
+          </a:p>
+        </p:txBody>
+      </p:sp>
+    </p:spTree>
+    <p:extLst>
+      <p:ext uri="{BB962C8B-B14F-4D97-AF65-F5344CB8AC3E}">
+        <p14:creationId xmlns:p14="http://schemas.microsoft.com/office/powerpoint/2010/main" val="3609836974"/>
+      </p:ext>
+    </p:extLst>
+  </p:cSld>
+  <p:clrMapOvr>
+    <a:masterClrMapping/>
+  </p:clrMapOvr>
+</p:notes>
+</file>
+
 <file path=ppt/slideLayouts/slideLayout1.xml><?xml version="1.0" encoding="utf-8"?>
 <p:sldLayout xmlns:a="http://schemas.openxmlformats.org/drawingml/2006/main" xmlns:r="http://schemas.openxmlformats.org/officeDocument/2006/relationships" xmlns:p="http://schemas.openxmlformats.org/presentationml/2006/main" type="title" preserve="1">
   <p:cSld name="Title Slide">
@@ -498,10 +601,9 @@
           <a:lstStyle/>
           <a:p>
             <a:r>
-              <a:rPr lang="en-US" smtClean="0"/>
+              <a:rPr lang="en-US"/>
               <a:t>Click to edit Master title style</a:t>
             </a:r>
-            <a:endParaRPr lang="en-US"/>
           </a:p>
         </p:txBody>
       </p:sp>
@@ -617,10 +719,9 @@
           </a:lstStyle>
           <a:p>
             <a:r>
-              <a:rPr lang="en-US" smtClean="0"/>
+              <a:rPr lang="en-US"/>
               <a:t>Click to edit Master subtitle style</a:t>
             </a:r>
-            <a:endParaRPr lang="en-US"/>
           </a:p>
         </p:txBody>
       </p:sp>
@@ -641,7 +742,7 @@
           <a:p>
             <a:fld id="{78C97017-6FC3-485B-9764-EAC9E56C1D49}" type="datetimeFigureOut">
               <a:rPr lang="en-US" smtClean="0"/>
-              <a:t>10/16/2016</a:t>
+              <a:t>10/20/2017</a:t>
             </a:fld>
             <a:endParaRPr lang="en-US"/>
           </a:p>
@@ -735,10 +836,9 @@
           <a:lstStyle/>
           <a:p>
             <a:r>
-              <a:rPr lang="en-US" smtClean="0"/>
+              <a:rPr lang="en-US"/>
               <a:t>Click to edit Master title style</a:t>
             </a:r>
-            <a:endParaRPr lang="en-US"/>
           </a:p>
         </p:txBody>
       </p:sp>
@@ -759,38 +859,37 @@
           <a:p>
             <a:pPr lvl="0"/>
             <a:r>
-              <a:rPr lang="en-US" smtClean="0"/>
+              <a:rPr lang="en-US"/>
               <a:t>Click to edit Master text styles</a:t>
             </a:r>
           </a:p>
           <a:p>
             <a:pPr lvl="1"/>
             <a:r>
-              <a:rPr lang="en-US" smtClean="0"/>
+              <a:rPr lang="en-US"/>
               <a:t>Second level</a:t>
             </a:r>
           </a:p>
           <a:p>
             <a:pPr lvl="2"/>
             <a:r>
-              <a:rPr lang="en-US" smtClean="0"/>
+              <a:rPr lang="en-US"/>
               <a:t>Third level</a:t>
             </a:r>
           </a:p>
           <a:p>
             <a:pPr lvl="3"/>
             <a:r>
-              <a:rPr lang="en-US" smtClean="0"/>
+              <a:rPr lang="en-US"/>
               <a:t>Fourth level</a:t>
             </a:r>
           </a:p>
           <a:p>
             <a:pPr lvl="4"/>
             <a:r>
-              <a:rPr lang="en-US" smtClean="0"/>
+              <a:rPr lang="en-US"/>
               <a:t>Fifth level</a:t>
             </a:r>
-            <a:endParaRPr lang="en-US"/>
           </a:p>
         </p:txBody>
       </p:sp>
@@ -811,7 +910,7 @@
           <a:p>
             <a:fld id="{78C97017-6FC3-485B-9764-EAC9E56C1D49}" type="datetimeFigureOut">
               <a:rPr lang="en-US" smtClean="0"/>
-              <a:t>10/16/2016</a:t>
+              <a:t>10/20/2017</a:t>
             </a:fld>
             <a:endParaRPr lang="en-US"/>
           </a:p>
@@ -910,10 +1009,9 @@
           <a:lstStyle/>
           <a:p>
             <a:r>
-              <a:rPr lang="en-US" smtClean="0"/>
+              <a:rPr lang="en-US"/>
               <a:t>Click to edit Master title style</a:t>
             </a:r>
-            <a:endParaRPr lang="en-US"/>
           </a:p>
         </p:txBody>
       </p:sp>
@@ -939,38 +1037,37 @@
           <a:p>
             <a:pPr lvl="0"/>
             <a:r>
-              <a:rPr lang="en-US" smtClean="0"/>
+              <a:rPr lang="en-US"/>
               <a:t>Click to edit Master text styles</a:t>
             </a:r>
           </a:p>
           <a:p>
             <a:pPr lvl="1"/>
             <a:r>
-              <a:rPr lang="en-US" smtClean="0"/>
+              <a:rPr lang="en-US"/>
               <a:t>Second level</a:t>
             </a:r>
           </a:p>
           <a:p>
             <a:pPr lvl="2"/>
             <a:r>
-              <a:rPr lang="en-US" smtClean="0"/>
+              <a:rPr lang="en-US"/>
               <a:t>Third level</a:t>
             </a:r>
           </a:p>
           <a:p>
             <a:pPr lvl="3"/>
             <a:r>
-              <a:rPr lang="en-US" smtClean="0"/>
+              <a:rPr lang="en-US"/>
               <a:t>Fourth level</a:t>
             </a:r>
           </a:p>
           <a:p>
             <a:pPr lvl="4"/>
             <a:r>
-              <a:rPr lang="en-US" smtClean="0"/>
+              <a:rPr lang="en-US"/>
               <a:t>Fifth level</a:t>
             </a:r>
-            <a:endParaRPr lang="en-US"/>
           </a:p>
         </p:txBody>
       </p:sp>
@@ -991,7 +1088,7 @@
           <a:p>
             <a:fld id="{78C97017-6FC3-485B-9764-EAC9E56C1D49}" type="datetimeFigureOut">
               <a:rPr lang="en-US" smtClean="0"/>
-              <a:t>10/16/2016</a:t>
+              <a:t>10/20/2017</a:t>
             </a:fld>
             <a:endParaRPr lang="en-US"/>
           </a:p>
@@ -1085,10 +1182,9 @@
           <a:lstStyle/>
           <a:p>
             <a:r>
-              <a:rPr lang="en-US" smtClean="0"/>
+              <a:rPr lang="en-US"/>
               <a:t>Click to edit Master title style</a:t>
             </a:r>
-            <a:endParaRPr lang="en-US"/>
           </a:p>
         </p:txBody>
       </p:sp>
@@ -1109,38 +1205,37 @@
           <a:p>
             <a:pPr lvl="0"/>
             <a:r>
-              <a:rPr lang="en-US" smtClean="0"/>
+              <a:rPr lang="en-US"/>
               <a:t>Click to edit Master text styles</a:t>
             </a:r>
           </a:p>
           <a:p>
             <a:pPr lvl="1"/>
             <a:r>
-              <a:rPr lang="en-US" smtClean="0"/>
+              <a:rPr lang="en-US"/>
               <a:t>Second level</a:t>
             </a:r>
           </a:p>
           <a:p>
             <a:pPr lvl="2"/>
             <a:r>
-              <a:rPr lang="en-US" smtClean="0"/>
+              <a:rPr lang="en-US"/>
               <a:t>Third level</a:t>
             </a:r>
           </a:p>
           <a:p>
             <a:pPr lvl="3"/>
             <a:r>
-              <a:rPr lang="en-US" smtClean="0"/>
+              <a:rPr lang="en-US"/>
               <a:t>Fourth level</a:t>
             </a:r>
           </a:p>
           <a:p>
             <a:pPr lvl="4"/>
             <a:r>
-              <a:rPr lang="en-US" smtClean="0"/>
+              <a:rPr lang="en-US"/>
               <a:t>Fifth level</a:t>
             </a:r>
-            <a:endParaRPr lang="en-US"/>
           </a:p>
         </p:txBody>
       </p:sp>
@@ -1161,7 +1256,7 @@
           <a:p>
             <a:fld id="{78C97017-6FC3-485B-9764-EAC9E56C1D49}" type="datetimeFigureOut">
               <a:rPr lang="en-US" smtClean="0"/>
-              <a:t>10/16/2016</a:t>
+              <a:t>10/20/2017</a:t>
             </a:fld>
             <a:endParaRPr lang="en-US"/>
           </a:p>
@@ -1264,10 +1359,9 @@
           </a:lstStyle>
           <a:p>
             <a:r>
-              <a:rPr lang="en-US" smtClean="0"/>
+              <a:rPr lang="en-US"/>
               <a:t>Click to edit Master title style</a:t>
             </a:r>
-            <a:endParaRPr lang="en-US"/>
           </a:p>
         </p:txBody>
       </p:sp>
@@ -1384,7 +1478,7 @@
           <a:p>
             <a:pPr lvl="0"/>
             <a:r>
-              <a:rPr lang="en-US" smtClean="0"/>
+              <a:rPr lang="en-US"/>
               <a:t>Click to edit Master text styles</a:t>
             </a:r>
           </a:p>
@@ -1407,7 +1501,7 @@
           <a:p>
             <a:fld id="{78C97017-6FC3-485B-9764-EAC9E56C1D49}" type="datetimeFigureOut">
               <a:rPr lang="en-US" smtClean="0"/>
-              <a:t>10/16/2016</a:t>
+              <a:t>10/20/2017</a:t>
             </a:fld>
             <a:endParaRPr lang="en-US"/>
           </a:p>
@@ -1501,10 +1595,9 @@
           <a:lstStyle/>
           <a:p>
             <a:r>
-              <a:rPr lang="en-US" smtClean="0"/>
+              <a:rPr lang="en-US"/>
               <a:t>Click to edit Master title style</a:t>
             </a:r>
-            <a:endParaRPr lang="en-US"/>
           </a:p>
         </p:txBody>
       </p:sp>
@@ -1558,38 +1651,37 @@
           <a:p>
             <a:pPr lvl="0"/>
             <a:r>
-              <a:rPr lang="en-US" smtClean="0"/>
+              <a:rPr lang="en-US"/>
               <a:t>Click to edit Master text styles</a:t>
             </a:r>
           </a:p>
           <a:p>
             <a:pPr lvl="1"/>
             <a:r>
-              <a:rPr lang="en-US" smtClean="0"/>
+              <a:rPr lang="en-US"/>
               <a:t>Second level</a:t>
             </a:r>
           </a:p>
           <a:p>
             <a:pPr lvl="2"/>
             <a:r>
-              <a:rPr lang="en-US" smtClean="0"/>
+              <a:rPr lang="en-US"/>
               <a:t>Third level</a:t>
             </a:r>
           </a:p>
           <a:p>
             <a:pPr lvl="3"/>
             <a:r>
-              <a:rPr lang="en-US" smtClean="0"/>
+              <a:rPr lang="en-US"/>
               <a:t>Fourth level</a:t>
             </a:r>
           </a:p>
           <a:p>
             <a:pPr lvl="4"/>
             <a:r>
-              <a:rPr lang="en-US" smtClean="0"/>
+              <a:rPr lang="en-US"/>
               <a:t>Fifth level</a:t>
             </a:r>
-            <a:endParaRPr lang="en-US"/>
           </a:p>
         </p:txBody>
       </p:sp>
@@ -1643,38 +1735,37 @@
           <a:p>
             <a:pPr lvl="0"/>
             <a:r>
-              <a:rPr lang="en-US" smtClean="0"/>
+              <a:rPr lang="en-US"/>
               <a:t>Click to edit Master text styles</a:t>
             </a:r>
           </a:p>
           <a:p>
             <a:pPr lvl="1"/>
             <a:r>
-              <a:rPr lang="en-US" smtClean="0"/>
+              <a:rPr lang="en-US"/>
               <a:t>Second level</a:t>
             </a:r>
           </a:p>
           <a:p>
             <a:pPr lvl="2"/>
             <a:r>
-              <a:rPr lang="en-US" smtClean="0"/>
+              <a:rPr lang="en-US"/>
               <a:t>Third level</a:t>
             </a:r>
           </a:p>
           <a:p>
             <a:pPr lvl="3"/>
             <a:r>
-              <a:rPr lang="en-US" smtClean="0"/>
+              <a:rPr lang="en-US"/>
               <a:t>Fourth level</a:t>
             </a:r>
           </a:p>
           <a:p>
             <a:pPr lvl="4"/>
             <a:r>
-              <a:rPr lang="en-US" smtClean="0"/>
+              <a:rPr lang="en-US"/>
               <a:t>Fifth level</a:t>
             </a:r>
-            <a:endParaRPr lang="en-US"/>
           </a:p>
         </p:txBody>
       </p:sp>
@@ -1695,7 +1786,7 @@
           <a:p>
             <a:fld id="{78C97017-6FC3-485B-9764-EAC9E56C1D49}" type="datetimeFigureOut">
               <a:rPr lang="en-US" smtClean="0"/>
-              <a:t>10/16/2016</a:t>
+              <a:t>10/20/2017</a:t>
             </a:fld>
             <a:endParaRPr lang="en-US"/>
           </a:p>
@@ -1793,10 +1884,9 @@
           </a:lstStyle>
           <a:p>
             <a:r>
-              <a:rPr lang="en-US" smtClean="0"/>
+              <a:rPr lang="en-US"/>
               <a:t>Click to edit Master title style</a:t>
             </a:r>
-            <a:endParaRPr lang="en-US"/>
           </a:p>
         </p:txBody>
       </p:sp>
@@ -1859,7 +1949,7 @@
           <a:p>
             <a:pPr lvl="0"/>
             <a:r>
-              <a:rPr lang="en-US" smtClean="0"/>
+              <a:rPr lang="en-US"/>
               <a:t>Click to edit Master text styles</a:t>
             </a:r>
           </a:p>
@@ -1915,38 +2005,37 @@
           <a:p>
             <a:pPr lvl="0"/>
             <a:r>
-              <a:rPr lang="en-US" smtClean="0"/>
+              <a:rPr lang="en-US"/>
               <a:t>Click to edit Master text styles</a:t>
             </a:r>
           </a:p>
           <a:p>
             <a:pPr lvl="1"/>
             <a:r>
-              <a:rPr lang="en-US" smtClean="0"/>
+              <a:rPr lang="en-US"/>
               <a:t>Second level</a:t>
             </a:r>
           </a:p>
           <a:p>
             <a:pPr lvl="2"/>
             <a:r>
-              <a:rPr lang="en-US" smtClean="0"/>
+              <a:rPr lang="en-US"/>
               <a:t>Third level</a:t>
             </a:r>
           </a:p>
           <a:p>
             <a:pPr lvl="3"/>
             <a:r>
-              <a:rPr lang="en-US" smtClean="0"/>
+              <a:rPr lang="en-US"/>
               <a:t>Fourth level</a:t>
             </a:r>
           </a:p>
           <a:p>
             <a:pPr lvl="4"/>
             <a:r>
-              <a:rPr lang="en-US" smtClean="0"/>
+              <a:rPr lang="en-US"/>
               <a:t>Fifth level</a:t>
             </a:r>
-            <a:endParaRPr lang="en-US"/>
           </a:p>
         </p:txBody>
       </p:sp>
@@ -2009,7 +2098,7 @@
           <a:p>
             <a:pPr lvl="0"/>
             <a:r>
-              <a:rPr lang="en-US" smtClean="0"/>
+              <a:rPr lang="en-US"/>
               <a:t>Click to edit Master text styles</a:t>
             </a:r>
           </a:p>
@@ -2065,38 +2154,37 @@
           <a:p>
             <a:pPr lvl="0"/>
             <a:r>
-              <a:rPr lang="en-US" smtClean="0"/>
+              <a:rPr lang="en-US"/>
               <a:t>Click to edit Master text styles</a:t>
             </a:r>
           </a:p>
           <a:p>
             <a:pPr lvl="1"/>
             <a:r>
-              <a:rPr lang="en-US" smtClean="0"/>
+              <a:rPr lang="en-US"/>
               <a:t>Second level</a:t>
             </a:r>
           </a:p>
           <a:p>
             <a:pPr lvl="2"/>
             <a:r>
-              <a:rPr lang="en-US" smtClean="0"/>
+              <a:rPr lang="en-US"/>
               <a:t>Third level</a:t>
             </a:r>
           </a:p>
           <a:p>
             <a:pPr lvl="3"/>
             <a:r>
-              <a:rPr lang="en-US" smtClean="0"/>
+              <a:rPr lang="en-US"/>
               <a:t>Fourth level</a:t>
             </a:r>
           </a:p>
           <a:p>
             <a:pPr lvl="4"/>
             <a:r>
-              <a:rPr lang="en-US" smtClean="0"/>
+              <a:rPr lang="en-US"/>
               <a:t>Fifth level</a:t>
             </a:r>
-            <a:endParaRPr lang="en-US"/>
           </a:p>
         </p:txBody>
       </p:sp>
@@ -2117,7 +2205,7 @@
           <a:p>
             <a:fld id="{78C97017-6FC3-485B-9764-EAC9E56C1D49}" type="datetimeFigureOut">
               <a:rPr lang="en-US" smtClean="0"/>
-              <a:t>10/16/2016</a:t>
+              <a:t>10/20/2017</a:t>
             </a:fld>
             <a:endParaRPr lang="en-US"/>
           </a:p>
@@ -2211,10 +2299,9 @@
           <a:lstStyle/>
           <a:p>
             <a:r>
-              <a:rPr lang="en-US" smtClean="0"/>
+              <a:rPr lang="en-US"/>
               <a:t>Click to edit Master title style</a:t>
             </a:r>
-            <a:endParaRPr lang="en-US"/>
           </a:p>
         </p:txBody>
       </p:sp>
@@ -2235,7 +2322,7 @@
           <a:p>
             <a:fld id="{78C97017-6FC3-485B-9764-EAC9E56C1D49}" type="datetimeFigureOut">
               <a:rPr lang="en-US" smtClean="0"/>
-              <a:t>10/16/2016</a:t>
+              <a:t>10/20/2017</a:t>
             </a:fld>
             <a:endParaRPr lang="en-US"/>
           </a:p>
@@ -2330,7 +2417,7 @@
           <a:p>
             <a:fld id="{78C97017-6FC3-485B-9764-EAC9E56C1D49}" type="datetimeFigureOut">
               <a:rPr lang="en-US" smtClean="0"/>
-              <a:t>10/16/2016</a:t>
+              <a:t>10/20/2017</a:t>
             </a:fld>
             <a:endParaRPr lang="en-US"/>
           </a:p>
@@ -2433,10 +2520,9 @@
           </a:lstStyle>
           <a:p>
             <a:r>
-              <a:rPr lang="en-US" smtClean="0"/>
+              <a:rPr lang="en-US"/>
               <a:t>Click to edit Master title style</a:t>
             </a:r>
-            <a:endParaRPr lang="en-US"/>
           </a:p>
         </p:txBody>
       </p:sp>
@@ -2490,38 +2576,37 @@
           <a:p>
             <a:pPr lvl="0"/>
             <a:r>
-              <a:rPr lang="en-US" smtClean="0"/>
+              <a:rPr lang="en-US"/>
               <a:t>Click to edit Master text styles</a:t>
             </a:r>
           </a:p>
           <a:p>
             <a:pPr lvl="1"/>
             <a:r>
-              <a:rPr lang="en-US" smtClean="0"/>
+              <a:rPr lang="en-US"/>
               <a:t>Second level</a:t>
             </a:r>
           </a:p>
           <a:p>
             <a:pPr lvl="2"/>
             <a:r>
-              <a:rPr lang="en-US" smtClean="0"/>
+              <a:rPr lang="en-US"/>
               <a:t>Third level</a:t>
             </a:r>
           </a:p>
           <a:p>
             <a:pPr lvl="3"/>
             <a:r>
-              <a:rPr lang="en-US" smtClean="0"/>
+              <a:rPr lang="en-US"/>
               <a:t>Fourth level</a:t>
             </a:r>
           </a:p>
           <a:p>
             <a:pPr lvl="4"/>
             <a:r>
-              <a:rPr lang="en-US" smtClean="0"/>
+              <a:rPr lang="en-US"/>
               <a:t>Fifth level</a:t>
             </a:r>
-            <a:endParaRPr lang="en-US"/>
           </a:p>
         </p:txBody>
       </p:sp>
@@ -2584,7 +2669,7 @@
           <a:p>
             <a:pPr lvl="0"/>
             <a:r>
-              <a:rPr lang="en-US" smtClean="0"/>
+              <a:rPr lang="en-US"/>
               <a:t>Click to edit Master text styles</a:t>
             </a:r>
           </a:p>
@@ -2607,7 +2692,7 @@
           <a:p>
             <a:fld id="{78C97017-6FC3-485B-9764-EAC9E56C1D49}" type="datetimeFigureOut">
               <a:rPr lang="en-US" smtClean="0"/>
-              <a:t>10/16/2016</a:t>
+              <a:t>10/20/2017</a:t>
             </a:fld>
             <a:endParaRPr lang="en-US"/>
           </a:p>
@@ -2710,10 +2795,9 @@
           </a:lstStyle>
           <a:p>
             <a:r>
-              <a:rPr lang="en-US" smtClean="0"/>
+              <a:rPr lang="en-US"/>
               <a:t>Click to edit Master title style</a:t>
             </a:r>
-            <a:endParaRPr lang="en-US"/>
           </a:p>
         </p:txBody>
       </p:sp>
@@ -2837,7 +2921,7 @@
           <a:p>
             <a:pPr lvl="0"/>
             <a:r>
-              <a:rPr lang="en-US" smtClean="0"/>
+              <a:rPr lang="en-US"/>
               <a:t>Click to edit Master text styles</a:t>
             </a:r>
           </a:p>
@@ -2860,7 +2944,7 @@
           <a:p>
             <a:fld id="{78C97017-6FC3-485B-9764-EAC9E56C1D49}" type="datetimeFigureOut">
               <a:rPr lang="en-US" smtClean="0"/>
-              <a:t>10/16/2016</a:t>
+              <a:t>10/20/2017</a:t>
             </a:fld>
             <a:endParaRPr lang="en-US"/>
           </a:p>
@@ -2969,10 +3053,9 @@
           <a:lstStyle/>
           <a:p>
             <a:r>
-              <a:rPr lang="en-US" smtClean="0"/>
+              <a:rPr lang="en-US"/>
               <a:t>Click to edit Master title style</a:t>
             </a:r>
-            <a:endParaRPr lang="en-US"/>
           </a:p>
         </p:txBody>
       </p:sp>
@@ -3003,38 +3086,37 @@
           <a:p>
             <a:pPr lvl="0"/>
             <a:r>
-              <a:rPr lang="en-US" smtClean="0"/>
+              <a:rPr lang="en-US"/>
               <a:t>Click to edit Master text styles</a:t>
             </a:r>
           </a:p>
           <a:p>
             <a:pPr lvl="1"/>
             <a:r>
-              <a:rPr lang="en-US" smtClean="0"/>
+              <a:rPr lang="en-US"/>
               <a:t>Second level</a:t>
             </a:r>
           </a:p>
           <a:p>
             <a:pPr lvl="2"/>
             <a:r>
-              <a:rPr lang="en-US" smtClean="0"/>
+              <a:rPr lang="en-US"/>
               <a:t>Third level</a:t>
             </a:r>
           </a:p>
           <a:p>
             <a:pPr lvl="3"/>
             <a:r>
-              <a:rPr lang="en-US" smtClean="0"/>
+              <a:rPr lang="en-US"/>
               <a:t>Fourth level</a:t>
             </a:r>
           </a:p>
           <a:p>
             <a:pPr lvl="4"/>
             <a:r>
-              <a:rPr lang="en-US" smtClean="0"/>
+              <a:rPr lang="en-US"/>
               <a:t>Fifth level</a:t>
             </a:r>
-            <a:endParaRPr lang="en-US"/>
           </a:p>
         </p:txBody>
       </p:sp>
@@ -3073,7 +3155,7 @@
           <a:p>
             <a:fld id="{78C97017-6FC3-485B-9764-EAC9E56C1D49}" type="datetimeFigureOut">
               <a:rPr lang="en-US" smtClean="0"/>
-              <a:t>10/16/2016</a:t>
+              <a:t>10/20/2017</a:t>
             </a:fld>
             <a:endParaRPr lang="en-US"/>
           </a:p>
@@ -3492,7 +3574,7 @@
           <a:p>
             <a:pPr algn="ctr"/>
             <a:r>
-              <a:rPr lang="en-US" sz="1600" dirty="0" smtClean="0">
+              <a:rPr lang="en-US" sz="1600" dirty="0">
                 <a:solidFill>
                   <a:schemeClr val="bg1"/>
                 </a:solidFill>
@@ -3552,8 +3634,8 @@
         </p:nvSpPr>
         <p:spPr>
           <a:xfrm>
-            <a:off x="1586669" y="1322292"/>
-            <a:ext cx="152400" cy="1019910"/>
+            <a:off x="1572899" y="1212455"/>
+            <a:ext cx="166170" cy="1225945"/>
           </a:xfrm>
           <a:prstGeom prst="rect">
             <a:avLst/>
@@ -3820,7 +3902,7 @@
         </p:nvSpPr>
         <p:spPr>
           <a:xfrm>
-            <a:off x="3335583" y="611613"/>
+            <a:off x="2862226" y="612785"/>
             <a:ext cx="1093635" cy="346760"/>
           </a:xfrm>
           <a:prstGeom prst="rect">
@@ -3856,7 +3938,7 @@
           <a:p>
             <a:pPr algn="ctr"/>
             <a:r>
-              <a:rPr lang="en-US" sz="1600" dirty="0" smtClean="0">
+              <a:rPr lang="en-US" sz="1600" dirty="0">
                 <a:solidFill>
                   <a:schemeClr val="bg1"/>
                 </a:solidFill>
@@ -3879,7 +3961,7 @@
         </p:nvCxnSpPr>
         <p:spPr>
           <a:xfrm>
-            <a:off x="3882400" y="975284"/>
+            <a:off x="3402557" y="975284"/>
             <a:ext cx="0" cy="1723059"/>
           </a:xfrm>
           <a:prstGeom prst="line">
@@ -3916,8 +3998,8 @@
         </p:nvSpPr>
         <p:spPr>
           <a:xfrm>
-            <a:off x="3810392" y="1433477"/>
-            <a:ext cx="144016" cy="832525"/>
+            <a:off x="3322594" y="1295400"/>
+            <a:ext cx="161103" cy="1036758"/>
           </a:xfrm>
           <a:prstGeom prst="rect">
             <a:avLst/>
@@ -4003,7 +4085,7 @@
           <a:p>
             <a:pPr algn="ctr"/>
             <a:r>
-              <a:rPr lang="en-US" sz="1600" dirty="0" smtClean="0">
+              <a:rPr lang="en-US" sz="1600" dirty="0">
                 <a:solidFill>
                   <a:schemeClr val="bg1"/>
                 </a:solidFill>
@@ -4063,8 +4145,8 @@
         </p:nvSpPr>
         <p:spPr>
           <a:xfrm>
-            <a:off x="5791592" y="1538408"/>
-            <a:ext cx="142006" cy="651394"/>
+            <a:off x="5791592" y="1828800"/>
+            <a:ext cx="130038" cy="361001"/>
           </a:xfrm>
           <a:prstGeom prst="rect">
             <a:avLst/>
@@ -4114,7 +4196,7 @@
         </p:nvCxnSpPr>
         <p:spPr>
           <a:xfrm>
-            <a:off x="466818" y="1325979"/>
+            <a:off x="466818" y="1212455"/>
             <a:ext cx="1119851" cy="0"/>
           </a:xfrm>
           <a:prstGeom prst="straightConnector1">
@@ -4150,7 +4232,7 @@
         </p:nvSpPr>
         <p:spPr>
           <a:xfrm>
-            <a:off x="466818" y="1345880"/>
+            <a:off x="466818" y="1232356"/>
             <a:ext cx="860170" cy="215444"/>
           </a:xfrm>
           <a:prstGeom prst="rect">
@@ -4165,23 +4247,24 @@
           <a:lstStyle/>
           <a:p>
             <a:r>
-              <a:rPr lang="en-US" sz="1400" dirty="0" smtClean="0"/>
+              <a:rPr lang="en-US" sz="1400" dirty="0"/>
               <a:t>delete 1</a:t>
             </a:r>
-            <a:endParaRPr lang="en-US" sz="1400" dirty="0"/>
           </a:p>
         </p:txBody>
       </p:sp>
       <p:cxnSp>
         <p:nvCxnSpPr>
           <p:cNvPr id="25" name="Straight Arrow Connector 24"/>
-          <p:cNvCxnSpPr/>
+          <p:cNvCxnSpPr>
+            <a:cxnSpLocks/>
+          </p:cNvCxnSpPr>
           <p:nvPr/>
         </p:nvCxnSpPr>
         <p:spPr>
           <a:xfrm>
-            <a:off x="1739069" y="1433478"/>
-            <a:ext cx="2071323" cy="0"/>
+            <a:off x="1739069" y="1295400"/>
+            <a:ext cx="1596514" cy="0"/>
           </a:xfrm>
           <a:prstGeom prst="straightConnector1">
             <a:avLst/>
@@ -4216,7 +4299,7 @@
         </p:nvSpPr>
         <p:spPr>
           <a:xfrm>
-            <a:off x="2166172" y="1453379"/>
+            <a:off x="1793377" y="1295400"/>
             <a:ext cx="1424846" cy="215444"/>
           </a:xfrm>
           <a:prstGeom prst="rect">
@@ -4231,31 +4314,28 @@
           <a:lstStyle/>
           <a:p>
             <a:r>
-              <a:rPr lang="en-US" sz="1400" dirty="0" smtClean="0">
+              <a:rPr lang="en-US" sz="1400" dirty="0">
                 <a:solidFill>
                   <a:srgbClr val="0070C0"/>
                 </a:solidFill>
               </a:rPr>
               <a:t>execute(“delete 1”)</a:t>
             </a:r>
-            <a:endParaRPr lang="en-US" sz="1400" dirty="0">
-              <a:solidFill>
-                <a:srgbClr val="0070C0"/>
-              </a:solidFill>
-            </a:endParaRPr>
           </a:p>
         </p:txBody>
       </p:sp>
       <p:cxnSp>
         <p:nvCxnSpPr>
           <p:cNvPr id="28" name="Straight Arrow Connector 27"/>
-          <p:cNvCxnSpPr/>
+          <p:cNvCxnSpPr>
+            <a:cxnSpLocks/>
+          </p:cNvCxnSpPr>
           <p:nvPr/>
         </p:nvCxnSpPr>
         <p:spPr>
           <a:xfrm>
-            <a:off x="3954408" y="1538409"/>
-            <a:ext cx="1837184" cy="0"/>
+            <a:off x="3466131" y="1371600"/>
+            <a:ext cx="1060598" cy="0"/>
           </a:xfrm>
           <a:prstGeom prst="straightConnector1">
             <a:avLst/>
@@ -4290,8 +4370,8 @@
         </p:nvSpPr>
         <p:spPr>
           <a:xfrm>
-            <a:off x="4299772" y="1542583"/>
-            <a:ext cx="1424846" cy="215444"/>
+            <a:off x="4620813" y="1849728"/>
+            <a:ext cx="1156500" cy="215444"/>
           </a:xfrm>
           <a:prstGeom prst="rect">
             <a:avLst/>
@@ -4305,7 +4385,7 @@
           <a:lstStyle/>
           <a:p>
             <a:r>
-              <a:rPr lang="en-US" sz="1400" dirty="0" err="1" smtClean="0">
+              <a:rPr lang="en-US" sz="1400" dirty="0" err="1">
                 <a:solidFill>
                   <a:srgbClr val="7030A0"/>
                 </a:solidFill>
@@ -4313,18 +4393,13 @@
               <a:t>deletePerson</a:t>
             </a:r>
             <a:r>
-              <a:rPr lang="en-US" sz="1400" dirty="0" smtClean="0">
+              <a:rPr lang="en-US" sz="1400" dirty="0">
                 <a:solidFill>
                   <a:srgbClr val="7030A0"/>
                 </a:solidFill>
               </a:rPr>
               <a:t>(p)</a:t>
             </a:r>
-            <a:endParaRPr lang="en-US" sz="1400" dirty="0">
-              <a:solidFill>
-                <a:srgbClr val="7030A0"/>
-              </a:solidFill>
-            </a:endParaRPr>
           </a:p>
         </p:txBody>
       </p:sp>
@@ -4336,7 +4411,7 @@
         </p:nvSpPr>
         <p:spPr>
           <a:xfrm>
-            <a:off x="6074030" y="1687656"/>
+            <a:off x="6042076" y="1726430"/>
             <a:ext cx="2438400" cy="215444"/>
           </a:xfrm>
           <a:prstGeom prst="rect">
@@ -4351,7 +4426,7 @@
           <a:lstStyle/>
           <a:p>
             <a:r>
-              <a:rPr lang="en-US" sz="1400" dirty="0" smtClean="0">
+              <a:rPr lang="en-US" sz="1400" dirty="0">
                 <a:solidFill>
                   <a:schemeClr val="accent5">
                     <a:lumMod val="75000"/>
@@ -4361,7 +4436,7 @@
               <a:t>post(</a:t>
             </a:r>
             <a:r>
-              <a:rPr lang="en-US" sz="1400" dirty="0" err="1" smtClean="0">
+              <a:rPr lang="en-US" sz="1400" dirty="0" err="1">
                 <a:solidFill>
                   <a:schemeClr val="accent5">
                     <a:lumMod val="75000"/>
@@ -4371,7 +4446,7 @@
               <a:t>AddressBookChangedEvent</a:t>
             </a:r>
             <a:r>
-              <a:rPr lang="en-US" sz="1400" dirty="0" smtClean="0">
+              <a:rPr lang="en-US" sz="1400" dirty="0">
                 <a:solidFill>
                   <a:schemeClr val="accent5">
                     <a:lumMod val="75000"/>
@@ -4380,26 +4455,21 @@
               </a:rPr>
               <a:t>)</a:t>
             </a:r>
-            <a:endParaRPr lang="en-US" sz="1400" dirty="0">
-              <a:solidFill>
-                <a:schemeClr val="accent5">
-                  <a:lumMod val="75000"/>
-                </a:schemeClr>
-              </a:solidFill>
-            </a:endParaRPr>
           </a:p>
         </p:txBody>
       </p:sp>
       <p:cxnSp>
         <p:nvCxnSpPr>
           <p:cNvPr id="34" name="Straight Arrow Connector 33"/>
-          <p:cNvCxnSpPr/>
+          <p:cNvCxnSpPr>
+            <a:cxnSpLocks/>
+          </p:cNvCxnSpPr>
           <p:nvPr/>
         </p:nvCxnSpPr>
         <p:spPr>
           <a:xfrm>
-            <a:off x="3954408" y="2190681"/>
-            <a:ext cx="1837184" cy="0"/>
+            <a:off x="3474565" y="2189801"/>
+            <a:ext cx="2317027" cy="880"/>
           </a:xfrm>
           <a:prstGeom prst="straightConnector1">
             <a:avLst/>
@@ -4431,13 +4501,16 @@
       <p:cxnSp>
         <p:nvCxnSpPr>
           <p:cNvPr id="35" name="Straight Arrow Connector 34"/>
-          <p:cNvCxnSpPr/>
+          <p:cNvCxnSpPr>
+            <a:cxnSpLocks/>
+            <a:endCxn id="18" idx="2"/>
+          </p:cNvCxnSpPr>
           <p:nvPr/>
         </p:nvCxnSpPr>
         <p:spPr>
           <a:xfrm>
-            <a:off x="1739069" y="2266002"/>
-            <a:ext cx="2058118" cy="0"/>
+            <a:off x="1739069" y="2332158"/>
+            <a:ext cx="1664077" cy="0"/>
           </a:xfrm>
           <a:prstGeom prst="straightConnector1">
             <a:avLst/>
@@ -4469,13 +4542,15 @@
       <p:cxnSp>
         <p:nvCxnSpPr>
           <p:cNvPr id="37" name="Straight Arrow Connector 36"/>
-          <p:cNvCxnSpPr/>
+          <p:cNvCxnSpPr>
+            <a:cxnSpLocks/>
+          </p:cNvCxnSpPr>
           <p:nvPr/>
         </p:nvCxnSpPr>
         <p:spPr>
           <a:xfrm>
-            <a:off x="390618" y="2342202"/>
-            <a:ext cx="1196051" cy="0"/>
+            <a:off x="314394" y="2438400"/>
+            <a:ext cx="1272275" cy="0"/>
           </a:xfrm>
           <a:prstGeom prst="straightConnector1">
             <a:avLst/>
@@ -4552,7 +4627,7 @@
           <a:p>
             <a:pPr algn="ctr"/>
             <a:r>
-              <a:rPr lang="en-US" sz="1600" dirty="0" smtClean="0">
+              <a:rPr lang="en-US" sz="1600" dirty="0">
                 <a:solidFill>
                   <a:schemeClr val="bg1"/>
                 </a:solidFill>
@@ -4560,7 +4635,7 @@
               <a:t>:</a:t>
             </a:r>
             <a:r>
-              <a:rPr lang="en-US" sz="1600" dirty="0" err="1" smtClean="0">
+              <a:rPr lang="en-US" sz="1600" dirty="0" err="1">
                 <a:solidFill>
                   <a:schemeClr val="bg1"/>
                 </a:solidFill>
@@ -4672,13 +4747,15 @@
       <p:cxnSp>
         <p:nvCxnSpPr>
           <p:cNvPr id="42" name="Straight Arrow Connector 41"/>
-          <p:cNvCxnSpPr/>
+          <p:cNvCxnSpPr>
+            <a:cxnSpLocks/>
+          </p:cNvCxnSpPr>
           <p:nvPr/>
         </p:nvCxnSpPr>
         <p:spPr>
           <a:xfrm>
-            <a:off x="5943992" y="1961202"/>
-            <a:ext cx="2568438" cy="0"/>
+            <a:off x="5872989" y="1961202"/>
+            <a:ext cx="2671805" cy="0"/>
           </a:xfrm>
           <a:prstGeom prst="straightConnector1">
             <a:avLst/>
@@ -4708,13 +4785,15 @@
       <p:cxnSp>
         <p:nvCxnSpPr>
           <p:cNvPr id="44" name="Straight Arrow Connector 43"/>
-          <p:cNvCxnSpPr/>
+          <p:cNvCxnSpPr>
+            <a:cxnSpLocks/>
+          </p:cNvCxnSpPr>
           <p:nvPr/>
         </p:nvCxnSpPr>
         <p:spPr>
           <a:xfrm>
-            <a:off x="5943992" y="2137989"/>
-            <a:ext cx="2549946" cy="0"/>
+            <a:off x="5921630" y="2137989"/>
+            <a:ext cx="2671805" cy="0"/>
           </a:xfrm>
           <a:prstGeom prst="straightConnector1">
             <a:avLst/>
@@ -4793,7 +4872,7 @@
           <a:p>
             <a:pPr algn="ctr"/>
             <a:r>
-              <a:rPr lang="en-US" sz="1600" dirty="0" smtClean="0">
+              <a:rPr lang="en-US" sz="1600" dirty="0">
                 <a:solidFill>
                   <a:schemeClr val="bg1"/>
                 </a:solidFill>
@@ -4925,7 +5004,7 @@
           <a:lstStyle/>
           <a:p>
             <a:r>
-              <a:rPr lang="en-US" sz="1400" dirty="0" smtClean="0">
+              <a:rPr lang="en-US" sz="1400" dirty="0">
                 <a:solidFill>
                   <a:schemeClr val="accent5">
                     <a:lumMod val="75000"/>
@@ -4935,7 +5014,7 @@
               <a:t>post(</a:t>
             </a:r>
             <a:r>
-              <a:rPr lang="en-US" sz="1400" dirty="0" err="1" smtClean="0">
+              <a:rPr lang="en-US" sz="1400" dirty="0" err="1">
                 <a:solidFill>
                   <a:schemeClr val="accent5">
                     <a:lumMod val="75000"/>
@@ -4945,7 +5024,7 @@
               <a:t>AddressBookChangedEvent</a:t>
             </a:r>
             <a:r>
-              <a:rPr lang="en-US" sz="1400" dirty="0" smtClean="0">
+              <a:rPr lang="en-US" sz="1400" dirty="0">
                 <a:solidFill>
                   <a:schemeClr val="accent5">
                     <a:lumMod val="75000"/>
@@ -4954,13 +5033,6 @@
               </a:rPr>
               <a:t>)</a:t>
             </a:r>
-            <a:endParaRPr lang="en-US" sz="1400" dirty="0">
-              <a:solidFill>
-                <a:schemeClr val="accent5">
-                  <a:lumMod val="75000"/>
-                </a:schemeClr>
-              </a:solidFill>
-            </a:endParaRPr>
           </a:p>
         </p:txBody>
       </p:sp>
@@ -5052,7 +5124,7 @@
           <a:p>
             <a:pPr algn="ctr"/>
             <a:r>
-              <a:rPr lang="en-US" sz="1600" dirty="0" smtClean="0">
+              <a:rPr lang="en-US" sz="1600" dirty="0">
                 <a:solidFill>
                   <a:schemeClr val="bg1"/>
                 </a:solidFill>
@@ -5060,7 +5132,7 @@
               <a:t>:</a:t>
             </a:r>
             <a:r>
-              <a:rPr lang="en-US" sz="1600" dirty="0" err="1" smtClean="0">
+              <a:rPr lang="en-US" sz="1600" dirty="0" err="1">
                 <a:solidFill>
                   <a:schemeClr val="bg1"/>
                 </a:solidFill>
@@ -5307,7 +5379,7 @@
           <a:lstStyle/>
           <a:p>
             <a:r>
-              <a:rPr lang="en-US" sz="1400" dirty="0" err="1" smtClean="0">
+              <a:rPr lang="en-US" sz="1400" dirty="0" err="1">
                 <a:solidFill>
                   <a:schemeClr val="accent6">
                     <a:lumMod val="75000"/>
@@ -5317,7 +5389,7 @@
               <a:t>handleAddresssBookChangedEvent</a:t>
             </a:r>
             <a:r>
-              <a:rPr lang="en-US" sz="1400" dirty="0" smtClean="0">
+              <a:rPr lang="en-US" sz="1400" dirty="0">
                 <a:solidFill>
                   <a:schemeClr val="accent6">
                     <a:lumMod val="75000"/>
@@ -5326,13 +5398,6 @@
               </a:rPr>
               <a:t>()</a:t>
             </a:r>
-            <a:endParaRPr lang="en-US" sz="1400" dirty="0">
-              <a:solidFill>
-                <a:schemeClr val="accent6">
-                  <a:lumMod val="75000"/>
-                </a:schemeClr>
-              </a:solidFill>
-            </a:endParaRPr>
           </a:p>
         </p:txBody>
       </p:sp>
@@ -5417,7 +5482,7 @@
           <a:p>
             <a:pPr algn="ctr"/>
             <a:r>
-              <a:rPr lang="en-US" sz="1600" dirty="0" smtClean="0">
+              <a:rPr lang="en-US" sz="1600" dirty="0">
                 <a:solidFill>
                   <a:schemeClr val="bg1"/>
                 </a:solidFill>
@@ -5620,7 +5685,7 @@
           <a:lstStyle/>
           <a:p>
             <a:r>
-              <a:rPr lang="en-US" sz="1400" dirty="0" err="1" smtClean="0">
+              <a:rPr lang="en-US" sz="1400" dirty="0" err="1">
                 <a:solidFill>
                   <a:srgbClr val="00B050"/>
                 </a:solidFill>
@@ -5628,18 +5693,13 @@
               <a:t>handleAddresssBookChangedEvent</a:t>
             </a:r>
             <a:r>
-              <a:rPr lang="en-US" sz="1400" dirty="0" smtClean="0">
+              <a:rPr lang="en-US" sz="1400" dirty="0">
                 <a:solidFill>
                   <a:srgbClr val="00B050"/>
                 </a:solidFill>
               </a:rPr>
               <a:t>()</a:t>
             </a:r>
-            <a:endParaRPr lang="en-US" sz="1400" dirty="0">
-              <a:solidFill>
-                <a:srgbClr val="00B050"/>
-              </a:solidFill>
-            </a:endParaRPr>
           </a:p>
         </p:txBody>
       </p:sp>
@@ -5826,18 +5886,13 @@
           <a:p>
             <a:pPr algn="r"/>
             <a:r>
-              <a:rPr lang="en-US" sz="1400" dirty="0" smtClean="0">
+              <a:rPr lang="en-US" sz="1400" dirty="0">
                 <a:solidFill>
                   <a:srgbClr val="00B050"/>
                 </a:solidFill>
               </a:rPr>
               <a:t>Update status bar</a:t>
             </a:r>
-            <a:endParaRPr lang="en-US" sz="1400" dirty="0">
-              <a:solidFill>
-                <a:srgbClr val="00B050"/>
-              </a:solidFill>
-            </a:endParaRPr>
           </a:p>
         </p:txBody>
       </p:sp>
@@ -6027,7 +6082,7 @@
           <a:lstStyle/>
           <a:p>
             <a:r>
-              <a:rPr lang="en-US" sz="1400" dirty="0" smtClean="0">
+              <a:rPr lang="en-US" sz="1400" dirty="0">
                 <a:solidFill>
                   <a:schemeClr val="accent6">
                     <a:lumMod val="75000"/>
@@ -6037,7 +6092,7 @@
               <a:t>Save </a:t>
             </a:r>
             <a:br>
-              <a:rPr lang="en-US" sz="1400" dirty="0" smtClean="0">
+              <a:rPr lang="en-US" sz="1400" dirty="0">
                 <a:solidFill>
                   <a:schemeClr val="accent6">
                     <a:lumMod val="75000"/>
@@ -6046,7 +6101,7 @@
               </a:rPr>
             </a:br>
             <a:r>
-              <a:rPr lang="en-US" sz="1400" dirty="0" smtClean="0">
+              <a:rPr lang="en-US" sz="1400" dirty="0">
                 <a:solidFill>
                   <a:schemeClr val="accent6">
                     <a:lumMod val="75000"/>
@@ -6055,13 +6110,449 @@
               </a:rPr>
               <a:t>to file</a:t>
             </a:r>
-            <a:endParaRPr lang="en-US" sz="1400" dirty="0">
+          </a:p>
+        </p:txBody>
+      </p:sp>
+      <p:sp>
+        <p:nvSpPr>
+          <p:cNvPr id="65" name="Rectangle 62">
+            <a:extLst>
+              <a:ext uri="{FF2B5EF4-FFF2-40B4-BE49-F238E27FC236}">
+                <a16:creationId xmlns:a16="http://schemas.microsoft.com/office/drawing/2014/main" id="{9C1172A5-4661-42A2-A024-7DB4401B08C7}"/>
+              </a:ext>
+            </a:extLst>
+          </p:cNvPr>
+          <p:cNvSpPr/>
+          <p:nvPr/>
+        </p:nvSpPr>
+        <p:spPr>
+          <a:xfrm>
+            <a:off x="4094119" y="612785"/>
+            <a:ext cx="1093635" cy="346760"/>
+          </a:xfrm>
+          <a:prstGeom prst="rect">
+            <a:avLst/>
+          </a:prstGeom>
+          <a:solidFill>
+            <a:srgbClr val="12C8C8"/>
+          </a:solidFill>
+          <a:ln w="19050">
+            <a:noFill/>
+          </a:ln>
+          <a:effectLst/>
+        </p:spPr>
+        <p:style>
+          <a:lnRef idx="1">
+            <a:schemeClr val="accent2"/>
+          </a:lnRef>
+          <a:fillRef idx="2">
+            <a:schemeClr val="accent2"/>
+          </a:fillRef>
+          <a:effectRef idx="1">
+            <a:schemeClr val="accent2"/>
+          </a:effectRef>
+          <a:fontRef idx="minor">
+            <a:schemeClr val="dk1"/>
+          </a:fontRef>
+        </p:style>
+        <p:txBody>
+          <a:bodyPr rtlCol="0" anchor="ctr"/>
+          <a:lstStyle/>
+          <a:p>
+            <a:pPr algn="ctr"/>
+            <a:r>
+              <a:rPr lang="en-US" sz="1600" dirty="0">
+                <a:solidFill>
+                  <a:schemeClr val="bg1"/>
+                </a:solidFill>
+              </a:rPr>
+              <a:t>:Security</a:t>
+            </a:r>
+            <a:endParaRPr lang="en-SG" sz="1600" dirty="0">
               <a:solidFill>
-                <a:schemeClr val="accent6">
-                  <a:lumMod val="75000"/>
-                </a:schemeClr>
+                <a:schemeClr val="bg1"/>
               </a:solidFill>
             </a:endParaRPr>
+          </a:p>
+        </p:txBody>
+      </p:sp>
+      <p:cxnSp>
+        <p:nvCxnSpPr>
+          <p:cNvPr id="73" name="Straight Connector 72">
+            <a:extLst>
+              <a:ext uri="{FF2B5EF4-FFF2-40B4-BE49-F238E27FC236}">
+                <a16:creationId xmlns:a16="http://schemas.microsoft.com/office/drawing/2014/main" id="{954D4ABF-BC30-408E-B6DE-DBC195D20D8D}"/>
+              </a:ext>
+            </a:extLst>
+          </p:cNvPr>
+          <p:cNvCxnSpPr/>
+          <p:nvPr/>
+        </p:nvCxnSpPr>
+        <p:spPr>
+          <a:xfrm>
+            <a:off x="4572000" y="954686"/>
+            <a:ext cx="0" cy="1723059"/>
+          </a:xfrm>
+          <a:prstGeom prst="line">
+            <a:avLst/>
+          </a:prstGeom>
+          <a:ln w="19050">
+            <a:solidFill>
+              <a:srgbClr val="12C8C8"/>
+            </a:solidFill>
+            <a:prstDash val="sysDash"/>
+          </a:ln>
+          <a:effectLst/>
+        </p:spPr>
+        <p:style>
+          <a:lnRef idx="1">
+            <a:schemeClr val="accent1"/>
+          </a:lnRef>
+          <a:fillRef idx="2">
+            <a:schemeClr val="accent1"/>
+          </a:fillRef>
+          <a:effectRef idx="1">
+            <a:schemeClr val="accent1"/>
+          </a:effectRef>
+          <a:fontRef idx="minor">
+            <a:schemeClr val="dk1"/>
+          </a:fontRef>
+        </p:style>
+      </p:cxnSp>
+      <p:sp>
+        <p:nvSpPr>
+          <p:cNvPr id="71" name="Rectangle 70">
+            <a:extLst>
+              <a:ext uri="{FF2B5EF4-FFF2-40B4-BE49-F238E27FC236}">
+                <a16:creationId xmlns:a16="http://schemas.microsoft.com/office/drawing/2014/main" id="{26E15659-BEF6-4B84-8DC6-F85FC84504D6}"/>
+              </a:ext>
+            </a:extLst>
+          </p:cNvPr>
+          <p:cNvSpPr/>
+          <p:nvPr/>
+        </p:nvSpPr>
+        <p:spPr>
+          <a:xfrm>
+            <a:off x="4526729" y="1371600"/>
+            <a:ext cx="131559" cy="316056"/>
+          </a:xfrm>
+          <a:prstGeom prst="rect">
+            <a:avLst/>
+          </a:prstGeom>
+          <a:solidFill>
+            <a:srgbClr val="12C8C8"/>
+          </a:solidFill>
+          <a:ln>
+            <a:noFill/>
+          </a:ln>
+          <a:effectLst/>
+        </p:spPr>
+        <p:style>
+          <a:lnRef idx="1">
+            <a:schemeClr val="accent3"/>
+          </a:lnRef>
+          <a:fillRef idx="2">
+            <a:schemeClr val="accent3"/>
+          </a:fillRef>
+          <a:effectRef idx="1">
+            <a:schemeClr val="accent3"/>
+          </a:effectRef>
+          <a:fontRef idx="minor">
+            <a:schemeClr val="dk1"/>
+          </a:fontRef>
+        </p:style>
+        <p:txBody>
+          <a:bodyPr rtlCol="0" anchor="ctr"/>
+          <a:lstStyle/>
+          <a:p>
+            <a:pPr algn="ctr"/>
+            <a:endParaRPr lang="en-SG" sz="1400">
+              <a:solidFill>
+                <a:schemeClr val="dk1"/>
+              </a:solidFill>
+            </a:endParaRPr>
+          </a:p>
+        </p:txBody>
+      </p:sp>
+      <p:cxnSp>
+        <p:nvCxnSpPr>
+          <p:cNvPr id="79" name="Straight Arrow Connector 78">
+            <a:extLst>
+              <a:ext uri="{FF2B5EF4-FFF2-40B4-BE49-F238E27FC236}">
+                <a16:creationId xmlns:a16="http://schemas.microsoft.com/office/drawing/2014/main" id="{FE97BFAC-F39C-494F-BD4A-44AD4D4C3944}"/>
+              </a:ext>
+            </a:extLst>
+          </p:cNvPr>
+          <p:cNvCxnSpPr>
+            <a:cxnSpLocks/>
+          </p:cNvCxnSpPr>
+          <p:nvPr/>
+        </p:nvCxnSpPr>
+        <p:spPr>
+          <a:xfrm>
+            <a:off x="3474565" y="1675477"/>
+            <a:ext cx="1056184" cy="0"/>
+          </a:xfrm>
+          <a:prstGeom prst="straightConnector1">
+            <a:avLst/>
+          </a:prstGeom>
+          <a:ln w="19050">
+            <a:solidFill>
+              <a:srgbClr val="12C8C8"/>
+            </a:solidFill>
+            <a:prstDash val="sysDash"/>
+            <a:headEnd type="arrow" w="med" len="med"/>
+            <a:tailEnd type="none" w="med" len="med"/>
+          </a:ln>
+        </p:spPr>
+        <p:style>
+          <a:lnRef idx="1">
+            <a:schemeClr val="accent1"/>
+          </a:lnRef>
+          <a:fillRef idx="0">
+            <a:schemeClr val="accent1"/>
+          </a:fillRef>
+          <a:effectRef idx="0">
+            <a:schemeClr val="accent1"/>
+          </a:effectRef>
+          <a:fontRef idx="minor">
+            <a:schemeClr val="tx1"/>
+          </a:fontRef>
+        </p:style>
+      </p:cxnSp>
+      <p:sp>
+        <p:nvSpPr>
+          <p:cNvPr id="82" name="TextBox 81">
+            <a:extLst>
+              <a:ext uri="{FF2B5EF4-FFF2-40B4-BE49-F238E27FC236}">
+                <a16:creationId xmlns:a16="http://schemas.microsoft.com/office/drawing/2014/main" id="{1C3DB9F8-CE80-4F1D-981A-76F4024082B6}"/>
+              </a:ext>
+            </a:extLst>
+          </p:cNvPr>
+          <p:cNvSpPr txBox="1"/>
+          <p:nvPr/>
+        </p:nvSpPr>
+        <p:spPr>
+          <a:xfrm>
+            <a:off x="3584685" y="1378943"/>
+            <a:ext cx="841057" cy="215444"/>
+          </a:xfrm>
+          <a:prstGeom prst="rect">
+            <a:avLst/>
+          </a:prstGeom>
+          <a:noFill/>
+        </p:spPr>
+        <p:txBody>
+          <a:bodyPr wrap="square" lIns="0" tIns="0" rIns="0" bIns="0" rtlCol="0">
+            <a:spAutoFit/>
+          </a:bodyPr>
+          <a:lstStyle/>
+          <a:p>
+            <a:r>
+              <a:rPr lang="en-US" sz="1400" dirty="0" err="1">
+                <a:solidFill>
+                  <a:srgbClr val="12C8C8"/>
+                </a:solidFill>
+              </a:rPr>
+              <a:t>isSecured</a:t>
+            </a:r>
+            <a:r>
+              <a:rPr lang="en-US" sz="1400" dirty="0">
+                <a:solidFill>
+                  <a:srgbClr val="12C8C8"/>
+                </a:solidFill>
+              </a:rPr>
+              <a:t>()</a:t>
+            </a:r>
+          </a:p>
+        </p:txBody>
+      </p:sp>
+      <p:cxnSp>
+        <p:nvCxnSpPr>
+          <p:cNvPr id="84" name="Straight Arrow Connector 83">
+            <a:extLst>
+              <a:ext uri="{FF2B5EF4-FFF2-40B4-BE49-F238E27FC236}">
+                <a16:creationId xmlns:a16="http://schemas.microsoft.com/office/drawing/2014/main" id="{31C7B0A3-85B1-48D6-BCCA-A3B3661ACB93}"/>
+              </a:ext>
+            </a:extLst>
+          </p:cNvPr>
+          <p:cNvCxnSpPr>
+            <a:cxnSpLocks/>
+          </p:cNvCxnSpPr>
+          <p:nvPr/>
+        </p:nvCxnSpPr>
+        <p:spPr>
+          <a:xfrm>
+            <a:off x="3480410" y="1828800"/>
+            <a:ext cx="2311182" cy="0"/>
+          </a:xfrm>
+          <a:prstGeom prst="straightConnector1">
+            <a:avLst/>
+          </a:prstGeom>
+          <a:ln w="19050">
+            <a:solidFill>
+              <a:srgbClr val="0070C0"/>
+            </a:solidFill>
+            <a:tailEnd type="arrow"/>
+          </a:ln>
+        </p:spPr>
+        <p:style>
+          <a:lnRef idx="1">
+            <a:schemeClr val="accent1"/>
+          </a:lnRef>
+          <a:fillRef idx="0">
+            <a:schemeClr val="accent1"/>
+          </a:fillRef>
+          <a:effectRef idx="0">
+            <a:schemeClr val="accent1"/>
+          </a:effectRef>
+          <a:fontRef idx="minor">
+            <a:schemeClr val="tx1"/>
+          </a:fontRef>
+        </p:style>
+      </p:cxnSp>
+      <p:sp>
+        <p:nvSpPr>
+          <p:cNvPr id="87" name="Rectangle 86">
+            <a:extLst>
+              <a:ext uri="{FF2B5EF4-FFF2-40B4-BE49-F238E27FC236}">
+                <a16:creationId xmlns:a16="http://schemas.microsoft.com/office/drawing/2014/main" id="{13CFE15A-CB1C-4D0C-A25A-F7ECD4A642D4}"/>
+              </a:ext>
+            </a:extLst>
+          </p:cNvPr>
+          <p:cNvSpPr/>
+          <p:nvPr/>
+        </p:nvSpPr>
+        <p:spPr>
+          <a:xfrm>
+            <a:off x="2057400" y="1732904"/>
+            <a:ext cx="6781800" cy="533097"/>
+          </a:xfrm>
+          <a:prstGeom prst="rect">
+            <a:avLst/>
+          </a:prstGeom>
+          <a:noFill/>
+          <a:ln>
+            <a:solidFill>
+              <a:srgbClr val="FF0000"/>
+            </a:solidFill>
+          </a:ln>
+        </p:spPr>
+        <p:style>
+          <a:lnRef idx="2">
+            <a:schemeClr val="accent1">
+              <a:shade val="50000"/>
+            </a:schemeClr>
+          </a:lnRef>
+          <a:fillRef idx="1">
+            <a:schemeClr val="accent1"/>
+          </a:fillRef>
+          <a:effectRef idx="0">
+            <a:schemeClr val="accent1"/>
+          </a:effectRef>
+          <a:fontRef idx="minor">
+            <a:schemeClr val="lt1"/>
+          </a:fontRef>
+        </p:style>
+        <p:txBody>
+          <a:bodyPr rtlCol="0" anchor="ctr"/>
+          <a:lstStyle/>
+          <a:p>
+            <a:pPr algn="ctr"/>
+            <a:endParaRPr lang="en-SG"/>
+          </a:p>
+        </p:txBody>
+      </p:sp>
+      <p:sp>
+        <p:nvSpPr>
+          <p:cNvPr id="99" name="Rectangle: Single Corner Snipped 98">
+            <a:extLst>
+              <a:ext uri="{FF2B5EF4-FFF2-40B4-BE49-F238E27FC236}">
+                <a16:creationId xmlns:a16="http://schemas.microsoft.com/office/drawing/2014/main" id="{D4BBA081-252D-4863-9EC6-09E2DFDBE222}"/>
+              </a:ext>
+            </a:extLst>
+          </p:cNvPr>
+          <p:cNvSpPr/>
+          <p:nvPr/>
+        </p:nvSpPr>
+        <p:spPr>
+          <a:xfrm rot="10800000" flipH="1">
+            <a:off x="2055731" y="1722410"/>
+            <a:ext cx="299477" cy="238792"/>
+          </a:xfrm>
+          <a:prstGeom prst="snip1Rect">
+            <a:avLst>
+              <a:gd name="adj" fmla="val 50000"/>
+            </a:avLst>
+          </a:prstGeom>
+          <a:noFill/>
+          <a:ln>
+            <a:solidFill>
+              <a:srgbClr val="FF0000"/>
+            </a:solidFill>
+          </a:ln>
+        </p:spPr>
+        <p:style>
+          <a:lnRef idx="2">
+            <a:schemeClr val="accent1">
+              <a:shade val="50000"/>
+            </a:schemeClr>
+          </a:lnRef>
+          <a:fillRef idx="1">
+            <a:schemeClr val="accent1"/>
+          </a:fillRef>
+          <a:effectRef idx="0">
+            <a:schemeClr val="accent1"/>
+          </a:effectRef>
+          <a:fontRef idx="minor">
+            <a:schemeClr val="lt1"/>
+          </a:fontRef>
+        </p:style>
+        <p:txBody>
+          <a:bodyPr rtlCol="0" anchor="ctr"/>
+          <a:lstStyle/>
+          <a:p>
+            <a:pPr algn="ctr"/>
+            <a:endParaRPr lang="en-SG"/>
+          </a:p>
+        </p:txBody>
+      </p:sp>
+      <p:sp>
+        <p:nvSpPr>
+          <p:cNvPr id="100" name="TextBox 99">
+            <a:extLst>
+              <a:ext uri="{FF2B5EF4-FFF2-40B4-BE49-F238E27FC236}">
+                <a16:creationId xmlns:a16="http://schemas.microsoft.com/office/drawing/2014/main" id="{8C443215-EA6B-4CAE-B03F-CC3B81B1C6CE}"/>
+              </a:ext>
+            </a:extLst>
+          </p:cNvPr>
+          <p:cNvSpPr txBox="1"/>
+          <p:nvPr/>
+        </p:nvSpPr>
+        <p:spPr>
+          <a:xfrm>
+            <a:off x="1988148" y="1676914"/>
+            <a:ext cx="1603592" cy="292388"/>
+          </a:xfrm>
+          <a:prstGeom prst="rect">
+            <a:avLst/>
+          </a:prstGeom>
+          <a:noFill/>
+        </p:spPr>
+        <p:txBody>
+          <a:bodyPr wrap="square" rtlCol="0">
+            <a:spAutoFit/>
+          </a:bodyPr>
+          <a:lstStyle/>
+          <a:p>
+            <a:r>
+              <a:rPr lang="en-SG" sz="1300" dirty="0">
+                <a:solidFill>
+                  <a:srgbClr val="FF0000"/>
+                </a:solidFill>
+              </a:rPr>
+              <a:t>opt  [not secured]</a:t>
+            </a:r>
           </a:p>
         </p:txBody>
       </p:sp>

</xml_diff>

<commit_message>
Update Keith's features in DG
</commit_message>
<xml_diff>
--- a/docs/diagrams/HighLevelSequenceDiagrams.pptx
+++ b/docs/diagrams/HighLevelSequenceDiagrams.pptx
@@ -5,10 +5,12 @@
     <p:sldMasterId id="2147483648" r:id="rId1"/>
   </p:sldMasterIdLst>
   <p:notesMasterIdLst>
-    <p:notesMasterId r:id="rId3"/>
+    <p:notesMasterId r:id="rId5"/>
   </p:notesMasterIdLst>
   <p:sldIdLst>
     <p:sldId id="266" r:id="rId2"/>
+    <p:sldId id="267" r:id="rId3"/>
+    <p:sldId id="268" r:id="rId4"/>
   </p:sldIdLst>
   <p:sldSz cx="9144000" cy="6858000" type="screen4x3"/>
   <p:notesSz cx="6858000" cy="9144000"/>
@@ -107,7 +109,27 @@
       </a:defRPr>
     </a:lvl9pPr>
   </p:defaultTextStyle>
+  <p:extLst>
+    <p:ext uri="{EFAFB233-063F-42B5-8137-9DF3F51BA10A}">
+      <p15:sldGuideLst xmlns:p15="http://schemas.microsoft.com/office/powerpoint/2012/main">
+        <p15:guide id="1" orient="horz" pos="1488">
+          <p15:clr>
+            <a:srgbClr val="A4A3A4"/>
+          </p15:clr>
+        </p15:guide>
+        <p15:guide id="2" pos="2880">
+          <p15:clr>
+            <a:srgbClr val="A4A3A4"/>
+          </p15:clr>
+        </p15:guide>
+      </p15:sldGuideLst>
+    </p:ext>
+  </p:extLst>
 </p:presentation>
+</file>
+
+<file path=ppt/revisionInfo.xml><?xml version="1.0" encoding="utf-8"?>
+<p1510:revInfo xmlns:a="http://schemas.openxmlformats.org/drawingml/2006/main" xmlns:r="http://schemas.openxmlformats.org/officeDocument/2006/relationships" xmlns:p1510="http://schemas.microsoft.com/office/powerpoint/2015/10/main"/>
 </file>
 
 <file path=ppt/notesMasters/notesMaster1.xml><?xml version="1.0" encoding="utf-8"?>
@@ -192,7 +214,7 @@
           <a:p>
             <a:fld id="{F5CC4B3F-88C1-4FFA-B1B6-F41C21DC6924}" type="datetimeFigureOut">
               <a:rPr lang="en-US" smtClean="0"/>
-              <a:t>10/16/2016</a:t>
+              <a:t>13-Nov-17</a:t>
             </a:fld>
             <a:endParaRPr lang="en-US"/>
           </a:p>
@@ -256,38 +278,37 @@
           <a:p>
             <a:pPr lvl="0"/>
             <a:r>
-              <a:rPr lang="en-US" smtClean="0"/>
+              <a:rPr lang="en-US"/>
               <a:t>Click to edit Master text styles</a:t>
             </a:r>
           </a:p>
           <a:p>
             <a:pPr lvl="1"/>
             <a:r>
-              <a:rPr lang="en-US" smtClean="0"/>
+              <a:rPr lang="en-US"/>
               <a:t>Second level</a:t>
             </a:r>
           </a:p>
           <a:p>
             <a:pPr lvl="2"/>
             <a:r>
-              <a:rPr lang="en-US" smtClean="0"/>
+              <a:rPr lang="en-US"/>
               <a:t>Third level</a:t>
             </a:r>
           </a:p>
           <a:p>
             <a:pPr lvl="3"/>
             <a:r>
-              <a:rPr lang="en-US" smtClean="0"/>
+              <a:rPr lang="en-US"/>
               <a:t>Fourth level</a:t>
             </a:r>
           </a:p>
           <a:p>
             <a:pPr lvl="4"/>
             <a:r>
-              <a:rPr lang="en-US" smtClean="0"/>
+              <a:rPr lang="en-US"/>
               <a:t>Fifth level</a:t>
             </a:r>
-            <a:endParaRPr lang="en-US"/>
           </a:p>
         </p:txBody>
       </p:sp>
@@ -498,10 +519,9 @@
           <a:lstStyle/>
           <a:p>
             <a:r>
-              <a:rPr lang="en-US" smtClean="0"/>
+              <a:rPr lang="en-US"/>
               <a:t>Click to edit Master title style</a:t>
             </a:r>
-            <a:endParaRPr lang="en-US"/>
           </a:p>
         </p:txBody>
       </p:sp>
@@ -617,10 +637,9 @@
           </a:lstStyle>
           <a:p>
             <a:r>
-              <a:rPr lang="en-US" smtClean="0"/>
+              <a:rPr lang="en-US"/>
               <a:t>Click to edit Master subtitle style</a:t>
             </a:r>
-            <a:endParaRPr lang="en-US"/>
           </a:p>
         </p:txBody>
       </p:sp>
@@ -641,7 +660,7 @@
           <a:p>
             <a:fld id="{78C97017-6FC3-485B-9764-EAC9E56C1D49}" type="datetimeFigureOut">
               <a:rPr lang="en-US" smtClean="0"/>
-              <a:t>10/16/2016</a:t>
+              <a:t>13-Nov-17</a:t>
             </a:fld>
             <a:endParaRPr lang="en-US"/>
           </a:p>
@@ -735,10 +754,9 @@
           <a:lstStyle/>
           <a:p>
             <a:r>
-              <a:rPr lang="en-US" smtClean="0"/>
+              <a:rPr lang="en-US"/>
               <a:t>Click to edit Master title style</a:t>
             </a:r>
-            <a:endParaRPr lang="en-US"/>
           </a:p>
         </p:txBody>
       </p:sp>
@@ -759,38 +777,37 @@
           <a:p>
             <a:pPr lvl="0"/>
             <a:r>
-              <a:rPr lang="en-US" smtClean="0"/>
+              <a:rPr lang="en-US"/>
               <a:t>Click to edit Master text styles</a:t>
             </a:r>
           </a:p>
           <a:p>
             <a:pPr lvl="1"/>
             <a:r>
-              <a:rPr lang="en-US" smtClean="0"/>
+              <a:rPr lang="en-US"/>
               <a:t>Second level</a:t>
             </a:r>
           </a:p>
           <a:p>
             <a:pPr lvl="2"/>
             <a:r>
-              <a:rPr lang="en-US" smtClean="0"/>
+              <a:rPr lang="en-US"/>
               <a:t>Third level</a:t>
             </a:r>
           </a:p>
           <a:p>
             <a:pPr lvl="3"/>
             <a:r>
-              <a:rPr lang="en-US" smtClean="0"/>
+              <a:rPr lang="en-US"/>
               <a:t>Fourth level</a:t>
             </a:r>
           </a:p>
           <a:p>
             <a:pPr lvl="4"/>
             <a:r>
-              <a:rPr lang="en-US" smtClean="0"/>
+              <a:rPr lang="en-US"/>
               <a:t>Fifth level</a:t>
             </a:r>
-            <a:endParaRPr lang="en-US"/>
           </a:p>
         </p:txBody>
       </p:sp>
@@ -811,7 +828,7 @@
           <a:p>
             <a:fld id="{78C97017-6FC3-485B-9764-EAC9E56C1D49}" type="datetimeFigureOut">
               <a:rPr lang="en-US" smtClean="0"/>
-              <a:t>10/16/2016</a:t>
+              <a:t>13-Nov-17</a:t>
             </a:fld>
             <a:endParaRPr lang="en-US"/>
           </a:p>
@@ -910,10 +927,9 @@
           <a:lstStyle/>
           <a:p>
             <a:r>
-              <a:rPr lang="en-US" smtClean="0"/>
+              <a:rPr lang="en-US"/>
               <a:t>Click to edit Master title style</a:t>
             </a:r>
-            <a:endParaRPr lang="en-US"/>
           </a:p>
         </p:txBody>
       </p:sp>
@@ -939,38 +955,37 @@
           <a:p>
             <a:pPr lvl="0"/>
             <a:r>
-              <a:rPr lang="en-US" smtClean="0"/>
+              <a:rPr lang="en-US"/>
               <a:t>Click to edit Master text styles</a:t>
             </a:r>
           </a:p>
           <a:p>
             <a:pPr lvl="1"/>
             <a:r>
-              <a:rPr lang="en-US" smtClean="0"/>
+              <a:rPr lang="en-US"/>
               <a:t>Second level</a:t>
             </a:r>
           </a:p>
           <a:p>
             <a:pPr lvl="2"/>
             <a:r>
-              <a:rPr lang="en-US" smtClean="0"/>
+              <a:rPr lang="en-US"/>
               <a:t>Third level</a:t>
             </a:r>
           </a:p>
           <a:p>
             <a:pPr lvl="3"/>
             <a:r>
-              <a:rPr lang="en-US" smtClean="0"/>
+              <a:rPr lang="en-US"/>
               <a:t>Fourth level</a:t>
             </a:r>
           </a:p>
           <a:p>
             <a:pPr lvl="4"/>
             <a:r>
-              <a:rPr lang="en-US" smtClean="0"/>
+              <a:rPr lang="en-US"/>
               <a:t>Fifth level</a:t>
             </a:r>
-            <a:endParaRPr lang="en-US"/>
           </a:p>
         </p:txBody>
       </p:sp>
@@ -991,7 +1006,7 @@
           <a:p>
             <a:fld id="{78C97017-6FC3-485B-9764-EAC9E56C1D49}" type="datetimeFigureOut">
               <a:rPr lang="en-US" smtClean="0"/>
-              <a:t>10/16/2016</a:t>
+              <a:t>13-Nov-17</a:t>
             </a:fld>
             <a:endParaRPr lang="en-US"/>
           </a:p>
@@ -1085,10 +1100,9 @@
           <a:lstStyle/>
           <a:p>
             <a:r>
-              <a:rPr lang="en-US" smtClean="0"/>
+              <a:rPr lang="en-US"/>
               <a:t>Click to edit Master title style</a:t>
             </a:r>
-            <a:endParaRPr lang="en-US"/>
           </a:p>
         </p:txBody>
       </p:sp>
@@ -1109,38 +1123,37 @@
           <a:p>
             <a:pPr lvl="0"/>
             <a:r>
-              <a:rPr lang="en-US" smtClean="0"/>
+              <a:rPr lang="en-US"/>
               <a:t>Click to edit Master text styles</a:t>
             </a:r>
           </a:p>
           <a:p>
             <a:pPr lvl="1"/>
             <a:r>
-              <a:rPr lang="en-US" smtClean="0"/>
+              <a:rPr lang="en-US"/>
               <a:t>Second level</a:t>
             </a:r>
           </a:p>
           <a:p>
             <a:pPr lvl="2"/>
             <a:r>
-              <a:rPr lang="en-US" smtClean="0"/>
+              <a:rPr lang="en-US"/>
               <a:t>Third level</a:t>
             </a:r>
           </a:p>
           <a:p>
             <a:pPr lvl="3"/>
             <a:r>
-              <a:rPr lang="en-US" smtClean="0"/>
+              <a:rPr lang="en-US"/>
               <a:t>Fourth level</a:t>
             </a:r>
           </a:p>
           <a:p>
             <a:pPr lvl="4"/>
             <a:r>
-              <a:rPr lang="en-US" smtClean="0"/>
+              <a:rPr lang="en-US"/>
               <a:t>Fifth level</a:t>
             </a:r>
-            <a:endParaRPr lang="en-US"/>
           </a:p>
         </p:txBody>
       </p:sp>
@@ -1161,7 +1174,7 @@
           <a:p>
             <a:fld id="{78C97017-6FC3-485B-9764-EAC9E56C1D49}" type="datetimeFigureOut">
               <a:rPr lang="en-US" smtClean="0"/>
-              <a:t>10/16/2016</a:t>
+              <a:t>13-Nov-17</a:t>
             </a:fld>
             <a:endParaRPr lang="en-US"/>
           </a:p>
@@ -1264,10 +1277,9 @@
           </a:lstStyle>
           <a:p>
             <a:r>
-              <a:rPr lang="en-US" smtClean="0"/>
+              <a:rPr lang="en-US"/>
               <a:t>Click to edit Master title style</a:t>
             </a:r>
-            <a:endParaRPr lang="en-US"/>
           </a:p>
         </p:txBody>
       </p:sp>
@@ -1384,7 +1396,7 @@
           <a:p>
             <a:pPr lvl="0"/>
             <a:r>
-              <a:rPr lang="en-US" smtClean="0"/>
+              <a:rPr lang="en-US"/>
               <a:t>Click to edit Master text styles</a:t>
             </a:r>
           </a:p>
@@ -1407,7 +1419,7 @@
           <a:p>
             <a:fld id="{78C97017-6FC3-485B-9764-EAC9E56C1D49}" type="datetimeFigureOut">
               <a:rPr lang="en-US" smtClean="0"/>
-              <a:t>10/16/2016</a:t>
+              <a:t>13-Nov-17</a:t>
             </a:fld>
             <a:endParaRPr lang="en-US"/>
           </a:p>
@@ -1501,10 +1513,9 @@
           <a:lstStyle/>
           <a:p>
             <a:r>
-              <a:rPr lang="en-US" smtClean="0"/>
+              <a:rPr lang="en-US"/>
               <a:t>Click to edit Master title style</a:t>
             </a:r>
-            <a:endParaRPr lang="en-US"/>
           </a:p>
         </p:txBody>
       </p:sp>
@@ -1558,38 +1569,37 @@
           <a:p>
             <a:pPr lvl="0"/>
             <a:r>
-              <a:rPr lang="en-US" smtClean="0"/>
+              <a:rPr lang="en-US"/>
               <a:t>Click to edit Master text styles</a:t>
             </a:r>
           </a:p>
           <a:p>
             <a:pPr lvl="1"/>
             <a:r>
-              <a:rPr lang="en-US" smtClean="0"/>
+              <a:rPr lang="en-US"/>
               <a:t>Second level</a:t>
             </a:r>
           </a:p>
           <a:p>
             <a:pPr lvl="2"/>
             <a:r>
-              <a:rPr lang="en-US" smtClean="0"/>
+              <a:rPr lang="en-US"/>
               <a:t>Third level</a:t>
             </a:r>
           </a:p>
           <a:p>
             <a:pPr lvl="3"/>
             <a:r>
-              <a:rPr lang="en-US" smtClean="0"/>
+              <a:rPr lang="en-US"/>
               <a:t>Fourth level</a:t>
             </a:r>
           </a:p>
           <a:p>
             <a:pPr lvl="4"/>
             <a:r>
-              <a:rPr lang="en-US" smtClean="0"/>
+              <a:rPr lang="en-US"/>
               <a:t>Fifth level</a:t>
             </a:r>
-            <a:endParaRPr lang="en-US"/>
           </a:p>
         </p:txBody>
       </p:sp>
@@ -1643,38 +1653,37 @@
           <a:p>
             <a:pPr lvl="0"/>
             <a:r>
-              <a:rPr lang="en-US" smtClean="0"/>
+              <a:rPr lang="en-US"/>
               <a:t>Click to edit Master text styles</a:t>
             </a:r>
           </a:p>
           <a:p>
             <a:pPr lvl="1"/>
             <a:r>
-              <a:rPr lang="en-US" smtClean="0"/>
+              <a:rPr lang="en-US"/>
               <a:t>Second level</a:t>
             </a:r>
           </a:p>
           <a:p>
             <a:pPr lvl="2"/>
             <a:r>
-              <a:rPr lang="en-US" smtClean="0"/>
+              <a:rPr lang="en-US"/>
               <a:t>Third level</a:t>
             </a:r>
           </a:p>
           <a:p>
             <a:pPr lvl="3"/>
             <a:r>
-              <a:rPr lang="en-US" smtClean="0"/>
+              <a:rPr lang="en-US"/>
               <a:t>Fourth level</a:t>
             </a:r>
           </a:p>
           <a:p>
             <a:pPr lvl="4"/>
             <a:r>
-              <a:rPr lang="en-US" smtClean="0"/>
+              <a:rPr lang="en-US"/>
               <a:t>Fifth level</a:t>
             </a:r>
-            <a:endParaRPr lang="en-US"/>
           </a:p>
         </p:txBody>
       </p:sp>
@@ -1695,7 +1704,7 @@
           <a:p>
             <a:fld id="{78C97017-6FC3-485B-9764-EAC9E56C1D49}" type="datetimeFigureOut">
               <a:rPr lang="en-US" smtClean="0"/>
-              <a:t>10/16/2016</a:t>
+              <a:t>13-Nov-17</a:t>
             </a:fld>
             <a:endParaRPr lang="en-US"/>
           </a:p>
@@ -1793,10 +1802,9 @@
           </a:lstStyle>
           <a:p>
             <a:r>
-              <a:rPr lang="en-US" smtClean="0"/>
+              <a:rPr lang="en-US"/>
               <a:t>Click to edit Master title style</a:t>
             </a:r>
-            <a:endParaRPr lang="en-US"/>
           </a:p>
         </p:txBody>
       </p:sp>
@@ -1859,7 +1867,7 @@
           <a:p>
             <a:pPr lvl="0"/>
             <a:r>
-              <a:rPr lang="en-US" smtClean="0"/>
+              <a:rPr lang="en-US"/>
               <a:t>Click to edit Master text styles</a:t>
             </a:r>
           </a:p>
@@ -1915,38 +1923,37 @@
           <a:p>
             <a:pPr lvl="0"/>
             <a:r>
-              <a:rPr lang="en-US" smtClean="0"/>
+              <a:rPr lang="en-US"/>
               <a:t>Click to edit Master text styles</a:t>
             </a:r>
           </a:p>
           <a:p>
             <a:pPr lvl="1"/>
             <a:r>
-              <a:rPr lang="en-US" smtClean="0"/>
+              <a:rPr lang="en-US"/>
               <a:t>Second level</a:t>
             </a:r>
           </a:p>
           <a:p>
             <a:pPr lvl="2"/>
             <a:r>
-              <a:rPr lang="en-US" smtClean="0"/>
+              <a:rPr lang="en-US"/>
               <a:t>Third level</a:t>
             </a:r>
           </a:p>
           <a:p>
             <a:pPr lvl="3"/>
             <a:r>
-              <a:rPr lang="en-US" smtClean="0"/>
+              <a:rPr lang="en-US"/>
               <a:t>Fourth level</a:t>
             </a:r>
           </a:p>
           <a:p>
             <a:pPr lvl="4"/>
             <a:r>
-              <a:rPr lang="en-US" smtClean="0"/>
+              <a:rPr lang="en-US"/>
               <a:t>Fifth level</a:t>
             </a:r>
-            <a:endParaRPr lang="en-US"/>
           </a:p>
         </p:txBody>
       </p:sp>
@@ -2009,7 +2016,7 @@
           <a:p>
             <a:pPr lvl="0"/>
             <a:r>
-              <a:rPr lang="en-US" smtClean="0"/>
+              <a:rPr lang="en-US"/>
               <a:t>Click to edit Master text styles</a:t>
             </a:r>
           </a:p>
@@ -2065,38 +2072,37 @@
           <a:p>
             <a:pPr lvl="0"/>
             <a:r>
-              <a:rPr lang="en-US" smtClean="0"/>
+              <a:rPr lang="en-US"/>
               <a:t>Click to edit Master text styles</a:t>
             </a:r>
           </a:p>
           <a:p>
             <a:pPr lvl="1"/>
             <a:r>
-              <a:rPr lang="en-US" smtClean="0"/>
+              <a:rPr lang="en-US"/>
               <a:t>Second level</a:t>
             </a:r>
           </a:p>
           <a:p>
             <a:pPr lvl="2"/>
             <a:r>
-              <a:rPr lang="en-US" smtClean="0"/>
+              <a:rPr lang="en-US"/>
               <a:t>Third level</a:t>
             </a:r>
           </a:p>
           <a:p>
             <a:pPr lvl="3"/>
             <a:r>
-              <a:rPr lang="en-US" smtClean="0"/>
+              <a:rPr lang="en-US"/>
               <a:t>Fourth level</a:t>
             </a:r>
           </a:p>
           <a:p>
             <a:pPr lvl="4"/>
             <a:r>
-              <a:rPr lang="en-US" smtClean="0"/>
+              <a:rPr lang="en-US"/>
               <a:t>Fifth level</a:t>
             </a:r>
-            <a:endParaRPr lang="en-US"/>
           </a:p>
         </p:txBody>
       </p:sp>
@@ -2117,7 +2123,7 @@
           <a:p>
             <a:fld id="{78C97017-6FC3-485B-9764-EAC9E56C1D49}" type="datetimeFigureOut">
               <a:rPr lang="en-US" smtClean="0"/>
-              <a:t>10/16/2016</a:t>
+              <a:t>13-Nov-17</a:t>
             </a:fld>
             <a:endParaRPr lang="en-US"/>
           </a:p>
@@ -2211,10 +2217,9 @@
           <a:lstStyle/>
           <a:p>
             <a:r>
-              <a:rPr lang="en-US" smtClean="0"/>
+              <a:rPr lang="en-US"/>
               <a:t>Click to edit Master title style</a:t>
             </a:r>
-            <a:endParaRPr lang="en-US"/>
           </a:p>
         </p:txBody>
       </p:sp>
@@ -2235,7 +2240,7 @@
           <a:p>
             <a:fld id="{78C97017-6FC3-485B-9764-EAC9E56C1D49}" type="datetimeFigureOut">
               <a:rPr lang="en-US" smtClean="0"/>
-              <a:t>10/16/2016</a:t>
+              <a:t>13-Nov-17</a:t>
             </a:fld>
             <a:endParaRPr lang="en-US"/>
           </a:p>
@@ -2330,7 +2335,7 @@
           <a:p>
             <a:fld id="{78C97017-6FC3-485B-9764-EAC9E56C1D49}" type="datetimeFigureOut">
               <a:rPr lang="en-US" smtClean="0"/>
-              <a:t>10/16/2016</a:t>
+              <a:t>13-Nov-17</a:t>
             </a:fld>
             <a:endParaRPr lang="en-US"/>
           </a:p>
@@ -2433,10 +2438,9 @@
           </a:lstStyle>
           <a:p>
             <a:r>
-              <a:rPr lang="en-US" smtClean="0"/>
+              <a:rPr lang="en-US"/>
               <a:t>Click to edit Master title style</a:t>
             </a:r>
-            <a:endParaRPr lang="en-US"/>
           </a:p>
         </p:txBody>
       </p:sp>
@@ -2490,38 +2494,37 @@
           <a:p>
             <a:pPr lvl="0"/>
             <a:r>
-              <a:rPr lang="en-US" smtClean="0"/>
+              <a:rPr lang="en-US"/>
               <a:t>Click to edit Master text styles</a:t>
             </a:r>
           </a:p>
           <a:p>
             <a:pPr lvl="1"/>
             <a:r>
-              <a:rPr lang="en-US" smtClean="0"/>
+              <a:rPr lang="en-US"/>
               <a:t>Second level</a:t>
             </a:r>
           </a:p>
           <a:p>
             <a:pPr lvl="2"/>
             <a:r>
-              <a:rPr lang="en-US" smtClean="0"/>
+              <a:rPr lang="en-US"/>
               <a:t>Third level</a:t>
             </a:r>
           </a:p>
           <a:p>
             <a:pPr lvl="3"/>
             <a:r>
-              <a:rPr lang="en-US" smtClean="0"/>
+              <a:rPr lang="en-US"/>
               <a:t>Fourth level</a:t>
             </a:r>
           </a:p>
           <a:p>
             <a:pPr lvl="4"/>
             <a:r>
-              <a:rPr lang="en-US" smtClean="0"/>
+              <a:rPr lang="en-US"/>
               <a:t>Fifth level</a:t>
             </a:r>
-            <a:endParaRPr lang="en-US"/>
           </a:p>
         </p:txBody>
       </p:sp>
@@ -2584,7 +2587,7 @@
           <a:p>
             <a:pPr lvl="0"/>
             <a:r>
-              <a:rPr lang="en-US" smtClean="0"/>
+              <a:rPr lang="en-US"/>
               <a:t>Click to edit Master text styles</a:t>
             </a:r>
           </a:p>
@@ -2607,7 +2610,7 @@
           <a:p>
             <a:fld id="{78C97017-6FC3-485B-9764-EAC9E56C1D49}" type="datetimeFigureOut">
               <a:rPr lang="en-US" smtClean="0"/>
-              <a:t>10/16/2016</a:t>
+              <a:t>13-Nov-17</a:t>
             </a:fld>
             <a:endParaRPr lang="en-US"/>
           </a:p>
@@ -2710,10 +2713,9 @@
           </a:lstStyle>
           <a:p>
             <a:r>
-              <a:rPr lang="en-US" smtClean="0"/>
+              <a:rPr lang="en-US"/>
               <a:t>Click to edit Master title style</a:t>
             </a:r>
-            <a:endParaRPr lang="en-US"/>
           </a:p>
         </p:txBody>
       </p:sp>
@@ -2837,7 +2839,7 @@
           <a:p>
             <a:pPr lvl="0"/>
             <a:r>
-              <a:rPr lang="en-US" smtClean="0"/>
+              <a:rPr lang="en-US"/>
               <a:t>Click to edit Master text styles</a:t>
             </a:r>
           </a:p>
@@ -2860,7 +2862,7 @@
           <a:p>
             <a:fld id="{78C97017-6FC3-485B-9764-EAC9E56C1D49}" type="datetimeFigureOut">
               <a:rPr lang="en-US" smtClean="0"/>
-              <a:t>10/16/2016</a:t>
+              <a:t>13-Nov-17</a:t>
             </a:fld>
             <a:endParaRPr lang="en-US"/>
           </a:p>
@@ -2969,10 +2971,9 @@
           <a:lstStyle/>
           <a:p>
             <a:r>
-              <a:rPr lang="en-US" smtClean="0"/>
+              <a:rPr lang="en-US"/>
               <a:t>Click to edit Master title style</a:t>
             </a:r>
-            <a:endParaRPr lang="en-US"/>
           </a:p>
         </p:txBody>
       </p:sp>
@@ -3003,38 +3004,37 @@
           <a:p>
             <a:pPr lvl="0"/>
             <a:r>
-              <a:rPr lang="en-US" smtClean="0"/>
+              <a:rPr lang="en-US"/>
               <a:t>Click to edit Master text styles</a:t>
             </a:r>
           </a:p>
           <a:p>
             <a:pPr lvl="1"/>
             <a:r>
-              <a:rPr lang="en-US" smtClean="0"/>
+              <a:rPr lang="en-US"/>
               <a:t>Second level</a:t>
             </a:r>
           </a:p>
           <a:p>
             <a:pPr lvl="2"/>
             <a:r>
-              <a:rPr lang="en-US" smtClean="0"/>
+              <a:rPr lang="en-US"/>
               <a:t>Third level</a:t>
             </a:r>
           </a:p>
           <a:p>
             <a:pPr lvl="3"/>
             <a:r>
-              <a:rPr lang="en-US" smtClean="0"/>
+              <a:rPr lang="en-US"/>
               <a:t>Fourth level</a:t>
             </a:r>
           </a:p>
           <a:p>
             <a:pPr lvl="4"/>
             <a:r>
-              <a:rPr lang="en-US" smtClean="0"/>
+              <a:rPr lang="en-US"/>
               <a:t>Fifth level</a:t>
             </a:r>
-            <a:endParaRPr lang="en-US"/>
           </a:p>
         </p:txBody>
       </p:sp>
@@ -3073,7 +3073,7 @@
           <a:p>
             <a:fld id="{78C97017-6FC3-485B-9764-EAC9E56C1D49}" type="datetimeFigureOut">
               <a:rPr lang="en-US" smtClean="0"/>
-              <a:t>10/16/2016</a:t>
+              <a:t>13-Nov-17</a:t>
             </a:fld>
             <a:endParaRPr lang="en-US"/>
           </a:p>
@@ -3492,7 +3492,7 @@
           <a:p>
             <a:pPr algn="ctr"/>
             <a:r>
-              <a:rPr lang="en-US" sz="1600" dirty="0" smtClean="0">
+              <a:rPr lang="en-US" sz="1600" dirty="0">
                 <a:solidFill>
                   <a:schemeClr val="bg1"/>
                 </a:solidFill>
@@ -3856,7 +3856,7 @@
           <a:p>
             <a:pPr algn="ctr"/>
             <a:r>
-              <a:rPr lang="en-US" sz="1600" dirty="0" smtClean="0">
+              <a:rPr lang="en-US" sz="1600" dirty="0">
                 <a:solidFill>
                   <a:schemeClr val="bg1"/>
                 </a:solidFill>
@@ -4003,7 +4003,7 @@
           <a:p>
             <a:pPr algn="ctr"/>
             <a:r>
-              <a:rPr lang="en-US" sz="1600" dirty="0" smtClean="0">
+              <a:rPr lang="en-US" sz="1600" dirty="0">
                 <a:solidFill>
                   <a:schemeClr val="bg1"/>
                 </a:solidFill>
@@ -4165,10 +4165,9 @@
           <a:lstStyle/>
           <a:p>
             <a:r>
-              <a:rPr lang="en-US" sz="1400" dirty="0" smtClean="0"/>
+              <a:rPr lang="en-US" sz="1400" dirty="0"/>
               <a:t>delete 1</a:t>
             </a:r>
-            <a:endParaRPr lang="en-US" sz="1400" dirty="0"/>
           </a:p>
         </p:txBody>
       </p:sp>
@@ -4231,18 +4230,13 @@
           <a:lstStyle/>
           <a:p>
             <a:r>
-              <a:rPr lang="en-US" sz="1400" dirty="0" smtClean="0">
+              <a:rPr lang="en-US" sz="1400" dirty="0">
                 <a:solidFill>
                   <a:srgbClr val="0070C0"/>
                 </a:solidFill>
               </a:rPr>
               <a:t>execute(“delete 1”)</a:t>
             </a:r>
-            <a:endParaRPr lang="en-US" sz="1400" dirty="0">
-              <a:solidFill>
-                <a:srgbClr val="0070C0"/>
-              </a:solidFill>
-            </a:endParaRPr>
           </a:p>
         </p:txBody>
       </p:sp>
@@ -4305,7 +4299,7 @@
           <a:lstStyle/>
           <a:p>
             <a:r>
-              <a:rPr lang="en-US" sz="1400" dirty="0" err="1" smtClean="0">
+              <a:rPr lang="en-US" sz="1400" dirty="0" err="1">
                 <a:solidFill>
                   <a:srgbClr val="7030A0"/>
                 </a:solidFill>
@@ -4313,18 +4307,13 @@
               <a:t>deletePerson</a:t>
             </a:r>
             <a:r>
-              <a:rPr lang="en-US" sz="1400" dirty="0" smtClean="0">
+              <a:rPr lang="en-US" sz="1400" dirty="0">
                 <a:solidFill>
                   <a:srgbClr val="7030A0"/>
                 </a:solidFill>
               </a:rPr>
               <a:t>(p)</a:t>
             </a:r>
-            <a:endParaRPr lang="en-US" sz="1400" dirty="0">
-              <a:solidFill>
-                <a:srgbClr val="7030A0"/>
-              </a:solidFill>
-            </a:endParaRPr>
           </a:p>
         </p:txBody>
       </p:sp>
@@ -4351,7 +4340,7 @@
           <a:lstStyle/>
           <a:p>
             <a:r>
-              <a:rPr lang="en-US" sz="1400" dirty="0" smtClean="0">
+              <a:rPr lang="en-US" sz="1400" dirty="0">
                 <a:solidFill>
                   <a:schemeClr val="accent5">
                     <a:lumMod val="75000"/>
@@ -4361,7 +4350,7 @@
               <a:t>post(</a:t>
             </a:r>
             <a:r>
-              <a:rPr lang="en-US" sz="1400" dirty="0" err="1" smtClean="0">
+              <a:rPr lang="en-US" sz="1400" dirty="0" err="1">
                 <a:solidFill>
                   <a:schemeClr val="accent5">
                     <a:lumMod val="75000"/>
@@ -4371,7 +4360,7 @@
               <a:t>AddressBookChangedEvent</a:t>
             </a:r>
             <a:r>
-              <a:rPr lang="en-US" sz="1400" dirty="0" smtClean="0">
+              <a:rPr lang="en-US" sz="1400" dirty="0">
                 <a:solidFill>
                   <a:schemeClr val="accent5">
                     <a:lumMod val="75000"/>
@@ -4380,13 +4369,6 @@
               </a:rPr>
               <a:t>)</a:t>
             </a:r>
-            <a:endParaRPr lang="en-US" sz="1400" dirty="0">
-              <a:solidFill>
-                <a:schemeClr val="accent5">
-                  <a:lumMod val="75000"/>
-                </a:schemeClr>
-              </a:solidFill>
-            </a:endParaRPr>
           </a:p>
         </p:txBody>
       </p:sp>
@@ -4552,7 +4534,7 @@
           <a:p>
             <a:pPr algn="ctr"/>
             <a:r>
-              <a:rPr lang="en-US" sz="1600" dirty="0" smtClean="0">
+              <a:rPr lang="en-US" sz="1600" dirty="0">
                 <a:solidFill>
                   <a:schemeClr val="bg1"/>
                 </a:solidFill>
@@ -4560,7 +4542,7 @@
               <a:t>:</a:t>
             </a:r>
             <a:r>
-              <a:rPr lang="en-US" sz="1600" dirty="0" err="1" smtClean="0">
+              <a:rPr lang="en-US" sz="1600" dirty="0" err="1">
                 <a:solidFill>
                   <a:schemeClr val="bg1"/>
                 </a:solidFill>
@@ -4793,7 +4775,7 @@
           <a:p>
             <a:pPr algn="ctr"/>
             <a:r>
-              <a:rPr lang="en-US" sz="1600" dirty="0" smtClean="0">
+              <a:rPr lang="en-US" sz="1600" dirty="0">
                 <a:solidFill>
                   <a:schemeClr val="bg1"/>
                 </a:solidFill>
@@ -4925,7 +4907,7 @@
           <a:lstStyle/>
           <a:p>
             <a:r>
-              <a:rPr lang="en-US" sz="1400" dirty="0" smtClean="0">
+              <a:rPr lang="en-US" sz="1400" dirty="0">
                 <a:solidFill>
                   <a:schemeClr val="accent5">
                     <a:lumMod val="75000"/>
@@ -4935,7 +4917,7 @@
               <a:t>post(</a:t>
             </a:r>
             <a:r>
-              <a:rPr lang="en-US" sz="1400" dirty="0" err="1" smtClean="0">
+              <a:rPr lang="en-US" sz="1400" dirty="0" err="1">
                 <a:solidFill>
                   <a:schemeClr val="accent5">
                     <a:lumMod val="75000"/>
@@ -4945,7 +4927,7 @@
               <a:t>AddressBookChangedEvent</a:t>
             </a:r>
             <a:r>
-              <a:rPr lang="en-US" sz="1400" dirty="0" smtClean="0">
+              <a:rPr lang="en-US" sz="1400" dirty="0">
                 <a:solidFill>
                   <a:schemeClr val="accent5">
                     <a:lumMod val="75000"/>
@@ -4954,13 +4936,6 @@
               </a:rPr>
               <a:t>)</a:t>
             </a:r>
-            <a:endParaRPr lang="en-US" sz="1400" dirty="0">
-              <a:solidFill>
-                <a:schemeClr val="accent5">
-                  <a:lumMod val="75000"/>
-                </a:schemeClr>
-              </a:solidFill>
-            </a:endParaRPr>
           </a:p>
         </p:txBody>
       </p:sp>
@@ -5052,7 +5027,7 @@
           <a:p>
             <a:pPr algn="ctr"/>
             <a:r>
-              <a:rPr lang="en-US" sz="1600" dirty="0" smtClean="0">
+              <a:rPr lang="en-US" sz="1600" dirty="0">
                 <a:solidFill>
                   <a:schemeClr val="bg1"/>
                 </a:solidFill>
@@ -5060,7 +5035,7 @@
               <a:t>:</a:t>
             </a:r>
             <a:r>
-              <a:rPr lang="en-US" sz="1600" dirty="0" err="1" smtClean="0">
+              <a:rPr lang="en-US" sz="1600" dirty="0" err="1">
                 <a:solidFill>
                   <a:schemeClr val="bg1"/>
                 </a:solidFill>
@@ -5307,7 +5282,7 @@
           <a:lstStyle/>
           <a:p>
             <a:r>
-              <a:rPr lang="en-US" sz="1400" dirty="0" err="1" smtClean="0">
+              <a:rPr lang="en-US" sz="1400" dirty="0" err="1">
                 <a:solidFill>
                   <a:schemeClr val="accent6">
                     <a:lumMod val="75000"/>
@@ -5317,7 +5292,7 @@
               <a:t>handleAddresssBookChangedEvent</a:t>
             </a:r>
             <a:r>
-              <a:rPr lang="en-US" sz="1400" dirty="0" smtClean="0">
+              <a:rPr lang="en-US" sz="1400" dirty="0">
                 <a:solidFill>
                   <a:schemeClr val="accent6">
                     <a:lumMod val="75000"/>
@@ -5326,13 +5301,6 @@
               </a:rPr>
               <a:t>()</a:t>
             </a:r>
-            <a:endParaRPr lang="en-US" sz="1400" dirty="0">
-              <a:solidFill>
-                <a:schemeClr val="accent6">
-                  <a:lumMod val="75000"/>
-                </a:schemeClr>
-              </a:solidFill>
-            </a:endParaRPr>
           </a:p>
         </p:txBody>
       </p:sp>
@@ -5417,7 +5385,7 @@
           <a:p>
             <a:pPr algn="ctr"/>
             <a:r>
-              <a:rPr lang="en-US" sz="1600" dirty="0" smtClean="0">
+              <a:rPr lang="en-US" sz="1600" dirty="0">
                 <a:solidFill>
                   <a:schemeClr val="bg1"/>
                 </a:solidFill>
@@ -5620,7 +5588,7 @@
           <a:lstStyle/>
           <a:p>
             <a:r>
-              <a:rPr lang="en-US" sz="1400" dirty="0" err="1" smtClean="0">
+              <a:rPr lang="en-US" sz="1400" dirty="0" err="1">
                 <a:solidFill>
                   <a:srgbClr val="00B050"/>
                 </a:solidFill>
@@ -5628,18 +5596,13 @@
               <a:t>handleAddresssBookChangedEvent</a:t>
             </a:r>
             <a:r>
-              <a:rPr lang="en-US" sz="1400" dirty="0" smtClean="0">
+              <a:rPr lang="en-US" sz="1400" dirty="0">
                 <a:solidFill>
                   <a:srgbClr val="00B050"/>
                 </a:solidFill>
               </a:rPr>
               <a:t>()</a:t>
             </a:r>
-            <a:endParaRPr lang="en-US" sz="1400" dirty="0">
-              <a:solidFill>
-                <a:srgbClr val="00B050"/>
-              </a:solidFill>
-            </a:endParaRPr>
           </a:p>
         </p:txBody>
       </p:sp>
@@ -5826,18 +5789,13 @@
           <a:p>
             <a:pPr algn="r"/>
             <a:r>
-              <a:rPr lang="en-US" sz="1400" dirty="0" smtClean="0">
+              <a:rPr lang="en-US" sz="1400" dirty="0">
                 <a:solidFill>
                   <a:srgbClr val="00B050"/>
                 </a:solidFill>
               </a:rPr>
               <a:t>Update status bar</a:t>
             </a:r>
-            <a:endParaRPr lang="en-US" sz="1400" dirty="0">
-              <a:solidFill>
-                <a:srgbClr val="00B050"/>
-              </a:solidFill>
-            </a:endParaRPr>
           </a:p>
         </p:txBody>
       </p:sp>
@@ -6027,7 +5985,7 @@
           <a:lstStyle/>
           <a:p>
             <a:r>
-              <a:rPr lang="en-US" sz="1400" dirty="0" smtClean="0">
+              <a:rPr lang="en-US" sz="1400" dirty="0">
                 <a:solidFill>
                   <a:schemeClr val="accent6">
                     <a:lumMod val="75000"/>
@@ -6037,7 +5995,7 @@
               <a:t>Save </a:t>
             </a:r>
             <a:br>
-              <a:rPr lang="en-US" sz="1400" dirty="0" smtClean="0">
+              <a:rPr lang="en-US" sz="1400" dirty="0">
                 <a:solidFill>
                   <a:schemeClr val="accent6">
                     <a:lumMod val="75000"/>
@@ -6046,7 +6004,7 @@
               </a:rPr>
             </a:br>
             <a:r>
-              <a:rPr lang="en-US" sz="1400" dirty="0" smtClean="0">
+              <a:rPr lang="en-US" sz="1400" dirty="0">
                 <a:solidFill>
                   <a:schemeClr val="accent6">
                     <a:lumMod val="75000"/>
@@ -6055,20 +6013,2129 @@
               </a:rPr>
               <a:t>to file</a:t>
             </a:r>
-            <a:endParaRPr lang="en-US" sz="1400" dirty="0">
+          </a:p>
+        </p:txBody>
+      </p:sp>
+    </p:spTree>
+    <p:extLst>
+      <p:ext uri="{BB962C8B-B14F-4D97-AF65-F5344CB8AC3E}">
+        <p14:creationId xmlns:p14="http://schemas.microsoft.com/office/powerpoint/2010/main" val="4023378879"/>
+      </p:ext>
+    </p:extLst>
+  </p:cSld>
+  <p:clrMapOvr>
+    <a:masterClrMapping/>
+  </p:clrMapOvr>
+</p:sld>
+</file>
+
+<file path=ppt/slides/slide2.xml><?xml version="1.0" encoding="utf-8"?>
+<p:sld xmlns:a="http://schemas.openxmlformats.org/drawingml/2006/main" xmlns:r="http://schemas.openxmlformats.org/officeDocument/2006/relationships" xmlns:p="http://schemas.openxmlformats.org/presentationml/2006/main">
+  <p:cSld>
+    <p:spTree>
+      <p:nvGrpSpPr>
+        <p:cNvPr id="1" name=""/>
+        <p:cNvGrpSpPr/>
+        <p:nvPr/>
+      </p:nvGrpSpPr>
+      <p:grpSpPr>
+        <a:xfrm>
+          <a:off x="0" y="0"/>
+          <a:ext cx="0" cy="0"/>
+          <a:chOff x="0" y="0"/>
+          <a:chExt cx="0" cy="0"/>
+        </a:xfrm>
+      </p:grpSpPr>
+      <p:sp>
+        <p:nvSpPr>
+          <p:cNvPr id="2" name="Rectangle 62"/>
+          <p:cNvSpPr/>
+          <p:nvPr/>
+        </p:nvSpPr>
+        <p:spPr>
+          <a:xfrm>
+            <a:off x="2225042" y="2057400"/>
+            <a:ext cx="1295398" cy="346760"/>
+          </a:xfrm>
+          <a:prstGeom prst="rect">
+            <a:avLst/>
+          </a:prstGeom>
+          <a:solidFill>
+            <a:srgbClr val="00B050"/>
+          </a:solidFill>
+          <a:ln w="19050">
+            <a:solidFill>
+              <a:srgbClr val="00B050"/>
+            </a:solidFill>
+          </a:ln>
+          <a:effectLst/>
+        </p:spPr>
+        <p:style>
+          <a:lnRef idx="1">
+            <a:schemeClr val="accent2"/>
+          </a:lnRef>
+          <a:fillRef idx="2">
+            <a:schemeClr val="accent2"/>
+          </a:fillRef>
+          <a:effectRef idx="1">
+            <a:schemeClr val="accent2"/>
+          </a:effectRef>
+          <a:fontRef idx="minor">
+            <a:schemeClr val="dk1"/>
+          </a:fontRef>
+        </p:style>
+        <p:txBody>
+          <a:bodyPr rtlCol="0" anchor="ctr"/>
+          <a:lstStyle/>
+          <a:p>
+            <a:pPr algn="ctr"/>
+            <a:r>
+              <a:rPr lang="en-US" sz="1600" dirty="0">
+                <a:solidFill>
+                  <a:schemeClr val="bg1"/>
+                </a:solidFill>
+              </a:rPr>
+              <a:t>:</a:t>
+            </a:r>
+            <a:r>
+              <a:rPr lang="en-US" sz="1600" dirty="0" err="1">
+                <a:solidFill>
+                  <a:schemeClr val="bg1"/>
+                </a:solidFill>
+              </a:rPr>
+              <a:t>UIManager</a:t>
+            </a:r>
+            <a:endParaRPr lang="en-SG" sz="1600" dirty="0">
+              <a:solidFill>
+                <a:schemeClr val="bg1"/>
+              </a:solidFill>
+            </a:endParaRPr>
+          </a:p>
+        </p:txBody>
+      </p:sp>
+      <p:cxnSp>
+        <p:nvCxnSpPr>
+          <p:cNvPr id="5" name="Straight Connector 4"/>
+          <p:cNvCxnSpPr/>
+          <p:nvPr/>
+        </p:nvCxnSpPr>
+        <p:spPr>
+          <a:xfrm>
+            <a:off x="2877877" y="2421071"/>
+            <a:ext cx="0" cy="1723059"/>
+          </a:xfrm>
+          <a:prstGeom prst="line">
+            <a:avLst/>
+          </a:prstGeom>
+          <a:ln w="19050">
+            <a:solidFill>
+              <a:srgbClr val="00B050"/>
+            </a:solidFill>
+            <a:prstDash val="sysDash"/>
+          </a:ln>
+          <a:effectLst/>
+        </p:spPr>
+        <p:style>
+          <a:lnRef idx="1">
+            <a:schemeClr val="accent1"/>
+          </a:lnRef>
+          <a:fillRef idx="2">
+            <a:schemeClr val="accent1"/>
+          </a:fillRef>
+          <a:effectRef idx="1">
+            <a:schemeClr val="accent1"/>
+          </a:effectRef>
+          <a:fontRef idx="minor">
+            <a:schemeClr val="dk1"/>
+          </a:fontRef>
+        </p:style>
+      </p:cxnSp>
+      <p:sp>
+        <p:nvSpPr>
+          <p:cNvPr id="6" name="Rectangle 5"/>
+          <p:cNvSpPr/>
+          <p:nvPr/>
+        </p:nvSpPr>
+        <p:spPr>
+          <a:xfrm>
+            <a:off x="2805869" y="2771766"/>
+            <a:ext cx="152400" cy="1019910"/>
+          </a:xfrm>
+          <a:prstGeom prst="rect">
+            <a:avLst/>
+          </a:prstGeom>
+          <a:solidFill>
+            <a:srgbClr val="00B050"/>
+          </a:solidFill>
+          <a:ln>
+            <a:solidFill>
+              <a:srgbClr val="00B050"/>
+            </a:solidFill>
+          </a:ln>
+          <a:effectLst/>
+        </p:spPr>
+        <p:style>
+          <a:lnRef idx="1">
+            <a:schemeClr val="accent3"/>
+          </a:lnRef>
+          <a:fillRef idx="2">
+            <a:schemeClr val="accent3"/>
+          </a:fillRef>
+          <a:effectRef idx="1">
+            <a:schemeClr val="accent3"/>
+          </a:effectRef>
+          <a:fontRef idx="minor">
+            <a:schemeClr val="dk1"/>
+          </a:fontRef>
+        </p:style>
+        <p:txBody>
+          <a:bodyPr rtlCol="0" anchor="ctr"/>
+          <a:lstStyle/>
+          <a:p>
+            <a:pPr algn="ctr"/>
+            <a:endParaRPr lang="en-SG" sz="1400">
+              <a:solidFill>
+                <a:schemeClr val="dk1"/>
+              </a:solidFill>
+            </a:endParaRPr>
+          </a:p>
+        </p:txBody>
+      </p:sp>
+      <p:grpSp>
+        <p:nvGrpSpPr>
+          <p:cNvPr id="7" name="Actor"/>
+          <p:cNvGrpSpPr/>
+          <p:nvPr/>
+        </p:nvGrpSpPr>
+        <p:grpSpPr>
+          <a:xfrm>
+            <a:off x="1371600" y="1982874"/>
+            <a:ext cx="324036" cy="573410"/>
+            <a:chOff x="3239901" y="4149080"/>
+            <a:chExt cx="648072" cy="1146820"/>
+          </a:xfrm>
+        </p:grpSpPr>
+        <p:sp>
+          <p:nvSpPr>
+            <p:cNvPr id="8" name="Flowchart: Connector 7"/>
+            <p:cNvSpPr/>
+            <p:nvPr/>
+          </p:nvSpPr>
+          <p:spPr>
+            <a:xfrm>
+              <a:off x="3419872" y="4149080"/>
+              <a:ext cx="288032" cy="288032"/>
+            </a:xfrm>
+            <a:prstGeom prst="flowChartConnector">
+              <a:avLst/>
+            </a:prstGeom>
+            <a:solidFill>
+              <a:schemeClr val="bg1">
+                <a:lumMod val="85000"/>
+              </a:schemeClr>
+            </a:solidFill>
+            <a:ln w="28575">
+              <a:solidFill>
+                <a:schemeClr val="tx1"/>
+              </a:solidFill>
+            </a:ln>
+            <a:effectLst/>
+          </p:spPr>
+          <p:style>
+            <a:lnRef idx="1">
+              <a:schemeClr val="accent4"/>
+            </a:lnRef>
+            <a:fillRef idx="2">
+              <a:schemeClr val="accent4"/>
+            </a:fillRef>
+            <a:effectRef idx="1">
+              <a:schemeClr val="accent4"/>
+            </a:effectRef>
+            <a:fontRef idx="minor">
+              <a:schemeClr val="dk1"/>
+            </a:fontRef>
+          </p:style>
+          <p:txBody>
+            <a:bodyPr rtlCol="0" anchor="ctr"/>
+            <a:lstStyle/>
+            <a:p>
+              <a:pPr algn="ctr"/>
+              <a:endParaRPr lang="en-SG"/>
+            </a:p>
+          </p:txBody>
+        </p:sp>
+        <p:cxnSp>
+          <p:nvCxnSpPr>
+            <p:cNvPr id="9" name="Straight Connector 8"/>
+            <p:cNvCxnSpPr>
+              <a:stCxn id="8" idx="4"/>
+            </p:cNvCxnSpPr>
+            <p:nvPr/>
+          </p:nvCxnSpPr>
+          <p:spPr>
+            <a:xfrm>
+              <a:off x="3563888" y="4437112"/>
+              <a:ext cx="0" cy="504056"/>
+            </a:xfrm>
+            <a:prstGeom prst="line">
+              <a:avLst/>
+            </a:prstGeom>
+            <a:ln w="28575">
+              <a:solidFill>
+                <a:schemeClr val="tx1"/>
+              </a:solidFill>
+            </a:ln>
+            <a:effectLst/>
+          </p:spPr>
+          <p:style>
+            <a:lnRef idx="1">
+              <a:schemeClr val="accent4"/>
+            </a:lnRef>
+            <a:fillRef idx="2">
+              <a:schemeClr val="accent4"/>
+            </a:fillRef>
+            <a:effectRef idx="1">
+              <a:schemeClr val="accent4"/>
+            </a:effectRef>
+            <a:fontRef idx="minor">
+              <a:schemeClr val="dk1"/>
+            </a:fontRef>
+          </p:style>
+        </p:cxnSp>
+        <p:sp>
+          <p:nvSpPr>
+            <p:cNvPr id="10" name="Freeform 9"/>
+            <p:cNvSpPr/>
+            <p:nvPr/>
+          </p:nvSpPr>
+          <p:spPr>
+            <a:xfrm>
+              <a:off x="3324225" y="4933950"/>
+              <a:ext cx="479425" cy="361950"/>
+            </a:xfrm>
+            <a:custGeom>
+              <a:avLst/>
+              <a:gdLst>
+                <a:gd name="connsiteX0" fmla="*/ 0 w 479425"/>
+                <a:gd name="connsiteY0" fmla="*/ 355600 h 361950"/>
+                <a:gd name="connsiteX1" fmla="*/ 241300 w 479425"/>
+                <a:gd name="connsiteY1" fmla="*/ 0 h 361950"/>
+                <a:gd name="connsiteX2" fmla="*/ 479425 w 479425"/>
+                <a:gd name="connsiteY2" fmla="*/ 361950 h 361950"/>
+              </a:gdLst>
+              <a:ahLst/>
+              <a:cxnLst>
+                <a:cxn ang="0">
+                  <a:pos x="connsiteX0" y="connsiteY0"/>
+                </a:cxn>
+                <a:cxn ang="0">
+                  <a:pos x="connsiteX1" y="connsiteY1"/>
+                </a:cxn>
+                <a:cxn ang="0">
+                  <a:pos x="connsiteX2" y="connsiteY2"/>
+                </a:cxn>
+              </a:cxnLst>
+              <a:rect l="l" t="t" r="r" b="b"/>
+              <a:pathLst>
+                <a:path w="479425" h="361950">
+                  <a:moveTo>
+                    <a:pt x="0" y="355600"/>
+                  </a:moveTo>
+                  <a:lnTo>
+                    <a:pt x="241300" y="0"/>
+                  </a:lnTo>
+                  <a:lnTo>
+                    <a:pt x="479425" y="361950"/>
+                  </a:lnTo>
+                </a:path>
+              </a:pathLst>
+            </a:custGeom>
+            <a:noFill/>
+            <a:ln w="28575">
+              <a:solidFill>
+                <a:schemeClr val="tx1"/>
+              </a:solidFill>
+            </a:ln>
+            <a:effectLst/>
+          </p:spPr>
+          <p:style>
+            <a:lnRef idx="1">
+              <a:schemeClr val="accent4"/>
+            </a:lnRef>
+            <a:fillRef idx="2">
+              <a:schemeClr val="accent4"/>
+            </a:fillRef>
+            <a:effectRef idx="1">
+              <a:schemeClr val="accent4"/>
+            </a:effectRef>
+            <a:fontRef idx="minor">
+              <a:schemeClr val="dk1"/>
+            </a:fontRef>
+          </p:style>
+          <p:txBody>
+            <a:bodyPr rtlCol="0" anchor="ctr"/>
+            <a:lstStyle/>
+            <a:p>
+              <a:pPr algn="ctr"/>
+              <a:endParaRPr lang="en-SG"/>
+            </a:p>
+          </p:txBody>
+        </p:sp>
+        <p:cxnSp>
+          <p:nvCxnSpPr>
+            <p:cNvPr id="11" name="Straight Connector 10"/>
+            <p:cNvCxnSpPr/>
+            <p:nvPr/>
+          </p:nvCxnSpPr>
+          <p:spPr>
+            <a:xfrm>
+              <a:off x="3239901" y="4509120"/>
+              <a:ext cx="648072" cy="0"/>
+            </a:xfrm>
+            <a:prstGeom prst="line">
+              <a:avLst/>
+            </a:prstGeom>
+            <a:ln w="28575">
+              <a:solidFill>
+                <a:schemeClr val="tx1"/>
+              </a:solidFill>
+            </a:ln>
+            <a:effectLst/>
+          </p:spPr>
+          <p:style>
+            <a:lnRef idx="1">
+              <a:schemeClr val="accent4"/>
+            </a:lnRef>
+            <a:fillRef idx="2">
+              <a:schemeClr val="accent4"/>
+            </a:fillRef>
+            <a:effectRef idx="1">
+              <a:schemeClr val="accent4"/>
+            </a:effectRef>
+            <a:fontRef idx="minor">
+              <a:schemeClr val="dk1"/>
+            </a:fontRef>
+          </p:style>
+        </p:cxnSp>
+      </p:grpSp>
+      <p:sp>
+        <p:nvSpPr>
+          <p:cNvPr id="16" name="Rectangle 62"/>
+          <p:cNvSpPr/>
+          <p:nvPr/>
+        </p:nvSpPr>
+        <p:spPr>
+          <a:xfrm>
+            <a:off x="4554783" y="2061087"/>
+            <a:ext cx="1093635" cy="346760"/>
+          </a:xfrm>
+          <a:prstGeom prst="rect">
+            <a:avLst/>
+          </a:prstGeom>
+          <a:solidFill>
+            <a:srgbClr val="0070C0"/>
+          </a:solidFill>
+          <a:ln w="19050">
+            <a:solidFill>
+              <a:srgbClr val="0070C0"/>
+            </a:solidFill>
+          </a:ln>
+          <a:effectLst/>
+        </p:spPr>
+        <p:style>
+          <a:lnRef idx="1">
+            <a:schemeClr val="accent2"/>
+          </a:lnRef>
+          <a:fillRef idx="2">
+            <a:schemeClr val="accent2"/>
+          </a:fillRef>
+          <a:effectRef idx="1">
+            <a:schemeClr val="accent2"/>
+          </a:effectRef>
+          <a:fontRef idx="minor">
+            <a:schemeClr val="dk1"/>
+          </a:fontRef>
+        </p:style>
+        <p:txBody>
+          <a:bodyPr rtlCol="0" anchor="ctr"/>
+          <a:lstStyle/>
+          <a:p>
+            <a:pPr algn="ctr"/>
+            <a:r>
+              <a:rPr lang="en-US" sz="1600" dirty="0">
+                <a:solidFill>
+                  <a:schemeClr val="bg1"/>
+                </a:solidFill>
+              </a:rPr>
+              <a:t>:</a:t>
+            </a:r>
+            <a:r>
+              <a:rPr lang="en-US" sz="1600" dirty="0" err="1">
+                <a:solidFill>
+                  <a:schemeClr val="bg1"/>
+                </a:solidFill>
+              </a:rPr>
+              <a:t>UserPrefs</a:t>
+            </a:r>
+            <a:endParaRPr lang="en-SG" sz="1600" dirty="0">
+              <a:solidFill>
+                <a:schemeClr val="bg1"/>
+              </a:solidFill>
+            </a:endParaRPr>
+          </a:p>
+        </p:txBody>
+      </p:sp>
+      <p:cxnSp>
+        <p:nvCxnSpPr>
+          <p:cNvPr id="17" name="Straight Connector 16"/>
+          <p:cNvCxnSpPr/>
+          <p:nvPr/>
+        </p:nvCxnSpPr>
+        <p:spPr>
+          <a:xfrm>
+            <a:off x="5101600" y="2424758"/>
+            <a:ext cx="0" cy="1723059"/>
+          </a:xfrm>
+          <a:prstGeom prst="line">
+            <a:avLst/>
+          </a:prstGeom>
+          <a:ln w="19050">
+            <a:solidFill>
+              <a:srgbClr val="0070C0"/>
+            </a:solidFill>
+            <a:prstDash val="sysDash"/>
+          </a:ln>
+          <a:effectLst/>
+        </p:spPr>
+        <p:style>
+          <a:lnRef idx="1">
+            <a:schemeClr val="accent1"/>
+          </a:lnRef>
+          <a:fillRef idx="2">
+            <a:schemeClr val="accent1"/>
+          </a:fillRef>
+          <a:effectRef idx="1">
+            <a:schemeClr val="accent1"/>
+          </a:effectRef>
+          <a:fontRef idx="minor">
+            <a:schemeClr val="dk1"/>
+          </a:fontRef>
+        </p:style>
+      </p:cxnSp>
+      <p:sp>
+        <p:nvSpPr>
+          <p:cNvPr id="18" name="Rectangle 17"/>
+          <p:cNvSpPr/>
+          <p:nvPr/>
+        </p:nvSpPr>
+        <p:spPr>
+          <a:xfrm>
+            <a:off x="5029592" y="2882951"/>
+            <a:ext cx="144016" cy="832525"/>
+          </a:xfrm>
+          <a:prstGeom prst="rect">
+            <a:avLst/>
+          </a:prstGeom>
+          <a:solidFill>
+            <a:srgbClr val="0070C0"/>
+          </a:solidFill>
+          <a:ln>
+            <a:solidFill>
+              <a:srgbClr val="0070C0"/>
+            </a:solidFill>
+          </a:ln>
+          <a:effectLst/>
+        </p:spPr>
+        <p:style>
+          <a:lnRef idx="1">
+            <a:schemeClr val="accent3"/>
+          </a:lnRef>
+          <a:fillRef idx="2">
+            <a:schemeClr val="accent3"/>
+          </a:fillRef>
+          <a:effectRef idx="1">
+            <a:schemeClr val="accent3"/>
+          </a:effectRef>
+          <a:fontRef idx="minor">
+            <a:schemeClr val="dk1"/>
+          </a:fontRef>
+        </p:style>
+        <p:txBody>
+          <a:bodyPr rtlCol="0" anchor="ctr"/>
+          <a:lstStyle/>
+          <a:p>
+            <a:pPr algn="ctr"/>
+            <a:endParaRPr lang="en-SG" sz="1400">
+              <a:solidFill>
+                <a:schemeClr val="dk1"/>
+              </a:solidFill>
+            </a:endParaRPr>
+          </a:p>
+        </p:txBody>
+      </p:sp>
+      <p:sp>
+        <p:nvSpPr>
+          <p:cNvPr id="19" name="Rectangle 62"/>
+          <p:cNvSpPr/>
+          <p:nvPr/>
+        </p:nvSpPr>
+        <p:spPr>
+          <a:xfrm>
+            <a:off x="6535983" y="2057400"/>
+            <a:ext cx="1093635" cy="346760"/>
+          </a:xfrm>
+          <a:prstGeom prst="rect">
+            <a:avLst/>
+          </a:prstGeom>
+          <a:solidFill>
+            <a:srgbClr val="E46C0A"/>
+          </a:solidFill>
+          <a:ln w="19050">
+            <a:solidFill>
+              <a:srgbClr val="E46C0A"/>
+            </a:solidFill>
+          </a:ln>
+          <a:effectLst/>
+        </p:spPr>
+        <p:style>
+          <a:lnRef idx="1">
+            <a:schemeClr val="accent2"/>
+          </a:lnRef>
+          <a:fillRef idx="2">
+            <a:schemeClr val="accent2"/>
+          </a:fillRef>
+          <a:effectRef idx="1">
+            <a:schemeClr val="accent2"/>
+          </a:effectRef>
+          <a:fontRef idx="minor">
+            <a:schemeClr val="dk1"/>
+          </a:fontRef>
+        </p:style>
+        <p:txBody>
+          <a:bodyPr rtlCol="0" anchor="ctr"/>
+          <a:lstStyle/>
+          <a:p>
+            <a:pPr algn="ctr"/>
+            <a:r>
+              <a:rPr lang="en-US" sz="1600" dirty="0">
+                <a:solidFill>
+                  <a:schemeClr val="bg1"/>
+                </a:solidFill>
+              </a:rPr>
+              <a:t>:Storage</a:t>
+            </a:r>
+            <a:endParaRPr lang="en-SG" sz="1600" dirty="0">
+              <a:solidFill>
+                <a:schemeClr val="bg1"/>
+              </a:solidFill>
+            </a:endParaRPr>
+          </a:p>
+        </p:txBody>
+      </p:sp>
+      <p:cxnSp>
+        <p:nvCxnSpPr>
+          <p:cNvPr id="20" name="Straight Connector 19"/>
+          <p:cNvCxnSpPr/>
+          <p:nvPr/>
+        </p:nvCxnSpPr>
+        <p:spPr>
+          <a:xfrm>
+            <a:off x="7082800" y="2421071"/>
+            <a:ext cx="0" cy="1723059"/>
+          </a:xfrm>
+          <a:prstGeom prst="line">
+            <a:avLst/>
+          </a:prstGeom>
+          <a:ln w="19050">
+            <a:solidFill>
+              <a:srgbClr val="E46C0A"/>
+            </a:solidFill>
+            <a:prstDash val="sysDash"/>
+          </a:ln>
+          <a:effectLst/>
+        </p:spPr>
+        <p:style>
+          <a:lnRef idx="1">
+            <a:schemeClr val="accent1"/>
+          </a:lnRef>
+          <a:fillRef idx="2">
+            <a:schemeClr val="accent1"/>
+          </a:fillRef>
+          <a:effectRef idx="1">
+            <a:schemeClr val="accent1"/>
+          </a:effectRef>
+          <a:fontRef idx="minor">
+            <a:schemeClr val="dk1"/>
+          </a:fontRef>
+        </p:style>
+      </p:cxnSp>
+      <p:sp>
+        <p:nvSpPr>
+          <p:cNvPr id="21" name="Rectangle 20"/>
+          <p:cNvSpPr/>
+          <p:nvPr/>
+        </p:nvSpPr>
+        <p:spPr>
+          <a:xfrm>
+            <a:off x="7010792" y="2987882"/>
+            <a:ext cx="142006" cy="651394"/>
+          </a:xfrm>
+          <a:prstGeom prst="rect">
+            <a:avLst/>
+          </a:prstGeom>
+          <a:solidFill>
+            <a:srgbClr val="E46C0A"/>
+          </a:solidFill>
+          <a:ln>
+            <a:solidFill>
+              <a:srgbClr val="7030A0"/>
+            </a:solidFill>
+          </a:ln>
+          <a:effectLst/>
+        </p:spPr>
+        <p:style>
+          <a:lnRef idx="1">
+            <a:schemeClr val="accent3"/>
+          </a:lnRef>
+          <a:fillRef idx="2">
+            <a:schemeClr val="accent3"/>
+          </a:fillRef>
+          <a:effectRef idx="1">
+            <a:schemeClr val="accent3"/>
+          </a:effectRef>
+          <a:fontRef idx="minor">
+            <a:schemeClr val="dk1"/>
+          </a:fontRef>
+        </p:style>
+        <p:txBody>
+          <a:bodyPr rtlCol="0" anchor="ctr"/>
+          <a:lstStyle/>
+          <a:p>
+            <a:pPr algn="ctr"/>
+            <a:endParaRPr lang="en-SG" sz="1400">
+              <a:solidFill>
+                <a:schemeClr val="dk1"/>
+              </a:solidFill>
+            </a:endParaRPr>
+          </a:p>
+        </p:txBody>
+      </p:sp>
+      <p:cxnSp>
+        <p:nvCxnSpPr>
+          <p:cNvPr id="23" name="Straight Arrow Connector 22"/>
+          <p:cNvCxnSpPr/>
+          <p:nvPr/>
+        </p:nvCxnSpPr>
+        <p:spPr>
+          <a:xfrm>
+            <a:off x="1686018" y="2775453"/>
+            <a:ext cx="1119851" cy="0"/>
+          </a:xfrm>
+          <a:prstGeom prst="straightConnector1">
+            <a:avLst/>
+          </a:prstGeom>
+          <a:ln w="19050">
+            <a:solidFill>
+              <a:schemeClr val="tx1"/>
+            </a:solidFill>
+            <a:tailEnd type="arrow"/>
+          </a:ln>
+        </p:spPr>
+        <p:style>
+          <a:lnRef idx="1">
+            <a:schemeClr val="accent1"/>
+          </a:lnRef>
+          <a:fillRef idx="0">
+            <a:schemeClr val="accent1"/>
+          </a:fillRef>
+          <a:effectRef idx="0">
+            <a:schemeClr val="accent1"/>
+          </a:effectRef>
+          <a:fontRef idx="minor">
+            <a:schemeClr val="tx1"/>
+          </a:fontRef>
+        </p:style>
+      </p:cxnSp>
+      <p:sp>
+        <p:nvSpPr>
+          <p:cNvPr id="24" name="TextBox 23"/>
+          <p:cNvSpPr txBox="1"/>
+          <p:nvPr/>
+        </p:nvSpPr>
+        <p:spPr>
+          <a:xfrm>
+            <a:off x="1739358" y="2795354"/>
+            <a:ext cx="860170" cy="215444"/>
+          </a:xfrm>
+          <a:prstGeom prst="rect">
+            <a:avLst/>
+          </a:prstGeom>
+          <a:noFill/>
+        </p:spPr>
+        <p:txBody>
+          <a:bodyPr wrap="square" lIns="0" tIns="0" rIns="0" bIns="0" rtlCol="0">
+            <a:spAutoFit/>
+          </a:bodyPr>
+          <a:lstStyle/>
+          <a:p>
+            <a:r>
+              <a:rPr lang="en-US" sz="1400" dirty="0"/>
+              <a:t>exit</a:t>
+            </a:r>
+          </a:p>
+        </p:txBody>
+      </p:sp>
+      <p:cxnSp>
+        <p:nvCxnSpPr>
+          <p:cNvPr id="25" name="Straight Arrow Connector 24"/>
+          <p:cNvCxnSpPr/>
+          <p:nvPr/>
+        </p:nvCxnSpPr>
+        <p:spPr>
+          <a:xfrm>
+            <a:off x="2958269" y="2882952"/>
+            <a:ext cx="2071323" cy="0"/>
+          </a:xfrm>
+          <a:prstGeom prst="straightConnector1">
+            <a:avLst/>
+          </a:prstGeom>
+          <a:ln w="19050">
+            <a:solidFill>
+              <a:srgbClr val="00B050"/>
+            </a:solidFill>
+            <a:tailEnd type="arrow"/>
+          </a:ln>
+        </p:spPr>
+        <p:style>
+          <a:lnRef idx="1">
+            <a:schemeClr val="accent1"/>
+          </a:lnRef>
+          <a:fillRef idx="0">
+            <a:schemeClr val="accent1"/>
+          </a:fillRef>
+          <a:effectRef idx="0">
+            <a:schemeClr val="accent1"/>
+          </a:effectRef>
+          <a:fontRef idx="minor">
+            <a:schemeClr val="tx1"/>
+          </a:fontRef>
+        </p:style>
+      </p:cxnSp>
+      <p:sp>
+        <p:nvSpPr>
+          <p:cNvPr id="26" name="TextBox 25"/>
+          <p:cNvSpPr txBox="1"/>
+          <p:nvPr/>
+        </p:nvSpPr>
+        <p:spPr>
+          <a:xfrm>
+            <a:off x="3734472" y="2902853"/>
+            <a:ext cx="768948" cy="215444"/>
+          </a:xfrm>
+          <a:prstGeom prst="rect">
+            <a:avLst/>
+          </a:prstGeom>
+          <a:noFill/>
+        </p:spPr>
+        <p:txBody>
+          <a:bodyPr wrap="square" lIns="0" tIns="0" rIns="0" bIns="0" rtlCol="0">
+            <a:spAutoFit/>
+          </a:bodyPr>
+          <a:lstStyle/>
+          <a:p>
+            <a:r>
+              <a:rPr lang="en-US" sz="1400" dirty="0">
+                <a:solidFill>
+                  <a:srgbClr val="0070C0"/>
+                </a:solidFill>
+              </a:rPr>
+              <a:t>stop()</a:t>
+            </a:r>
+          </a:p>
+        </p:txBody>
+      </p:sp>
+      <p:cxnSp>
+        <p:nvCxnSpPr>
+          <p:cNvPr id="28" name="Straight Arrow Connector 27"/>
+          <p:cNvCxnSpPr/>
+          <p:nvPr/>
+        </p:nvCxnSpPr>
+        <p:spPr>
+          <a:xfrm>
+            <a:off x="5173608" y="2987883"/>
+            <a:ext cx="1837184" cy="0"/>
+          </a:xfrm>
+          <a:prstGeom prst="straightConnector1">
+            <a:avLst/>
+          </a:prstGeom>
+          <a:ln w="19050">
+            <a:solidFill>
+              <a:srgbClr val="0070C0"/>
+            </a:solidFill>
+            <a:tailEnd type="arrow"/>
+          </a:ln>
+        </p:spPr>
+        <p:style>
+          <a:lnRef idx="1">
+            <a:schemeClr val="accent1"/>
+          </a:lnRef>
+          <a:fillRef idx="0">
+            <a:schemeClr val="accent1"/>
+          </a:fillRef>
+          <a:effectRef idx="0">
+            <a:schemeClr val="accent1"/>
+          </a:effectRef>
+          <a:fontRef idx="minor">
+            <a:schemeClr val="tx1"/>
+          </a:fontRef>
+        </p:style>
+      </p:cxnSp>
+      <p:sp>
+        <p:nvSpPr>
+          <p:cNvPr id="29" name="TextBox 28"/>
+          <p:cNvSpPr txBox="1"/>
+          <p:nvPr/>
+        </p:nvSpPr>
+        <p:spPr>
+          <a:xfrm>
+            <a:off x="5197231" y="3014917"/>
+            <a:ext cx="1796437" cy="307777"/>
+          </a:xfrm>
+          <a:prstGeom prst="rect">
+            <a:avLst/>
+          </a:prstGeom>
+          <a:noFill/>
+        </p:spPr>
+        <p:txBody>
+          <a:bodyPr wrap="square" lIns="0" tIns="0" rIns="0" bIns="0" rtlCol="0">
+            <a:spAutoFit/>
+          </a:bodyPr>
+          <a:lstStyle/>
+          <a:p>
+            <a:pPr algn="ctr"/>
+            <a:r>
+              <a:rPr lang="en-US" sz="1000" dirty="0" err="1">
+                <a:solidFill>
+                  <a:srgbClr val="E46C0A"/>
+                </a:solidFill>
+              </a:rPr>
+              <a:t>updateLastUsedThemeSetting</a:t>
+            </a:r>
+            <a:r>
+              <a:rPr lang="en-US" sz="1000" dirty="0">
+                <a:solidFill>
+                  <a:srgbClr val="E46C0A"/>
+                </a:solidFill>
+              </a:rPr>
+              <a:t>(</a:t>
+            </a:r>
+          </a:p>
+          <a:p>
+            <a:pPr algn="ctr"/>
+            <a:r>
+              <a:rPr lang="en-US" sz="1000" dirty="0" err="1">
+                <a:solidFill>
+                  <a:srgbClr val="E46C0A"/>
+                </a:solidFill>
+              </a:rPr>
+              <a:t>currentTheme</a:t>
+            </a:r>
+            <a:r>
+              <a:rPr lang="en-US" sz="1000" dirty="0">
+                <a:solidFill>
+                  <a:srgbClr val="E46C0A"/>
+                </a:solidFill>
+              </a:rPr>
+              <a:t>)</a:t>
+            </a:r>
+          </a:p>
+        </p:txBody>
+      </p:sp>
+      <p:cxnSp>
+        <p:nvCxnSpPr>
+          <p:cNvPr id="34" name="Straight Arrow Connector 33"/>
+          <p:cNvCxnSpPr/>
+          <p:nvPr/>
+        </p:nvCxnSpPr>
+        <p:spPr>
+          <a:xfrm>
+            <a:off x="5173608" y="3640155"/>
+            <a:ext cx="1837184" cy="0"/>
+          </a:xfrm>
+          <a:prstGeom prst="straightConnector1">
+            <a:avLst/>
+          </a:prstGeom>
+          <a:ln w="19050">
+            <a:solidFill>
+              <a:srgbClr val="E46C0A"/>
+            </a:solidFill>
+            <a:prstDash val="sysDash"/>
+            <a:headEnd type="arrow" w="med" len="med"/>
+            <a:tailEnd type="none" w="med" len="med"/>
+          </a:ln>
+        </p:spPr>
+        <p:style>
+          <a:lnRef idx="1">
+            <a:schemeClr val="accent1"/>
+          </a:lnRef>
+          <a:fillRef idx="0">
+            <a:schemeClr val="accent1"/>
+          </a:fillRef>
+          <a:effectRef idx="0">
+            <a:schemeClr val="accent1"/>
+          </a:effectRef>
+          <a:fontRef idx="minor">
+            <a:schemeClr val="tx1"/>
+          </a:fontRef>
+        </p:style>
+      </p:cxnSp>
+      <p:cxnSp>
+        <p:nvCxnSpPr>
+          <p:cNvPr id="35" name="Straight Arrow Connector 34"/>
+          <p:cNvCxnSpPr/>
+          <p:nvPr/>
+        </p:nvCxnSpPr>
+        <p:spPr>
+          <a:xfrm>
+            <a:off x="2958269" y="3715476"/>
+            <a:ext cx="2058118" cy="0"/>
+          </a:xfrm>
+          <a:prstGeom prst="straightConnector1">
+            <a:avLst/>
+          </a:prstGeom>
+          <a:ln w="19050">
+            <a:solidFill>
+              <a:srgbClr val="0070C0"/>
+            </a:solidFill>
+            <a:prstDash val="sysDash"/>
+            <a:headEnd type="arrow" w="med" len="med"/>
+            <a:tailEnd type="none" w="med" len="med"/>
+          </a:ln>
+        </p:spPr>
+        <p:style>
+          <a:lnRef idx="1">
+            <a:schemeClr val="accent1"/>
+          </a:lnRef>
+          <a:fillRef idx="0">
+            <a:schemeClr val="accent1"/>
+          </a:fillRef>
+          <a:effectRef idx="0">
+            <a:schemeClr val="accent1"/>
+          </a:effectRef>
+          <a:fontRef idx="minor">
+            <a:schemeClr val="tx1"/>
+          </a:fontRef>
+        </p:style>
+      </p:cxnSp>
+      <p:cxnSp>
+        <p:nvCxnSpPr>
+          <p:cNvPr id="37" name="Straight Arrow Connector 36"/>
+          <p:cNvCxnSpPr/>
+          <p:nvPr/>
+        </p:nvCxnSpPr>
+        <p:spPr>
+          <a:xfrm>
+            <a:off x="1609818" y="3791676"/>
+            <a:ext cx="1196051" cy="0"/>
+          </a:xfrm>
+          <a:prstGeom prst="straightConnector1">
+            <a:avLst/>
+          </a:prstGeom>
+          <a:ln w="19050">
+            <a:solidFill>
+              <a:srgbClr val="00B050"/>
+            </a:solidFill>
+            <a:prstDash val="sysDash"/>
+            <a:headEnd type="arrow" w="med" len="med"/>
+            <a:tailEnd type="none" w="med" len="med"/>
+          </a:ln>
+        </p:spPr>
+        <p:style>
+          <a:lnRef idx="1">
+            <a:schemeClr val="accent1"/>
+          </a:lnRef>
+          <a:fillRef idx="0">
+            <a:schemeClr val="accent1"/>
+          </a:fillRef>
+          <a:effectRef idx="0">
+            <a:schemeClr val="accent1"/>
+          </a:effectRef>
+          <a:fontRef idx="minor">
+            <a:schemeClr val="tx1"/>
+          </a:fontRef>
+        </p:style>
+      </p:cxnSp>
+      <p:cxnSp>
+        <p:nvCxnSpPr>
+          <p:cNvPr id="85" name="Straight Connector 84"/>
+          <p:cNvCxnSpPr/>
+          <p:nvPr/>
+        </p:nvCxnSpPr>
+        <p:spPr>
+          <a:xfrm flipH="1">
+            <a:off x="1533594" y="2549146"/>
+            <a:ext cx="24" cy="1598671"/>
+          </a:xfrm>
+          <a:prstGeom prst="line">
+            <a:avLst/>
+          </a:prstGeom>
+          <a:ln w="19050">
+            <a:solidFill>
+              <a:schemeClr val="tx1"/>
+            </a:solidFill>
+            <a:prstDash val="sysDash"/>
+          </a:ln>
+          <a:effectLst/>
+        </p:spPr>
+        <p:style>
+          <a:lnRef idx="1">
+            <a:schemeClr val="accent1"/>
+          </a:lnRef>
+          <a:fillRef idx="2">
+            <a:schemeClr val="accent1"/>
+          </a:fillRef>
+          <a:effectRef idx="1">
+            <a:schemeClr val="accent1"/>
+          </a:effectRef>
+          <a:fontRef idx="minor">
+            <a:schemeClr val="dk1"/>
+          </a:fontRef>
+        </p:style>
+      </p:cxnSp>
+      <p:grpSp>
+        <p:nvGrpSpPr>
+          <p:cNvPr id="64" name="Group 63">
+            <a:extLst>
+              <a:ext uri="{FF2B5EF4-FFF2-40B4-BE49-F238E27FC236}">
+                <a16:creationId xmlns:a16="http://schemas.microsoft.com/office/drawing/2014/main" id="{3D20EFD2-1695-4F00-9C65-FFD9B26388EE}"/>
+              </a:ext>
+            </a:extLst>
+          </p:cNvPr>
+          <p:cNvGrpSpPr/>
+          <p:nvPr/>
+        </p:nvGrpSpPr>
+        <p:grpSpPr>
+          <a:xfrm flipH="1">
+            <a:off x="7113091" y="3160602"/>
+            <a:ext cx="217349" cy="270072"/>
+            <a:chOff x="1028134" y="5612032"/>
+            <a:chExt cx="217349" cy="270072"/>
+          </a:xfrm>
+        </p:grpSpPr>
+        <p:sp>
+          <p:nvSpPr>
+            <p:cNvPr id="65" name="Freeform 58">
+              <a:extLst>
+                <a:ext uri="{FF2B5EF4-FFF2-40B4-BE49-F238E27FC236}">
+                  <a16:creationId xmlns:a16="http://schemas.microsoft.com/office/drawing/2014/main" id="{F1DE33E6-BC63-47D6-91A8-BDF5596ED8F9}"/>
+                </a:ext>
+              </a:extLst>
+            </p:cNvPr>
+            <p:cNvSpPr/>
+            <p:nvPr/>
+          </p:nvSpPr>
+          <p:spPr>
+            <a:xfrm rot="2600998" flipH="1" flipV="1">
+              <a:off x="1028134" y="5612032"/>
+              <a:ext cx="167452" cy="116880"/>
+            </a:xfrm>
+            <a:custGeom>
+              <a:avLst/>
+              <a:gdLst>
+                <a:gd name="connsiteX0" fmla="*/ 0 w 226400"/>
+                <a:gd name="connsiteY0" fmla="*/ 32920 h 171466"/>
+                <a:gd name="connsiteX1" fmla="*/ 157018 w 226400"/>
+                <a:gd name="connsiteY1" fmla="*/ 5211 h 171466"/>
+                <a:gd name="connsiteX2" fmla="*/ 221673 w 226400"/>
+                <a:gd name="connsiteY2" fmla="*/ 125284 h 171466"/>
+                <a:gd name="connsiteX3" fmla="*/ 36945 w 226400"/>
+                <a:gd name="connsiteY3" fmla="*/ 171466 h 171466"/>
+              </a:gdLst>
+              <a:ahLst/>
+              <a:cxnLst>
+                <a:cxn ang="0">
+                  <a:pos x="connsiteX0" y="connsiteY0"/>
+                </a:cxn>
+                <a:cxn ang="0">
+                  <a:pos x="connsiteX1" y="connsiteY1"/>
+                </a:cxn>
+                <a:cxn ang="0">
+                  <a:pos x="connsiteX2" y="connsiteY2"/>
+                </a:cxn>
+                <a:cxn ang="0">
+                  <a:pos x="connsiteX3" y="connsiteY3"/>
+                </a:cxn>
+              </a:cxnLst>
+              <a:rect l="l" t="t" r="r" b="b"/>
+              <a:pathLst>
+                <a:path w="226400" h="171466">
+                  <a:moveTo>
+                    <a:pt x="0" y="32920"/>
+                  </a:moveTo>
+                  <a:cubicBezTo>
+                    <a:pt x="60036" y="11368"/>
+                    <a:pt x="120073" y="-10183"/>
+                    <a:pt x="157018" y="5211"/>
+                  </a:cubicBezTo>
+                  <a:cubicBezTo>
+                    <a:pt x="193963" y="20605"/>
+                    <a:pt x="241685" y="97575"/>
+                    <a:pt x="221673" y="125284"/>
+                  </a:cubicBezTo>
+                  <a:cubicBezTo>
+                    <a:pt x="201661" y="152993"/>
+                    <a:pt x="119303" y="162229"/>
+                    <a:pt x="36945" y="171466"/>
+                  </a:cubicBezTo>
+                </a:path>
+              </a:pathLst>
+            </a:custGeom>
+            <a:ln w="19050">
               <a:solidFill>
                 <a:schemeClr val="accent6">
                   <a:lumMod val="75000"/>
                 </a:schemeClr>
               </a:solidFill>
-            </a:endParaRPr>
+              <a:headEnd type="arrow" w="med" len="med"/>
+              <a:tailEnd type="none" w="med" len="med"/>
+            </a:ln>
+          </p:spPr>
+          <p:style>
+            <a:lnRef idx="1">
+              <a:schemeClr val="accent1"/>
+            </a:lnRef>
+            <a:fillRef idx="0">
+              <a:schemeClr val="accent1"/>
+            </a:fillRef>
+            <a:effectRef idx="0">
+              <a:schemeClr val="accent1"/>
+            </a:effectRef>
+            <a:fontRef idx="minor">
+              <a:schemeClr val="tx1"/>
+            </a:fontRef>
+          </p:style>
+          <p:txBody>
+            <a:bodyPr rtlCol="0" anchor="ctr"/>
+            <a:lstStyle/>
+            <a:p>
+              <a:pPr algn="ctr"/>
+              <a:endParaRPr lang="en-SG"/>
+            </a:p>
+          </p:txBody>
+        </p:sp>
+        <p:sp>
+          <p:nvSpPr>
+            <p:cNvPr id="71" name="Rectangle 70">
+              <a:extLst>
+                <a:ext uri="{FF2B5EF4-FFF2-40B4-BE49-F238E27FC236}">
+                  <a16:creationId xmlns:a16="http://schemas.microsoft.com/office/drawing/2014/main" id="{B752685F-1F92-49BD-9261-BDEA2807B0E0}"/>
+                </a:ext>
+              </a:extLst>
+            </p:cNvPr>
+            <p:cNvSpPr/>
+            <p:nvPr/>
+          </p:nvSpPr>
+          <p:spPr>
+            <a:xfrm>
+              <a:off x="1147403" y="5712513"/>
+              <a:ext cx="98080" cy="169591"/>
+            </a:xfrm>
+            <a:prstGeom prst="rect">
+              <a:avLst/>
+            </a:prstGeom>
+            <a:solidFill>
+              <a:schemeClr val="accent6">
+                <a:lumMod val="75000"/>
+              </a:schemeClr>
+            </a:solidFill>
+            <a:ln>
+              <a:solidFill>
+                <a:schemeClr val="bg1"/>
+              </a:solidFill>
+            </a:ln>
+            <a:effectLst/>
+          </p:spPr>
+          <p:style>
+            <a:lnRef idx="1">
+              <a:schemeClr val="accent3"/>
+            </a:lnRef>
+            <a:fillRef idx="2">
+              <a:schemeClr val="accent3"/>
+            </a:fillRef>
+            <a:effectRef idx="1">
+              <a:schemeClr val="accent3"/>
+            </a:effectRef>
+            <a:fontRef idx="minor">
+              <a:schemeClr val="dk1"/>
+            </a:fontRef>
+          </p:style>
+          <p:txBody>
+            <a:bodyPr rtlCol="0" anchor="ctr"/>
+            <a:lstStyle/>
+            <a:p>
+              <a:pPr algn="ctr"/>
+              <a:endParaRPr lang="en-SG" sz="1400">
+                <a:solidFill>
+                  <a:schemeClr val="dk1"/>
+                </a:solidFill>
+              </a:endParaRPr>
+            </a:p>
+          </p:txBody>
+        </p:sp>
+      </p:grpSp>
+      <p:sp>
+        <p:nvSpPr>
+          <p:cNvPr id="73" name="TextBox 72">
+            <a:extLst>
+              <a:ext uri="{FF2B5EF4-FFF2-40B4-BE49-F238E27FC236}">
+                <a16:creationId xmlns:a16="http://schemas.microsoft.com/office/drawing/2014/main" id="{C6A7CC11-BC3A-4233-BF33-9D4913AA62A2}"/>
+              </a:ext>
+            </a:extLst>
+          </p:cNvPr>
+          <p:cNvSpPr txBox="1"/>
+          <p:nvPr/>
+        </p:nvSpPr>
+        <p:spPr>
+          <a:xfrm>
+            <a:off x="7437899" y="3066277"/>
+            <a:ext cx="539047" cy="430887"/>
+          </a:xfrm>
+          <a:prstGeom prst="rect">
+            <a:avLst/>
+          </a:prstGeom>
+          <a:noFill/>
+        </p:spPr>
+        <p:txBody>
+          <a:bodyPr wrap="square" lIns="0" tIns="0" rIns="0" bIns="0" rtlCol="0">
+            <a:spAutoFit/>
+          </a:bodyPr>
+          <a:lstStyle/>
+          <a:p>
+            <a:r>
+              <a:rPr lang="en-US" sz="1400" dirty="0">
+                <a:solidFill>
+                  <a:schemeClr val="accent6">
+                    <a:lumMod val="75000"/>
+                  </a:schemeClr>
+                </a:solidFill>
+              </a:rPr>
+              <a:t>Save </a:t>
+            </a:r>
+            <a:br>
+              <a:rPr lang="en-US" sz="1400" dirty="0">
+                <a:solidFill>
+                  <a:schemeClr val="accent6">
+                    <a:lumMod val="75000"/>
+                  </a:schemeClr>
+                </a:solidFill>
+              </a:rPr>
+            </a:br>
+            <a:r>
+              <a:rPr lang="en-US" sz="1400" dirty="0">
+                <a:solidFill>
+                  <a:schemeClr val="accent6">
+                    <a:lumMod val="75000"/>
+                  </a:schemeClr>
+                </a:solidFill>
+              </a:rPr>
+              <a:t>to file</a:t>
+            </a:r>
           </a:p>
         </p:txBody>
       </p:sp>
     </p:spTree>
     <p:extLst>
       <p:ext uri="{BB962C8B-B14F-4D97-AF65-F5344CB8AC3E}">
-        <p14:creationId xmlns:p14="http://schemas.microsoft.com/office/powerpoint/2010/main" val="4023378879"/>
+        <p14:creationId xmlns:p14="http://schemas.microsoft.com/office/powerpoint/2010/main" val="4257321233"/>
+      </p:ext>
+    </p:extLst>
+  </p:cSld>
+  <p:clrMapOvr>
+    <a:masterClrMapping/>
+  </p:clrMapOvr>
+</p:sld>
+</file>
+
+<file path=ppt/slides/slide3.xml><?xml version="1.0" encoding="utf-8"?>
+<p:sld xmlns:a="http://schemas.openxmlformats.org/drawingml/2006/main" xmlns:r="http://schemas.openxmlformats.org/officeDocument/2006/relationships" xmlns:p="http://schemas.openxmlformats.org/presentationml/2006/main">
+  <p:cSld>
+    <p:spTree>
+      <p:nvGrpSpPr>
+        <p:cNvPr id="1" name=""/>
+        <p:cNvGrpSpPr/>
+        <p:nvPr/>
+      </p:nvGrpSpPr>
+      <p:grpSpPr>
+        <a:xfrm>
+          <a:off x="0" y="0"/>
+          <a:ext cx="0" cy="0"/>
+          <a:chOff x="0" y="0"/>
+          <a:chExt cx="0" cy="0"/>
+        </a:xfrm>
+      </p:grpSpPr>
+      <p:sp>
+        <p:nvSpPr>
+          <p:cNvPr id="2" name="Rectangle 62"/>
+          <p:cNvSpPr/>
+          <p:nvPr/>
+        </p:nvSpPr>
+        <p:spPr>
+          <a:xfrm>
+            <a:off x="2887981" y="1886614"/>
+            <a:ext cx="1661149" cy="346760"/>
+          </a:xfrm>
+          <a:prstGeom prst="rect">
+            <a:avLst/>
+          </a:prstGeom>
+          <a:solidFill>
+            <a:srgbClr val="00B050"/>
+          </a:solidFill>
+          <a:ln w="19050">
+            <a:solidFill>
+              <a:srgbClr val="00B050"/>
+            </a:solidFill>
+          </a:ln>
+          <a:effectLst/>
+        </p:spPr>
+        <p:style>
+          <a:lnRef idx="1">
+            <a:schemeClr val="accent2"/>
+          </a:lnRef>
+          <a:fillRef idx="2">
+            <a:schemeClr val="accent2"/>
+          </a:fillRef>
+          <a:effectRef idx="1">
+            <a:schemeClr val="accent2"/>
+          </a:effectRef>
+          <a:fontRef idx="minor">
+            <a:schemeClr val="dk1"/>
+          </a:fontRef>
+        </p:style>
+        <p:txBody>
+          <a:bodyPr rtlCol="0" anchor="ctr"/>
+          <a:lstStyle/>
+          <a:p>
+            <a:pPr algn="ctr"/>
+            <a:r>
+              <a:rPr lang="en-US" sz="1600" dirty="0">
+                <a:solidFill>
+                  <a:srgbClr val="FFFFFF"/>
+                </a:solidFill>
+              </a:rPr>
+              <a:t>:</a:t>
+            </a:r>
+            <a:r>
+              <a:rPr lang="en-US" sz="1600" dirty="0" err="1">
+                <a:solidFill>
+                  <a:srgbClr val="FFFFFF"/>
+                </a:solidFill>
+              </a:rPr>
+              <a:t>ThemeCommand</a:t>
+            </a:r>
+            <a:endParaRPr lang="en-SG" sz="1600" dirty="0">
+              <a:solidFill>
+                <a:srgbClr val="FFFFFF"/>
+              </a:solidFill>
+            </a:endParaRPr>
+          </a:p>
+        </p:txBody>
+      </p:sp>
+      <p:cxnSp>
+        <p:nvCxnSpPr>
+          <p:cNvPr id="5" name="Straight Connector 4"/>
+          <p:cNvCxnSpPr/>
+          <p:nvPr/>
+        </p:nvCxnSpPr>
+        <p:spPr>
+          <a:xfrm>
+            <a:off x="3716077" y="2250284"/>
+            <a:ext cx="0" cy="2743200"/>
+          </a:xfrm>
+          <a:prstGeom prst="line">
+            <a:avLst/>
+          </a:prstGeom>
+          <a:ln w="19050">
+            <a:solidFill>
+              <a:srgbClr val="00B050"/>
+            </a:solidFill>
+            <a:prstDash val="sysDash"/>
+          </a:ln>
+          <a:effectLst/>
+        </p:spPr>
+        <p:style>
+          <a:lnRef idx="1">
+            <a:schemeClr val="accent1"/>
+          </a:lnRef>
+          <a:fillRef idx="2">
+            <a:schemeClr val="accent1"/>
+          </a:fillRef>
+          <a:effectRef idx="1">
+            <a:schemeClr val="accent1"/>
+          </a:effectRef>
+          <a:fontRef idx="minor">
+            <a:schemeClr val="dk1"/>
+          </a:fontRef>
+        </p:style>
+      </p:cxnSp>
+      <p:sp>
+        <p:nvSpPr>
+          <p:cNvPr id="6" name="Rectangle 5"/>
+          <p:cNvSpPr/>
+          <p:nvPr/>
+        </p:nvSpPr>
+        <p:spPr>
+          <a:xfrm>
+            <a:off x="3648292" y="2595523"/>
+            <a:ext cx="152400" cy="1828800"/>
+          </a:xfrm>
+          <a:prstGeom prst="rect">
+            <a:avLst/>
+          </a:prstGeom>
+          <a:solidFill>
+            <a:srgbClr val="00B050"/>
+          </a:solidFill>
+          <a:ln>
+            <a:solidFill>
+              <a:srgbClr val="00B050"/>
+            </a:solidFill>
+          </a:ln>
+          <a:effectLst/>
+        </p:spPr>
+        <p:style>
+          <a:lnRef idx="1">
+            <a:schemeClr val="accent3"/>
+          </a:lnRef>
+          <a:fillRef idx="2">
+            <a:schemeClr val="accent3"/>
+          </a:fillRef>
+          <a:effectRef idx="1">
+            <a:schemeClr val="accent3"/>
+          </a:effectRef>
+          <a:fontRef idx="minor">
+            <a:schemeClr val="dk1"/>
+          </a:fontRef>
+        </p:style>
+        <p:txBody>
+          <a:bodyPr rtlCol="0" anchor="ctr"/>
+          <a:lstStyle/>
+          <a:p>
+            <a:pPr algn="ctr"/>
+            <a:endParaRPr lang="en-SG" sz="1400">
+              <a:solidFill>
+                <a:schemeClr val="dk1"/>
+              </a:solidFill>
+            </a:endParaRPr>
+          </a:p>
+        </p:txBody>
+      </p:sp>
+      <p:sp>
+        <p:nvSpPr>
+          <p:cNvPr id="16" name="Rectangle 62"/>
+          <p:cNvSpPr/>
+          <p:nvPr/>
+        </p:nvSpPr>
+        <p:spPr>
+          <a:xfrm>
+            <a:off x="5392983" y="1890301"/>
+            <a:ext cx="1093635" cy="346760"/>
+          </a:xfrm>
+          <a:prstGeom prst="rect">
+            <a:avLst/>
+          </a:prstGeom>
+          <a:solidFill>
+            <a:srgbClr val="0070C0"/>
+          </a:solidFill>
+          <a:ln w="19050">
+            <a:solidFill>
+              <a:srgbClr val="0070C0"/>
+            </a:solidFill>
+          </a:ln>
+          <a:effectLst/>
+        </p:spPr>
+        <p:style>
+          <a:lnRef idx="1">
+            <a:schemeClr val="accent2"/>
+          </a:lnRef>
+          <a:fillRef idx="2">
+            <a:schemeClr val="accent2"/>
+          </a:fillRef>
+          <a:effectRef idx="1">
+            <a:schemeClr val="accent2"/>
+          </a:effectRef>
+          <a:fontRef idx="minor">
+            <a:schemeClr val="dk1"/>
+          </a:fontRef>
+        </p:style>
+        <p:txBody>
+          <a:bodyPr rtlCol="0" anchor="ctr"/>
+          <a:lstStyle/>
+          <a:p>
+            <a:pPr algn="ctr"/>
+            <a:r>
+              <a:rPr lang="en-US" sz="1600" dirty="0">
+                <a:solidFill>
+                  <a:schemeClr val="bg1"/>
+                </a:solidFill>
+              </a:rPr>
+              <a:t>:</a:t>
+            </a:r>
+            <a:r>
+              <a:rPr lang="en-US" sz="1600" dirty="0" err="1">
+                <a:solidFill>
+                  <a:schemeClr val="bg1"/>
+                </a:solidFill>
+              </a:rPr>
+              <a:t>UiTheme</a:t>
+            </a:r>
+            <a:endParaRPr lang="en-SG" sz="1600" dirty="0">
+              <a:solidFill>
+                <a:schemeClr val="bg1"/>
+              </a:solidFill>
+            </a:endParaRPr>
+          </a:p>
+        </p:txBody>
+      </p:sp>
+      <p:cxnSp>
+        <p:nvCxnSpPr>
+          <p:cNvPr id="17" name="Straight Connector 16"/>
+          <p:cNvCxnSpPr/>
+          <p:nvPr/>
+        </p:nvCxnSpPr>
+        <p:spPr>
+          <a:xfrm>
+            <a:off x="5939800" y="2253971"/>
+            <a:ext cx="0" cy="2743200"/>
+          </a:xfrm>
+          <a:prstGeom prst="line">
+            <a:avLst/>
+          </a:prstGeom>
+          <a:ln w="19050">
+            <a:solidFill>
+              <a:srgbClr val="0070C0"/>
+            </a:solidFill>
+            <a:prstDash val="sysDash"/>
+          </a:ln>
+          <a:effectLst/>
+        </p:spPr>
+        <p:style>
+          <a:lnRef idx="1">
+            <a:schemeClr val="accent1"/>
+          </a:lnRef>
+          <a:fillRef idx="2">
+            <a:schemeClr val="accent1"/>
+          </a:fillRef>
+          <a:effectRef idx="1">
+            <a:schemeClr val="accent1"/>
+          </a:effectRef>
+          <a:fontRef idx="minor">
+            <a:schemeClr val="dk1"/>
+          </a:fontRef>
+        </p:style>
+      </p:cxnSp>
+      <p:sp>
+        <p:nvSpPr>
+          <p:cNvPr id="18" name="Rectangle 17"/>
+          <p:cNvSpPr/>
+          <p:nvPr/>
+        </p:nvSpPr>
+        <p:spPr>
+          <a:xfrm>
+            <a:off x="5867792" y="2712165"/>
+            <a:ext cx="144016" cy="457200"/>
+          </a:xfrm>
+          <a:prstGeom prst="rect">
+            <a:avLst/>
+          </a:prstGeom>
+          <a:solidFill>
+            <a:srgbClr val="0070C0"/>
+          </a:solidFill>
+          <a:ln>
+            <a:solidFill>
+              <a:srgbClr val="0070C0"/>
+            </a:solidFill>
+          </a:ln>
+          <a:effectLst/>
+        </p:spPr>
+        <p:style>
+          <a:lnRef idx="1">
+            <a:schemeClr val="accent3"/>
+          </a:lnRef>
+          <a:fillRef idx="2">
+            <a:schemeClr val="accent3"/>
+          </a:fillRef>
+          <a:effectRef idx="1">
+            <a:schemeClr val="accent3"/>
+          </a:effectRef>
+          <a:fontRef idx="minor">
+            <a:schemeClr val="dk1"/>
+          </a:fontRef>
+        </p:style>
+        <p:txBody>
+          <a:bodyPr rtlCol="0" anchor="ctr"/>
+          <a:lstStyle/>
+          <a:p>
+            <a:pPr algn="ctr"/>
+            <a:endParaRPr lang="en-SG" sz="1400">
+              <a:solidFill>
+                <a:schemeClr val="dk1"/>
+              </a:solidFill>
+            </a:endParaRPr>
+          </a:p>
+        </p:txBody>
+      </p:sp>
+      <p:cxnSp>
+        <p:nvCxnSpPr>
+          <p:cNvPr id="23" name="Straight Arrow Connector 22"/>
+          <p:cNvCxnSpPr/>
+          <p:nvPr/>
+        </p:nvCxnSpPr>
+        <p:spPr>
+          <a:xfrm>
+            <a:off x="2524218" y="2604667"/>
+            <a:ext cx="1119851" cy="0"/>
+          </a:xfrm>
+          <a:prstGeom prst="straightConnector1">
+            <a:avLst/>
+          </a:prstGeom>
+          <a:ln w="19050">
+            <a:solidFill>
+              <a:schemeClr val="tx1"/>
+            </a:solidFill>
+            <a:tailEnd type="arrow"/>
+          </a:ln>
+        </p:spPr>
+        <p:style>
+          <a:lnRef idx="1">
+            <a:schemeClr val="accent1"/>
+          </a:lnRef>
+          <a:fillRef idx="0">
+            <a:schemeClr val="accent1"/>
+          </a:fillRef>
+          <a:effectRef idx="0">
+            <a:schemeClr val="accent1"/>
+          </a:effectRef>
+          <a:fontRef idx="minor">
+            <a:schemeClr val="tx1"/>
+          </a:fontRef>
+        </p:style>
+      </p:cxnSp>
+      <p:cxnSp>
+        <p:nvCxnSpPr>
+          <p:cNvPr id="25" name="Straight Arrow Connector 24"/>
+          <p:cNvCxnSpPr/>
+          <p:nvPr/>
+        </p:nvCxnSpPr>
+        <p:spPr>
+          <a:xfrm>
+            <a:off x="3796469" y="2712166"/>
+            <a:ext cx="2071323" cy="0"/>
+          </a:xfrm>
+          <a:prstGeom prst="straightConnector1">
+            <a:avLst/>
+          </a:prstGeom>
+          <a:ln w="19050">
+            <a:solidFill>
+              <a:srgbClr val="00B050"/>
+            </a:solidFill>
+            <a:tailEnd type="arrow"/>
+          </a:ln>
+        </p:spPr>
+        <p:style>
+          <a:lnRef idx="1">
+            <a:schemeClr val="accent1"/>
+          </a:lnRef>
+          <a:fillRef idx="0">
+            <a:schemeClr val="accent1"/>
+          </a:fillRef>
+          <a:effectRef idx="0">
+            <a:schemeClr val="accent1"/>
+          </a:effectRef>
+          <a:fontRef idx="minor">
+            <a:schemeClr val="tx1"/>
+          </a:fontRef>
+        </p:style>
+      </p:cxnSp>
+      <p:sp>
+        <p:nvSpPr>
+          <p:cNvPr id="26" name="TextBox 25"/>
+          <p:cNvSpPr txBox="1"/>
+          <p:nvPr/>
+        </p:nvSpPr>
+        <p:spPr>
+          <a:xfrm>
+            <a:off x="1935150" y="2305520"/>
+            <a:ext cx="1780927" cy="215444"/>
+          </a:xfrm>
+          <a:prstGeom prst="rect">
+            <a:avLst/>
+          </a:prstGeom>
+          <a:noFill/>
+        </p:spPr>
+        <p:txBody>
+          <a:bodyPr wrap="square" lIns="0" tIns="0" rIns="0" bIns="0" rtlCol="0">
+            <a:spAutoFit/>
+          </a:bodyPr>
+          <a:lstStyle/>
+          <a:p>
+            <a:r>
+              <a:rPr lang="en-US" sz="1400" dirty="0"/>
+              <a:t>execute(“theme night”)</a:t>
+            </a:r>
+          </a:p>
+        </p:txBody>
+      </p:sp>
+      <p:cxnSp>
+        <p:nvCxnSpPr>
+          <p:cNvPr id="35" name="Straight Arrow Connector 34"/>
+          <p:cNvCxnSpPr/>
+          <p:nvPr/>
+        </p:nvCxnSpPr>
+        <p:spPr>
+          <a:xfrm>
+            <a:off x="3796469" y="4188011"/>
+            <a:ext cx="2058118" cy="0"/>
+          </a:xfrm>
+          <a:prstGeom prst="straightConnector1">
+            <a:avLst/>
+          </a:prstGeom>
+          <a:ln w="19050">
+            <a:solidFill>
+              <a:srgbClr val="0070C0"/>
+            </a:solidFill>
+            <a:prstDash val="sysDash"/>
+            <a:headEnd type="arrow" w="med" len="med"/>
+            <a:tailEnd type="none" w="med" len="med"/>
+          </a:ln>
+        </p:spPr>
+        <p:style>
+          <a:lnRef idx="1">
+            <a:schemeClr val="accent1"/>
+          </a:lnRef>
+          <a:fillRef idx="0">
+            <a:schemeClr val="accent1"/>
+          </a:fillRef>
+          <a:effectRef idx="0">
+            <a:schemeClr val="accent1"/>
+          </a:effectRef>
+          <a:fontRef idx="minor">
+            <a:schemeClr val="tx1"/>
+          </a:fontRef>
+        </p:style>
+      </p:cxnSp>
+      <p:cxnSp>
+        <p:nvCxnSpPr>
+          <p:cNvPr id="37" name="Straight Arrow Connector 36"/>
+          <p:cNvCxnSpPr/>
+          <p:nvPr/>
+        </p:nvCxnSpPr>
+        <p:spPr>
+          <a:xfrm>
+            <a:off x="2448018" y="3620890"/>
+            <a:ext cx="1196051" cy="0"/>
+          </a:xfrm>
+          <a:prstGeom prst="straightConnector1">
+            <a:avLst/>
+          </a:prstGeom>
+          <a:ln w="19050">
+            <a:solidFill>
+              <a:srgbClr val="00B050"/>
+            </a:solidFill>
+            <a:prstDash val="sysDash"/>
+            <a:headEnd type="arrow" w="med" len="med"/>
+            <a:tailEnd type="none" w="med" len="med"/>
+          </a:ln>
+        </p:spPr>
+        <p:style>
+          <a:lnRef idx="1">
+            <a:schemeClr val="accent1"/>
+          </a:lnRef>
+          <a:fillRef idx="0">
+            <a:schemeClr val="accent1"/>
+          </a:fillRef>
+          <a:effectRef idx="0">
+            <a:schemeClr val="accent1"/>
+          </a:effectRef>
+          <a:fontRef idx="minor">
+            <a:schemeClr val="tx1"/>
+          </a:fontRef>
+        </p:style>
+      </p:cxnSp>
+      <p:sp>
+        <p:nvSpPr>
+          <p:cNvPr id="32" name="Rectangle 31">
+            <a:extLst>
+              <a:ext uri="{FF2B5EF4-FFF2-40B4-BE49-F238E27FC236}">
+                <a16:creationId xmlns:a16="http://schemas.microsoft.com/office/drawing/2014/main" id="{039D68F2-1BF8-4065-9B96-F75B42C590BC}"/>
+              </a:ext>
+            </a:extLst>
+          </p:cNvPr>
+          <p:cNvSpPr/>
+          <p:nvPr/>
+        </p:nvSpPr>
+        <p:spPr>
+          <a:xfrm>
+            <a:off x="5867792" y="3749099"/>
+            <a:ext cx="144016" cy="457200"/>
+          </a:xfrm>
+          <a:prstGeom prst="rect">
+            <a:avLst/>
+          </a:prstGeom>
+          <a:solidFill>
+            <a:srgbClr val="0070C0"/>
+          </a:solidFill>
+          <a:ln>
+            <a:solidFill>
+              <a:srgbClr val="0070C0"/>
+            </a:solidFill>
+          </a:ln>
+          <a:effectLst/>
+        </p:spPr>
+        <p:style>
+          <a:lnRef idx="1">
+            <a:schemeClr val="accent3"/>
+          </a:lnRef>
+          <a:fillRef idx="2">
+            <a:schemeClr val="accent3"/>
+          </a:fillRef>
+          <a:effectRef idx="1">
+            <a:schemeClr val="accent3"/>
+          </a:effectRef>
+          <a:fontRef idx="minor">
+            <a:schemeClr val="dk1"/>
+          </a:fontRef>
+        </p:style>
+        <p:txBody>
+          <a:bodyPr rtlCol="0" anchor="ctr"/>
+          <a:lstStyle/>
+          <a:p>
+            <a:pPr algn="ctr"/>
+            <a:endParaRPr lang="en-SG" sz="1400">
+              <a:solidFill>
+                <a:schemeClr val="dk1"/>
+              </a:solidFill>
+            </a:endParaRPr>
+          </a:p>
+        </p:txBody>
+      </p:sp>
+      <p:cxnSp>
+        <p:nvCxnSpPr>
+          <p:cNvPr id="33" name="Straight Arrow Connector 32">
+            <a:extLst>
+              <a:ext uri="{FF2B5EF4-FFF2-40B4-BE49-F238E27FC236}">
+                <a16:creationId xmlns:a16="http://schemas.microsoft.com/office/drawing/2014/main" id="{2394BE3B-4BF9-4959-A317-B805C45738BB}"/>
+              </a:ext>
+            </a:extLst>
+          </p:cNvPr>
+          <p:cNvCxnSpPr/>
+          <p:nvPr/>
+        </p:nvCxnSpPr>
+        <p:spPr>
+          <a:xfrm>
+            <a:off x="3796469" y="3749099"/>
+            <a:ext cx="2071323" cy="0"/>
+          </a:xfrm>
+          <a:prstGeom prst="straightConnector1">
+            <a:avLst/>
+          </a:prstGeom>
+          <a:ln w="19050">
+            <a:solidFill>
+              <a:srgbClr val="00B050"/>
+            </a:solidFill>
+            <a:tailEnd type="arrow"/>
+          </a:ln>
+        </p:spPr>
+        <p:style>
+          <a:lnRef idx="1">
+            <a:schemeClr val="accent1"/>
+          </a:lnRef>
+          <a:fillRef idx="0">
+            <a:schemeClr val="accent1"/>
+          </a:fillRef>
+          <a:effectRef idx="0">
+            <a:schemeClr val="accent1"/>
+          </a:effectRef>
+          <a:fontRef idx="minor">
+            <a:schemeClr val="tx1"/>
+          </a:fontRef>
+        </p:style>
+      </p:cxnSp>
+      <p:cxnSp>
+        <p:nvCxnSpPr>
+          <p:cNvPr id="36" name="Straight Arrow Connector 35">
+            <a:extLst>
+              <a:ext uri="{FF2B5EF4-FFF2-40B4-BE49-F238E27FC236}">
+                <a16:creationId xmlns:a16="http://schemas.microsoft.com/office/drawing/2014/main" id="{D22F66C8-87E2-4927-903F-30AF080D4994}"/>
+              </a:ext>
+            </a:extLst>
+          </p:cNvPr>
+          <p:cNvCxnSpPr/>
+          <p:nvPr/>
+        </p:nvCxnSpPr>
+        <p:spPr>
+          <a:xfrm>
+            <a:off x="3803071" y="3157330"/>
+            <a:ext cx="2058118" cy="0"/>
+          </a:xfrm>
+          <a:prstGeom prst="straightConnector1">
+            <a:avLst/>
+          </a:prstGeom>
+          <a:ln w="19050">
+            <a:solidFill>
+              <a:srgbClr val="0070C0"/>
+            </a:solidFill>
+            <a:prstDash val="sysDash"/>
+            <a:headEnd type="arrow" w="med" len="med"/>
+            <a:tailEnd type="none" w="med" len="med"/>
+          </a:ln>
+        </p:spPr>
+        <p:style>
+          <a:lnRef idx="1">
+            <a:schemeClr val="accent1"/>
+          </a:lnRef>
+          <a:fillRef idx="0">
+            <a:schemeClr val="accent1"/>
+          </a:fillRef>
+          <a:effectRef idx="0">
+            <a:schemeClr val="accent1"/>
+          </a:effectRef>
+          <a:fontRef idx="minor">
+            <a:schemeClr val="tx1"/>
+          </a:fontRef>
+        </p:style>
+      </p:cxnSp>
+      <p:sp>
+        <p:nvSpPr>
+          <p:cNvPr id="14" name="TextBox 13">
+            <a:extLst>
+              <a:ext uri="{FF2B5EF4-FFF2-40B4-BE49-F238E27FC236}">
+                <a16:creationId xmlns:a16="http://schemas.microsoft.com/office/drawing/2014/main" id="{960CE8BF-0A21-4DAF-8057-4EC4CA1DECDF}"/>
+              </a:ext>
+            </a:extLst>
+          </p:cNvPr>
+          <p:cNvSpPr txBox="1"/>
+          <p:nvPr/>
+        </p:nvSpPr>
+        <p:spPr>
+          <a:xfrm>
+            <a:off x="3568487" y="4837301"/>
+            <a:ext cx="295180" cy="369332"/>
+          </a:xfrm>
+          <a:prstGeom prst="rect">
+            <a:avLst/>
+          </a:prstGeom>
+          <a:noFill/>
+        </p:spPr>
+        <p:txBody>
+          <a:bodyPr wrap="square" rtlCol="0">
+            <a:spAutoFit/>
+          </a:bodyPr>
+          <a:lstStyle/>
+          <a:p>
+            <a:r>
+              <a:rPr lang="en-US" dirty="0"/>
+              <a:t>X</a:t>
+            </a:r>
+          </a:p>
+        </p:txBody>
+      </p:sp>
+      <p:sp>
+        <p:nvSpPr>
+          <p:cNvPr id="40" name="TextBox 39">
+            <a:extLst>
+              <a:ext uri="{FF2B5EF4-FFF2-40B4-BE49-F238E27FC236}">
+                <a16:creationId xmlns:a16="http://schemas.microsoft.com/office/drawing/2014/main" id="{0E2E5288-6E88-4367-8544-5B6B8AB6732A}"/>
+              </a:ext>
+            </a:extLst>
+          </p:cNvPr>
+          <p:cNvSpPr txBox="1"/>
+          <p:nvPr/>
+        </p:nvSpPr>
+        <p:spPr>
+          <a:xfrm>
+            <a:off x="4343400" y="2438400"/>
+            <a:ext cx="1780927" cy="215444"/>
+          </a:xfrm>
+          <a:prstGeom prst="rect">
+            <a:avLst/>
+          </a:prstGeom>
+          <a:noFill/>
+        </p:spPr>
+        <p:txBody>
+          <a:bodyPr wrap="square" lIns="0" tIns="0" rIns="0" bIns="0" rtlCol="0">
+            <a:spAutoFit/>
+          </a:bodyPr>
+          <a:lstStyle/>
+          <a:p>
+            <a:r>
+              <a:rPr lang="en-US" sz="1400" dirty="0" err="1">
+                <a:solidFill>
+                  <a:srgbClr val="00B050"/>
+                </a:solidFill>
+              </a:rPr>
+              <a:t>getInstance</a:t>
+            </a:r>
+            <a:r>
+              <a:rPr lang="en-US" sz="1400" dirty="0">
+                <a:solidFill>
+                  <a:srgbClr val="00B050"/>
+                </a:solidFill>
+              </a:rPr>
+              <a:t>()</a:t>
+            </a:r>
+          </a:p>
+        </p:txBody>
+      </p:sp>
+      <p:sp>
+        <p:nvSpPr>
+          <p:cNvPr id="41" name="TextBox 40">
+            <a:extLst>
+              <a:ext uri="{FF2B5EF4-FFF2-40B4-BE49-F238E27FC236}">
+                <a16:creationId xmlns:a16="http://schemas.microsoft.com/office/drawing/2014/main" id="{38995285-C7F6-41C3-B322-DC21E2B6975A}"/>
+              </a:ext>
+            </a:extLst>
+          </p:cNvPr>
+          <p:cNvSpPr txBox="1"/>
+          <p:nvPr/>
+        </p:nvSpPr>
+        <p:spPr>
+          <a:xfrm>
+            <a:off x="4053840" y="3463175"/>
+            <a:ext cx="1780927" cy="215444"/>
+          </a:xfrm>
+          <a:prstGeom prst="rect">
+            <a:avLst/>
+          </a:prstGeom>
+          <a:noFill/>
+        </p:spPr>
+        <p:txBody>
+          <a:bodyPr wrap="square" lIns="0" tIns="0" rIns="0" bIns="0" rtlCol="0">
+            <a:spAutoFit/>
+          </a:bodyPr>
+          <a:lstStyle/>
+          <a:p>
+            <a:r>
+              <a:rPr lang="en-US" sz="1400" dirty="0" err="1">
+                <a:solidFill>
+                  <a:srgbClr val="00B050"/>
+                </a:solidFill>
+              </a:rPr>
+              <a:t>changeTheme</a:t>
+            </a:r>
+            <a:r>
+              <a:rPr lang="en-US" sz="1400" dirty="0">
+                <a:solidFill>
+                  <a:srgbClr val="00B050"/>
+                </a:solidFill>
+              </a:rPr>
+              <a:t>(“night”)</a:t>
+            </a:r>
+          </a:p>
+        </p:txBody>
+      </p:sp>
+    </p:spTree>
+    <p:extLst>
+      <p:ext uri="{BB962C8B-B14F-4D97-AF65-F5344CB8AC3E}">
+        <p14:creationId xmlns:p14="http://schemas.microsoft.com/office/powerpoint/2010/main" val="3136203737"/>
       </p:ext>
     </p:extLst>
   </p:cSld>

</xml_diff>

<commit_message>
Fixed collated file and renamed collated file
</commit_message>
<xml_diff>
--- a/docs/diagrams/HighLevelSequenceDiagrams.pptx
+++ b/docs/diagrams/HighLevelSequenceDiagrams.pptx
@@ -4182,7 +4182,7 @@
           <a:p>
             <a:r>
               <a:rPr lang="en-US" sz="1400" dirty="0" smtClean="0"/>
-              <a:t>delete 1</a:t>
+              <a:t>Add avatar</a:t>
             </a:r>
             <a:endParaRPr lang="en-US" sz="1400" dirty="0"/>
           </a:p>
@@ -4232,8 +4232,8 @@
         </p:nvSpPr>
         <p:spPr>
           <a:xfrm>
-            <a:off x="2166172" y="1453379"/>
-            <a:ext cx="1424846" cy="215444"/>
+            <a:off x="1901200" y="1453379"/>
+            <a:ext cx="1689818" cy="215444"/>
           </a:xfrm>
           <a:prstGeom prst="rect">
             <a:avLst/>
@@ -4252,7 +4252,31 @@
                   <a:srgbClr val="0070C0"/>
                 </a:solidFill>
               </a:rPr>
-              <a:t>execute(“delete 1”)</a:t>
+              <a:t>execute</a:t>
+            </a:r>
+            <a:r>
+              <a:rPr lang="en-US" sz="1400" dirty="0" smtClean="0">
+                <a:solidFill>
+                  <a:srgbClr val="0070C0"/>
+                </a:solidFill>
+              </a:rPr>
+              <a:t>(“avatar 2 </a:t>
+            </a:r>
+            <a:r>
+              <a:rPr lang="en-US" sz="1400" dirty="0" err="1" smtClean="0">
+                <a:solidFill>
+                  <a:srgbClr val="0070C0"/>
+                </a:solidFill>
+              </a:rPr>
+              <a:t>url</a:t>
+            </a:r>
+            <a:r>
+              <a:rPr lang="en-US" sz="1400" dirty="0" smtClean="0">
+                <a:solidFill>
+                  <a:srgbClr val="0070C0"/>
+                </a:solidFill>
+              </a:rPr>
+              <a:t>”)</a:t>
             </a:r>
             <a:endParaRPr lang="en-US" sz="1400" dirty="0">
               <a:solidFill>
@@ -4306,8 +4330,8 @@
         </p:nvSpPr>
         <p:spPr>
           <a:xfrm>
-            <a:off x="4299772" y="1542583"/>
-            <a:ext cx="1424846" cy="215444"/>
+            <a:off x="3986772" y="1542583"/>
+            <a:ext cx="1737846" cy="215444"/>
           </a:xfrm>
           <a:prstGeom prst="rect">
             <a:avLst/>
@@ -4326,7 +4350,7 @@
                   <a:srgbClr val="7030A0"/>
                 </a:solidFill>
               </a:rPr>
-              <a:t>deletePerson</a:t>
+              <a:t>extractPersonIndex</a:t>
             </a:r>
             <a:r>
               <a:rPr lang="en-US" sz="1400" dirty="0" smtClean="0">
@@ -4334,7 +4358,7 @@
                   <a:srgbClr val="7030A0"/>
                 </a:solidFill>
               </a:rPr>
-              <a:t>(p)</a:t>
+              <a:t>()</a:t>
             </a:r>
             <a:endParaRPr lang="en-US" sz="1400" dirty="0">
               <a:solidFill>
@@ -4352,7 +4376,7 @@
         </p:nvSpPr>
         <p:spPr>
           <a:xfrm>
-            <a:off x="6074030" y="1687656"/>
+            <a:off x="6231183" y="1668823"/>
             <a:ext cx="2438400" cy="215444"/>
           </a:xfrm>
           <a:prstGeom prst="rect">
@@ -4366,6 +4390,16 @@
           </a:bodyPr>
           <a:lstStyle/>
           <a:p>
+            <a:r>
+              <a:rPr lang="en-US" sz="1400" dirty="0" err="1" smtClean="0">
+                <a:solidFill>
+                  <a:schemeClr val="accent5">
+                    <a:lumMod val="75000"/>
+                  </a:schemeClr>
+                </a:solidFill>
+              </a:rPr>
+              <a:t>saveUrlToAddressBookStorage</a:t>
+            </a:r>
             <a:r>
               <a:rPr lang="en-US" sz="1400" dirty="0" smtClean="0">
                 <a:solidFill>
@@ -4374,27 +4408,7 @@
                   </a:schemeClr>
                 </a:solidFill>
               </a:rPr>
-              <a:t>post(</a:t>
-            </a:r>
-            <a:r>
-              <a:rPr lang="en-US" sz="1400" dirty="0" err="1" smtClean="0">
-                <a:solidFill>
-                  <a:schemeClr val="accent5">
-                    <a:lumMod val="75000"/>
-                  </a:schemeClr>
-                </a:solidFill>
-              </a:rPr>
-              <a:t>AddressBookChangedEvent</a:t>
-            </a:r>
-            <a:r>
-              <a:rPr lang="en-US" sz="1400" dirty="0" smtClean="0">
-                <a:solidFill>
-                  <a:schemeClr val="accent5">
-                    <a:lumMod val="75000"/>
-                  </a:schemeClr>
-                </a:solidFill>
-              </a:rPr>
-              <a:t>)</a:t>
+              <a:t>()</a:t>
             </a:r>
             <a:endParaRPr lang="en-US" sz="1400" dirty="0">
               <a:solidFill>
@@ -4573,15 +4587,7 @@
                   <a:schemeClr val="bg1"/>
                 </a:solidFill>
               </a:rPr>
-              <a:t>:</a:t>
-            </a:r>
-            <a:r>
-              <a:rPr lang="en-US" sz="1600" dirty="0" err="1" smtClean="0">
-                <a:solidFill>
-                  <a:schemeClr val="bg1"/>
-                </a:solidFill>
-              </a:rPr>
-              <a:t>EventsCenter</a:t>
+              <a:t>:storage</a:t>
             </a:r>
             <a:endParaRPr lang="en-SG" sz="1600" dirty="0">
               <a:solidFill>
@@ -4704,46 +4710,6 @@
               <a:srgbClr val="7030A0"/>
             </a:solidFill>
             <a:tailEnd type="arrow"/>
-          </a:ln>
-        </p:spPr>
-        <p:style>
-          <a:lnRef idx="1">
-            <a:schemeClr val="accent1"/>
-          </a:lnRef>
-          <a:fillRef idx="0">
-            <a:schemeClr val="accent1"/>
-          </a:fillRef>
-          <a:effectRef idx="0">
-            <a:schemeClr val="accent1"/>
-          </a:effectRef>
-          <a:fontRef idx="minor">
-            <a:schemeClr val="tx1"/>
-          </a:fontRef>
-        </p:style>
-      </p:cxnSp>
-      <p:cxnSp>
-        <p:nvCxnSpPr>
-          <p:cNvPr id="44" name="Straight Arrow Connector 43"/>
-          <p:cNvCxnSpPr/>
-          <p:nvPr/>
-        </p:nvCxnSpPr>
-        <p:spPr>
-          <a:xfrm>
-            <a:off x="5943992" y="2137989"/>
-            <a:ext cx="2549946" cy="0"/>
-          </a:xfrm>
-          <a:prstGeom prst="straightConnector1">
-            <a:avLst/>
-          </a:prstGeom>
-          <a:ln w="19050">
-            <a:solidFill>
-              <a:schemeClr val="accent5">
-                <a:lumMod val="75000"/>
-              </a:schemeClr>
-            </a:solidFill>
-            <a:prstDash val="sysDash"/>
-            <a:headEnd type="arrow" w="med" len="med"/>
-            <a:tailEnd type="none" w="med" len="med"/>
           </a:ln>
         </p:spPr>
         <p:style>
@@ -5733,6 +5699,223 @@
                 </a:schemeClr>
               </a:solidFill>
             </a:endParaRPr>
+          </a:p>
+        </p:txBody>
+      </p:sp>
+      <p:sp>
+        <p:nvSpPr>
+          <p:cNvPr id="51" name="TextBox 50"/>
+          <p:cNvSpPr txBox="1"/>
+          <p:nvPr/>
+        </p:nvSpPr>
+        <p:spPr>
+          <a:xfrm>
+            <a:off x="3986772" y="1223611"/>
+            <a:ext cx="1737846" cy="215444"/>
+          </a:xfrm>
+          <a:prstGeom prst="rect">
+            <a:avLst/>
+          </a:prstGeom>
+          <a:noFill/>
+        </p:spPr>
+        <p:txBody>
+          <a:bodyPr wrap="square" lIns="0" tIns="0" rIns="0" bIns="0" rtlCol="0">
+            <a:spAutoFit/>
+          </a:bodyPr>
+          <a:lstStyle/>
+          <a:p>
+            <a:r>
+              <a:rPr lang="en-US" sz="1400" dirty="0" err="1" smtClean="0">
+                <a:solidFill>
+                  <a:srgbClr val="7030A0"/>
+                </a:solidFill>
+              </a:rPr>
+              <a:t>extractUrl</a:t>
+            </a:r>
+            <a:r>
+              <a:rPr lang="en-US" sz="1400" dirty="0" smtClean="0">
+                <a:solidFill>
+                  <a:srgbClr val="7030A0"/>
+                </a:solidFill>
+              </a:rPr>
+              <a:t>()</a:t>
+            </a:r>
+            <a:endParaRPr lang="en-US" sz="1400" dirty="0">
+              <a:solidFill>
+                <a:srgbClr val="7030A0"/>
+              </a:solidFill>
+            </a:endParaRPr>
+          </a:p>
+        </p:txBody>
+      </p:sp>
+      <p:sp>
+        <p:nvSpPr>
+          <p:cNvPr id="53" name="TextBox 52"/>
+          <p:cNvSpPr txBox="1"/>
+          <p:nvPr/>
+        </p:nvSpPr>
+        <p:spPr>
+          <a:xfrm>
+            <a:off x="1845466" y="2332525"/>
+            <a:ext cx="1898385" cy="215444"/>
+          </a:xfrm>
+          <a:prstGeom prst="rect">
+            <a:avLst/>
+          </a:prstGeom>
+          <a:noFill/>
+        </p:spPr>
+        <p:txBody>
+          <a:bodyPr wrap="square" lIns="0" tIns="0" rIns="0" bIns="0" rtlCol="0">
+            <a:spAutoFit/>
+          </a:bodyPr>
+          <a:lstStyle/>
+          <a:p>
+            <a:r>
+              <a:rPr lang="en-US" sz="1400" dirty="0" err="1" smtClean="0">
+                <a:solidFill>
+                  <a:srgbClr val="0070C0"/>
+                </a:solidFill>
+              </a:rPr>
+              <a:t>commandExecuteMsg</a:t>
+            </a:r>
+            <a:r>
+              <a:rPr lang="en-US" sz="1400" dirty="0" smtClean="0">
+                <a:solidFill>
+                  <a:srgbClr val="0070C0"/>
+                </a:solidFill>
+              </a:rPr>
+              <a:t>()</a:t>
+            </a:r>
+            <a:endParaRPr lang="en-US" sz="1400" dirty="0">
+              <a:solidFill>
+                <a:srgbClr val="0070C0"/>
+              </a:solidFill>
+            </a:endParaRPr>
+          </a:p>
+        </p:txBody>
+      </p:sp>
+      <p:sp>
+        <p:nvSpPr>
+          <p:cNvPr id="4" name="Rectangle 3"/>
+          <p:cNvSpPr/>
+          <p:nvPr/>
+        </p:nvSpPr>
+        <p:spPr>
+          <a:xfrm>
+            <a:off x="3876879" y="2354529"/>
+            <a:ext cx="2115259" cy="523220"/>
+          </a:xfrm>
+          <a:prstGeom prst="rect">
+            <a:avLst/>
+          </a:prstGeom>
+        </p:spPr>
+        <p:txBody>
+          <a:bodyPr wrap="none">
+            <a:spAutoFit/>
+          </a:bodyPr>
+          <a:lstStyle/>
+          <a:p>
+            <a:r>
+              <a:rPr lang="en-US" sz="1400" dirty="0" err="1" smtClean="0">
+                <a:solidFill>
+                  <a:srgbClr val="7030A0"/>
+                </a:solidFill>
+              </a:rPr>
+              <a:t>newAvatar</a:t>
+            </a:r>
+            <a:r>
+              <a:rPr lang="en-US" sz="1400" dirty="0" smtClean="0">
+                <a:solidFill>
+                  <a:srgbClr val="7030A0"/>
+                </a:solidFill>
+              </a:rPr>
+              <a:t>(</a:t>
+            </a:r>
+            <a:r>
+              <a:rPr lang="en-US" sz="1400" dirty="0" err="1" smtClean="0">
+                <a:solidFill>
+                  <a:srgbClr val="7030A0"/>
+                </a:solidFill>
+              </a:rPr>
+              <a:t>Url</a:t>
+            </a:r>
+            <a:r>
+              <a:rPr lang="en-US" sz="1400" dirty="0" smtClean="0">
+                <a:solidFill>
+                  <a:srgbClr val="7030A0"/>
+                </a:solidFill>
+              </a:rPr>
+              <a:t>)</a:t>
+            </a:r>
+          </a:p>
+          <a:p>
+            <a:r>
+              <a:rPr lang="en-US" sz="1400" dirty="0" err="1" smtClean="0">
+                <a:solidFill>
+                  <a:srgbClr val="7030A0"/>
+                </a:solidFill>
+              </a:rPr>
+              <a:t>UpdatePerson</a:t>
+            </a:r>
+            <a:r>
+              <a:rPr lang="en-US" sz="1400" dirty="0" smtClean="0">
+                <a:solidFill>
+                  <a:srgbClr val="7030A0"/>
+                </a:solidFill>
+              </a:rPr>
+              <a:t>(</a:t>
+            </a:r>
+            <a:r>
+              <a:rPr lang="en-US" sz="1400" dirty="0" err="1" smtClean="0">
+                <a:solidFill>
+                  <a:srgbClr val="7030A0"/>
+                </a:solidFill>
+              </a:rPr>
+              <a:t>newAvatar</a:t>
+            </a:r>
+            <a:r>
+              <a:rPr lang="en-US" sz="1400" dirty="0" smtClean="0">
+                <a:solidFill>
+                  <a:srgbClr val="7030A0"/>
+                </a:solidFill>
+              </a:rPr>
+              <a:t>)</a:t>
+            </a:r>
+            <a:endParaRPr lang="en-US" sz="1400" dirty="0">
+              <a:solidFill>
+                <a:srgbClr val="7030A0"/>
+              </a:solidFill>
+            </a:endParaRPr>
+          </a:p>
+        </p:txBody>
+      </p:sp>
+      <p:sp>
+        <p:nvSpPr>
+          <p:cNvPr id="63" name="TextBox 62"/>
+          <p:cNvSpPr txBox="1"/>
+          <p:nvPr/>
+        </p:nvSpPr>
+        <p:spPr>
+          <a:xfrm>
+            <a:off x="418790" y="2399003"/>
+            <a:ext cx="967211" cy="430887"/>
+          </a:xfrm>
+          <a:prstGeom prst="rect">
+            <a:avLst/>
+          </a:prstGeom>
+          <a:noFill/>
+        </p:spPr>
+        <p:txBody>
+          <a:bodyPr wrap="square" lIns="0" tIns="0" rIns="0" bIns="0" rtlCol="0">
+            <a:spAutoFit/>
+          </a:bodyPr>
+          <a:lstStyle/>
+          <a:p>
+            <a:r>
+              <a:rPr lang="en-US" sz="1400" smtClean="0"/>
+              <a:t>Avatar updated</a:t>
+            </a:r>
+            <a:endParaRPr lang="en-US" sz="1400" dirty="0"/>
           </a:p>
         </p:txBody>
       </p:sp>

</xml_diff>